<commit_message>
change table text font
</commit_message>
<xml_diff>
--- a/pptx/result/report.pptx
+++ b/pptx/result/report.pptx
@@ -3120,6 +3120,9 @@
                     <a:bodyPr/>
                     <a:lstStyle/>
                     <a:p>
+                      <a:pPr>
+                        <a:defRPr sz="1200"/>
+                      </a:pPr>
                       <a:r>
                         <a:t>Item</a:t>
                       </a:r>
@@ -3132,6 +3135,9 @@
                     <a:bodyPr/>
                     <a:lstStyle/>
                     <a:p>
+                      <a:pPr>
+                        <a:defRPr sz="1200"/>
+                      </a:pPr>
                       <a:r>
                         <a:t>UNIT PN</a:t>
                       </a:r>
@@ -3144,6 +3150,9 @@
                     <a:bodyPr/>
                     <a:lstStyle/>
                     <a:p>
+                      <a:pPr>
+                        <a:defRPr sz="1200"/>
+                      </a:pPr>
                       <a:r>
                         <a:t>Test Result</a:t>
                       </a:r>
@@ -3156,6 +3165,9 @@
                     <a:bodyPr/>
                     <a:lstStyle/>
                     <a:p>
+                      <a:pPr>
+                        <a:defRPr sz="1200"/>
+                      </a:pPr>
                       <a:r>
                         <a:t>Main</a:t>
                       </a:r>
@@ -3168,6 +3180,9 @@
                     <a:bodyPr/>
                     <a:lstStyle/>
                     <a:p>
+                      <a:pPr>
+                        <a:defRPr sz="1200"/>
+                      </a:pPr>
                       <a:r>
                         <a:t>Aux</a:t>
                       </a:r>
@@ -3180,6 +3195,9 @@
                     <a:bodyPr/>
                     <a:lstStyle/>
                     <a:p>
+                      <a:pPr>
+                        <a:defRPr sz="1200"/>
+                      </a:pPr>
                       <a:r>
                         <a:t>Spec</a:t>
                       </a:r>
@@ -3194,6 +3212,9 @@
                     <a:bodyPr/>
                     <a:lstStyle/>
                     <a:p>
+                      <a:pPr>
+                        <a:defRPr sz="1200"/>
+                      </a:pPr>
                       <a:r>
                         <a:t>1</a:t>
                       </a:r>
@@ -3206,6 +3227,9 @@
                     <a:bodyPr/>
                     <a:lstStyle/>
                     <a:p>
+                      <a:pPr>
+                        <a:defRPr sz="1200"/>
+                      </a:pPr>
                       <a:r>
                         <a:t>7249141700002</a:t>
                       </a:r>
@@ -3218,6 +3242,9 @@
                     <a:bodyPr/>
                     <a:lstStyle/>
                     <a:p>
+                      <a:pPr>
+                        <a:defRPr sz="1200"/>
+                      </a:pPr>
                       <a:r>
                         <a:t>PASS</a:t>
                       </a:r>
@@ -3230,6 +3257,9 @@
                     <a:bodyPr/>
                     <a:lstStyle/>
                     <a:p>
+                      <a:pPr>
+                        <a:defRPr sz="1200"/>
+                      </a:pPr>
                       <a:r>
                         <a:t>-62</a:t>
                       </a:r>
@@ -3242,6 +3272,9 @@
                     <a:bodyPr/>
                     <a:lstStyle/>
                     <a:p>
+                      <a:pPr>
+                        <a:defRPr sz="1200"/>
+                      </a:pPr>
                       <a:r>
                         <a:t>-57</a:t>
                       </a:r>
@@ -3254,6 +3287,9 @@
                     <a:bodyPr/>
                     <a:lstStyle/>
                     <a:p>
+                      <a:pPr>
+                        <a:defRPr sz="1200"/>
+                      </a:pPr>
                       <a:r>
                         <a:t>-65</a:t>
                       </a:r>
@@ -3268,6 +3304,9 @@
                     <a:bodyPr/>
                     <a:lstStyle/>
                     <a:p>
+                      <a:pPr>
+                        <a:defRPr sz="1200"/>
+                      </a:pPr>
                       <a:r>
                         <a:t>2</a:t>
                       </a:r>
@@ -3280,6 +3319,9 @@
                     <a:bodyPr/>
                     <a:lstStyle/>
                     <a:p>
+                      <a:pPr>
+                        <a:defRPr sz="1200"/>
+                      </a:pPr>
                       <a:r>
                         <a:t>7249141700003</a:t>
                       </a:r>
@@ -3292,6 +3334,9 @@
                     <a:bodyPr/>
                     <a:lstStyle/>
                     <a:p>
+                      <a:pPr>
+                        <a:defRPr sz="1200"/>
+                      </a:pPr>
                       <a:r>
                         <a:t>PASS</a:t>
                       </a:r>
@@ -3304,6 +3349,9 @@
                     <a:bodyPr/>
                     <a:lstStyle/>
                     <a:p>
+                      <a:pPr>
+                        <a:defRPr sz="1200"/>
+                      </a:pPr>
                       <a:r>
                         <a:t>-56</a:t>
                       </a:r>
@@ -3316,6 +3364,9 @@
                     <a:bodyPr/>
                     <a:lstStyle/>
                     <a:p>
+                      <a:pPr>
+                        <a:defRPr sz="1200"/>
+                      </a:pPr>
                       <a:r>
                         <a:t>-57</a:t>
                       </a:r>
@@ -3328,6 +3379,9 @@
                     <a:bodyPr/>
                     <a:lstStyle/>
                     <a:p>
+                      <a:pPr>
+                        <a:defRPr sz="1200"/>
+                      </a:pPr>
                       <a:r>
                         <a:t>-65</a:t>
                       </a:r>
@@ -3342,6 +3396,9 @@
                     <a:bodyPr/>
                     <a:lstStyle/>
                     <a:p>
+                      <a:pPr>
+                        <a:defRPr sz="1200"/>
+                      </a:pPr>
                       <a:r>
                         <a:t>3</a:t>
                       </a:r>
@@ -3354,6 +3411,9 @@
                     <a:bodyPr/>
                     <a:lstStyle/>
                     <a:p>
+                      <a:pPr>
+                        <a:defRPr sz="1200"/>
+                      </a:pPr>
                       <a:r>
                         <a:t>7249141700005</a:t>
                       </a:r>
@@ -3366,6 +3426,9 @@
                     <a:bodyPr/>
                     <a:lstStyle/>
                     <a:p>
+                      <a:pPr>
+                        <a:defRPr sz="1200"/>
+                      </a:pPr>
                       <a:r>
                         <a:t>PASS</a:t>
                       </a:r>
@@ -3378,6 +3441,9 @@
                     <a:bodyPr/>
                     <a:lstStyle/>
                     <a:p>
+                      <a:pPr>
+                        <a:defRPr sz="1200"/>
+                      </a:pPr>
                       <a:r>
                         <a:t>-52</a:t>
                       </a:r>
@@ -3390,6 +3456,9 @@
                     <a:bodyPr/>
                     <a:lstStyle/>
                     <a:p>
+                      <a:pPr>
+                        <a:defRPr sz="1200"/>
+                      </a:pPr>
                       <a:r>
                         <a:t>-53</a:t>
                       </a:r>
@@ -3402,6 +3471,9 @@
                     <a:bodyPr/>
                     <a:lstStyle/>
                     <a:p>
+                      <a:pPr>
+                        <a:defRPr sz="1200"/>
+                      </a:pPr>
                       <a:r>
                         <a:t>-65</a:t>
                       </a:r>
@@ -3416,6 +3488,9 @@
                     <a:bodyPr/>
                     <a:lstStyle/>
                     <a:p>
+                      <a:pPr>
+                        <a:defRPr sz="1200"/>
+                      </a:pPr>
                       <a:r>
                         <a:t>4</a:t>
                       </a:r>
@@ -3428,6 +3503,9 @@
                     <a:bodyPr/>
                     <a:lstStyle/>
                     <a:p>
+                      <a:pPr>
+                        <a:defRPr sz="1200"/>
+                      </a:pPr>
                       <a:r>
                         <a:t>7249141700008</a:t>
                       </a:r>
@@ -3440,6 +3518,9 @@
                     <a:bodyPr/>
                     <a:lstStyle/>
                     <a:p>
+                      <a:pPr>
+                        <a:defRPr sz="1200"/>
+                      </a:pPr>
                       <a:r>
                         <a:t>PASS</a:t>
                       </a:r>
@@ -3452,6 +3533,9 @@
                     <a:bodyPr/>
                     <a:lstStyle/>
                     <a:p>
+                      <a:pPr>
+                        <a:defRPr sz="1200"/>
+                      </a:pPr>
                       <a:r>
                         <a:t>-52</a:t>
                       </a:r>
@@ -3464,6 +3548,9 @@
                     <a:bodyPr/>
                     <a:lstStyle/>
                     <a:p>
+                      <a:pPr>
+                        <a:defRPr sz="1200"/>
+                      </a:pPr>
                       <a:r>
                         <a:t>-53</a:t>
                       </a:r>
@@ -3476,6 +3563,9 @@
                     <a:bodyPr/>
                     <a:lstStyle/>
                     <a:p>
+                      <a:pPr>
+                        <a:defRPr sz="1200"/>
+                      </a:pPr>
                       <a:r>
                         <a:t>-65</a:t>
                       </a:r>
@@ -3490,6 +3580,9 @@
                     <a:bodyPr/>
                     <a:lstStyle/>
                     <a:p>
+                      <a:pPr>
+                        <a:defRPr sz="1200"/>
+                      </a:pPr>
                       <a:r>
                         <a:t>5</a:t>
                       </a:r>
@@ -3502,6 +3595,9 @@
                     <a:bodyPr/>
                     <a:lstStyle/>
                     <a:p>
+                      <a:pPr>
+                        <a:defRPr sz="1200"/>
+                      </a:pPr>
                       <a:r>
                         <a:t>7249141700009</a:t>
                       </a:r>
@@ -3514,6 +3610,9 @@
                     <a:bodyPr/>
                     <a:lstStyle/>
                     <a:p>
+                      <a:pPr>
+                        <a:defRPr sz="1200"/>
+                      </a:pPr>
                       <a:r>
                         <a:t>PASS</a:t>
                       </a:r>
@@ -3526,6 +3625,9 @@
                     <a:bodyPr/>
                     <a:lstStyle/>
                     <a:p>
+                      <a:pPr>
+                        <a:defRPr sz="1200"/>
+                      </a:pPr>
                       <a:r>
                         <a:t>-45</a:t>
                       </a:r>
@@ -3538,6 +3640,9 @@
                     <a:bodyPr/>
                     <a:lstStyle/>
                     <a:p>
+                      <a:pPr>
+                        <a:defRPr sz="1200"/>
+                      </a:pPr>
                       <a:r>
                         <a:t>-52</a:t>
                       </a:r>
@@ -3550,6 +3655,9 @@
                     <a:bodyPr/>
                     <a:lstStyle/>
                     <a:p>
+                      <a:pPr>
+                        <a:defRPr sz="1200"/>
+                      </a:pPr>
                       <a:r>
                         <a:t>-65</a:t>
                       </a:r>
@@ -3564,6 +3672,9 @@
                     <a:bodyPr/>
                     <a:lstStyle/>
                     <a:p>
+                      <a:pPr>
+                        <a:defRPr sz="1200"/>
+                      </a:pPr>
                       <a:r>
                         <a:t>6</a:t>
                       </a:r>
@@ -3576,6 +3687,9 @@
                     <a:bodyPr/>
                     <a:lstStyle/>
                     <a:p>
+                      <a:pPr>
+                        <a:defRPr sz="1200"/>
+                      </a:pPr>
                       <a:r>
                         <a:t>7249141700011</a:t>
                       </a:r>
@@ -3588,6 +3702,9 @@
                     <a:bodyPr/>
                     <a:lstStyle/>
                     <a:p>
+                      <a:pPr>
+                        <a:defRPr sz="1200"/>
+                      </a:pPr>
                       <a:r>
                         <a:t>PASS</a:t>
                       </a:r>
@@ -3600,6 +3717,9 @@
                     <a:bodyPr/>
                     <a:lstStyle/>
                     <a:p>
+                      <a:pPr>
+                        <a:defRPr sz="1200"/>
+                      </a:pPr>
                       <a:r>
                         <a:t>-62</a:t>
                       </a:r>
@@ -3612,6 +3732,9 @@
                     <a:bodyPr/>
                     <a:lstStyle/>
                     <a:p>
+                      <a:pPr>
+                        <a:defRPr sz="1200"/>
+                      </a:pPr>
                       <a:r>
                         <a:t>-56</a:t>
                       </a:r>
@@ -3624,6 +3747,9 @@
                     <a:bodyPr/>
                     <a:lstStyle/>
                     <a:p>
+                      <a:pPr>
+                        <a:defRPr sz="1200"/>
+                      </a:pPr>
                       <a:r>
                         <a:t>-65</a:t>
                       </a:r>
@@ -3638,6 +3764,9 @@
                     <a:bodyPr/>
                     <a:lstStyle/>
                     <a:p>
+                      <a:pPr>
+                        <a:defRPr sz="1200"/>
+                      </a:pPr>
                       <a:r>
                         <a:t>7</a:t>
                       </a:r>
@@ -3650,6 +3779,9 @@
                     <a:bodyPr/>
                     <a:lstStyle/>
                     <a:p>
+                      <a:pPr>
+                        <a:defRPr sz="1200"/>
+                      </a:pPr>
                       <a:r>
                         <a:t>7249141700012</a:t>
                       </a:r>
@@ -3662,6 +3794,9 @@
                     <a:bodyPr/>
                     <a:lstStyle/>
                     <a:p>
+                      <a:pPr>
+                        <a:defRPr sz="1200"/>
+                      </a:pPr>
                       <a:r>
                         <a:t>PASS</a:t>
                       </a:r>
@@ -3674,6 +3809,9 @@
                     <a:bodyPr/>
                     <a:lstStyle/>
                     <a:p>
+                      <a:pPr>
+                        <a:defRPr sz="1200"/>
+                      </a:pPr>
                       <a:r>
                         <a:t>-61</a:t>
                       </a:r>
@@ -3686,6 +3824,9 @@
                     <a:bodyPr/>
                     <a:lstStyle/>
                     <a:p>
+                      <a:pPr>
+                        <a:defRPr sz="1200"/>
+                      </a:pPr>
                       <a:r>
                         <a:t>-61</a:t>
                       </a:r>
@@ -3698,6 +3839,9 @@
                     <a:bodyPr/>
                     <a:lstStyle/>
                     <a:p>
+                      <a:pPr>
+                        <a:defRPr sz="1200"/>
+                      </a:pPr>
                       <a:r>
                         <a:t>-65</a:t>
                       </a:r>
@@ -3712,6 +3856,9 @@
                     <a:bodyPr/>
                     <a:lstStyle/>
                     <a:p>
+                      <a:pPr>
+                        <a:defRPr sz="1200"/>
+                      </a:pPr>
                       <a:r>
                         <a:t>8</a:t>
                       </a:r>
@@ -3724,6 +3871,9 @@
                     <a:bodyPr/>
                     <a:lstStyle/>
                     <a:p>
+                      <a:pPr>
+                        <a:defRPr sz="1200"/>
+                      </a:pPr>
                       <a:r>
                         <a:t>7249141800002</a:t>
                       </a:r>
@@ -3736,6 +3886,9 @@
                     <a:bodyPr/>
                     <a:lstStyle/>
                     <a:p>
+                      <a:pPr>
+                        <a:defRPr sz="1200"/>
+                      </a:pPr>
                       <a:r>
                         <a:t>PASS</a:t>
                       </a:r>
@@ -3748,6 +3901,9 @@
                     <a:bodyPr/>
                     <a:lstStyle/>
                     <a:p>
+                      <a:pPr>
+                        <a:defRPr sz="1200"/>
+                      </a:pPr>
                       <a:r>
                         <a:t>-64</a:t>
                       </a:r>
@@ -3760,6 +3916,9 @@
                     <a:bodyPr/>
                     <a:lstStyle/>
                     <a:p>
+                      <a:pPr>
+                        <a:defRPr sz="1200"/>
+                      </a:pPr>
                       <a:r>
                         <a:t>-65</a:t>
                       </a:r>
@@ -3772,6 +3931,9 @@
                     <a:bodyPr/>
                     <a:lstStyle/>
                     <a:p>
+                      <a:pPr>
+                        <a:defRPr sz="1200"/>
+                      </a:pPr>
                       <a:r>
                         <a:t>-65</a:t>
                       </a:r>
@@ -3786,6 +3948,9 @@
                     <a:bodyPr/>
                     <a:lstStyle/>
                     <a:p>
+                      <a:pPr>
+                        <a:defRPr sz="1200"/>
+                      </a:pPr>
                       <a:r>
                         <a:t>9</a:t>
                       </a:r>
@@ -3798,6 +3963,9 @@
                     <a:bodyPr/>
                     <a:lstStyle/>
                     <a:p>
+                      <a:pPr>
+                        <a:defRPr sz="1200"/>
+                      </a:pPr>
                       <a:r>
                         <a:t>7249141800006</a:t>
                       </a:r>
@@ -3810,6 +3978,9 @@
                     <a:bodyPr/>
                     <a:lstStyle/>
                     <a:p>
+                      <a:pPr>
+                        <a:defRPr sz="1200"/>
+                      </a:pPr>
                       <a:r>
                         <a:t>PASS</a:t>
                       </a:r>
@@ -3822,6 +3993,9 @@
                     <a:bodyPr/>
                     <a:lstStyle/>
                     <a:p>
+                      <a:pPr>
+                        <a:defRPr sz="1200"/>
+                      </a:pPr>
                       <a:r>
                         <a:t>-64</a:t>
                       </a:r>
@@ -3834,6 +4008,9 @@
                     <a:bodyPr/>
                     <a:lstStyle/>
                     <a:p>
+                      <a:pPr>
+                        <a:defRPr sz="1200"/>
+                      </a:pPr>
                       <a:r>
                         <a:t>-59</a:t>
                       </a:r>
@@ -3846,6 +4023,9 @@
                     <a:bodyPr/>
                     <a:lstStyle/>
                     <a:p>
+                      <a:pPr>
+                        <a:defRPr sz="1200"/>
+                      </a:pPr>
                       <a:r>
                         <a:t>-65</a:t>
                       </a:r>
@@ -3860,6 +4040,9 @@
                     <a:bodyPr/>
                     <a:lstStyle/>
                     <a:p>
+                      <a:pPr>
+                        <a:defRPr sz="1200"/>
+                      </a:pPr>
                       <a:r>
                         <a:t>10</a:t>
                       </a:r>
@@ -3872,6 +4055,9 @@
                     <a:bodyPr/>
                     <a:lstStyle/>
                     <a:p>
+                      <a:pPr>
+                        <a:defRPr sz="1200"/>
+                      </a:pPr>
                       <a:r>
                         <a:t>7249141800012</a:t>
                       </a:r>
@@ -3884,6 +4070,9 @@
                     <a:bodyPr/>
                     <a:lstStyle/>
                     <a:p>
+                      <a:pPr>
+                        <a:defRPr sz="1200"/>
+                      </a:pPr>
                       <a:r>
                         <a:t>PASS</a:t>
                       </a:r>
@@ -3896,6 +4085,9 @@
                     <a:bodyPr/>
                     <a:lstStyle/>
                     <a:p>
+                      <a:pPr>
+                        <a:defRPr sz="1200"/>
+                      </a:pPr>
                       <a:r>
                         <a:t>-60</a:t>
                       </a:r>
@@ -3908,6 +4100,9 @@
                     <a:bodyPr/>
                     <a:lstStyle/>
                     <a:p>
+                      <a:pPr>
+                        <a:defRPr sz="1200"/>
+                      </a:pPr>
                       <a:r>
                         <a:t>-65</a:t>
                       </a:r>
@@ -3920,6 +4115,9 @@
                     <a:bodyPr/>
                     <a:lstStyle/>
                     <a:p>
+                      <a:pPr>
+                        <a:defRPr sz="1200"/>
+                      </a:pPr>
                       <a:r>
                         <a:t>-65</a:t>
                       </a:r>
@@ -3934,6 +4132,9 @@
                     <a:bodyPr/>
                     <a:lstStyle/>
                     <a:p>
+                      <a:pPr>
+                        <a:defRPr sz="1200"/>
+                      </a:pPr>
                       <a:r>
                         <a:t>11</a:t>
                       </a:r>
@@ -3946,6 +4147,9 @@
                     <a:bodyPr/>
                     <a:lstStyle/>
                     <a:p>
+                      <a:pPr>
+                        <a:defRPr sz="1200"/>
+                      </a:pPr>
                       <a:r>
                         <a:t>7249141800014</a:t>
                       </a:r>
@@ -3958,6 +4162,9 @@
                     <a:bodyPr/>
                     <a:lstStyle/>
                     <a:p>
+                      <a:pPr>
+                        <a:defRPr sz="1200"/>
+                      </a:pPr>
                       <a:r>
                         <a:t>PASS</a:t>
                       </a:r>
@@ -3970,6 +4177,9 @@
                     <a:bodyPr/>
                     <a:lstStyle/>
                     <a:p>
+                      <a:pPr>
+                        <a:defRPr sz="1200"/>
+                      </a:pPr>
                       <a:r>
                         <a:t>-54</a:t>
                       </a:r>
@@ -3982,6 +4192,9 @@
                     <a:bodyPr/>
                     <a:lstStyle/>
                     <a:p>
+                      <a:pPr>
+                        <a:defRPr sz="1200"/>
+                      </a:pPr>
                       <a:r>
                         <a:t>-59</a:t>
                       </a:r>
@@ -3994,6 +4207,9 @@
                     <a:bodyPr/>
                     <a:lstStyle/>
                     <a:p>
+                      <a:pPr>
+                        <a:defRPr sz="1200"/>
+                      </a:pPr>
                       <a:r>
                         <a:t>-65</a:t>
                       </a:r>
@@ -4008,6 +4224,9 @@
                     <a:bodyPr/>
                     <a:lstStyle/>
                     <a:p>
+                      <a:pPr>
+                        <a:defRPr sz="1200"/>
+                      </a:pPr>
                       <a:r>
                         <a:t>12</a:t>
                       </a:r>
@@ -4020,6 +4239,9 @@
                     <a:bodyPr/>
                     <a:lstStyle/>
                     <a:p>
+                      <a:pPr>
+                        <a:defRPr sz="1200"/>
+                      </a:pPr>
                       <a:r>
                         <a:t>7249141800017</a:t>
                       </a:r>
@@ -4032,6 +4254,9 @@
                     <a:bodyPr/>
                     <a:lstStyle/>
                     <a:p>
+                      <a:pPr>
+                        <a:defRPr sz="1200"/>
+                      </a:pPr>
                       <a:r>
                         <a:t>PASS</a:t>
                       </a:r>
@@ -4044,6 +4269,9 @@
                     <a:bodyPr/>
                     <a:lstStyle/>
                     <a:p>
+                      <a:pPr>
+                        <a:defRPr sz="1200"/>
+                      </a:pPr>
                       <a:r>
                         <a:t>-55</a:t>
                       </a:r>
@@ -4056,6 +4284,9 @@
                     <a:bodyPr/>
                     <a:lstStyle/>
                     <a:p>
+                      <a:pPr>
+                        <a:defRPr sz="1200"/>
+                      </a:pPr>
                       <a:r>
                         <a:t>-57</a:t>
                       </a:r>
@@ -4068,6 +4299,9 @@
                     <a:bodyPr/>
                     <a:lstStyle/>
                     <a:p>
+                      <a:pPr>
+                        <a:defRPr sz="1200"/>
+                      </a:pPr>
                       <a:r>
                         <a:t>-65</a:t>
                       </a:r>
@@ -4082,6 +4316,9 @@
                     <a:bodyPr/>
                     <a:lstStyle/>
                     <a:p>
+                      <a:pPr>
+                        <a:defRPr sz="1200"/>
+                      </a:pPr>
                       <a:r>
                         <a:t>13</a:t>
                       </a:r>
@@ -4094,6 +4331,9 @@
                     <a:bodyPr/>
                     <a:lstStyle/>
                     <a:p>
+                      <a:pPr>
+                        <a:defRPr sz="1200"/>
+                      </a:pPr>
                       <a:r>
                         <a:t>7249141800018</a:t>
                       </a:r>
@@ -4106,6 +4346,9 @@
                     <a:bodyPr/>
                     <a:lstStyle/>
                     <a:p>
+                      <a:pPr>
+                        <a:defRPr sz="1200"/>
+                      </a:pPr>
                       <a:r>
                         <a:t>PASS</a:t>
                       </a:r>
@@ -4118,6 +4361,9 @@
                     <a:bodyPr/>
                     <a:lstStyle/>
                     <a:p>
+                      <a:pPr>
+                        <a:defRPr sz="1200"/>
+                      </a:pPr>
                       <a:r>
                         <a:t>-64</a:t>
                       </a:r>
@@ -4130,6 +4376,9 @@
                     <a:bodyPr/>
                     <a:lstStyle/>
                     <a:p>
+                      <a:pPr>
+                        <a:defRPr sz="1200"/>
+                      </a:pPr>
                       <a:r>
                         <a:t>-55</a:t>
                       </a:r>
@@ -4142,6 +4391,9 @@
                     <a:bodyPr/>
                     <a:lstStyle/>
                     <a:p>
+                      <a:pPr>
+                        <a:defRPr sz="1200"/>
+                      </a:pPr>
                       <a:r>
                         <a:t>-65</a:t>
                       </a:r>
@@ -4156,6 +4408,9 @@
                     <a:bodyPr/>
                     <a:lstStyle/>
                     <a:p>
+                      <a:pPr>
+                        <a:defRPr sz="1200"/>
+                      </a:pPr>
                       <a:r>
                         <a:t>14</a:t>
                       </a:r>
@@ -4168,6 +4423,9 @@
                     <a:bodyPr/>
                     <a:lstStyle/>
                     <a:p>
+                      <a:pPr>
+                        <a:defRPr sz="1200"/>
+                      </a:pPr>
                       <a:r>
                         <a:t>7249141800020</a:t>
                       </a:r>
@@ -4180,6 +4438,9 @@
                     <a:bodyPr/>
                     <a:lstStyle/>
                     <a:p>
+                      <a:pPr>
+                        <a:defRPr sz="1200"/>
+                      </a:pPr>
                       <a:r>
                         <a:t>PASS</a:t>
                       </a:r>
@@ -4192,6 +4453,9 @@
                     <a:bodyPr/>
                     <a:lstStyle/>
                     <a:p>
+                      <a:pPr>
+                        <a:defRPr sz="1200"/>
+                      </a:pPr>
                       <a:r>
                         <a:t>-54</a:t>
                       </a:r>
@@ -4204,6 +4468,9 @@
                     <a:bodyPr/>
                     <a:lstStyle/>
                     <a:p>
+                      <a:pPr>
+                        <a:defRPr sz="1200"/>
+                      </a:pPr>
                       <a:r>
                         <a:t>-60</a:t>
                       </a:r>
@@ -4216,6 +4483,9 @@
                     <a:bodyPr/>
                     <a:lstStyle/>
                     <a:p>
+                      <a:pPr>
+                        <a:defRPr sz="1200"/>
+                      </a:pPr>
                       <a:r>
                         <a:t>-65</a:t>
                       </a:r>
@@ -4230,6 +4500,9 @@
                     <a:bodyPr/>
                     <a:lstStyle/>
                     <a:p>
+                      <a:pPr>
+                        <a:defRPr sz="1200"/>
+                      </a:pPr>
                       <a:r>
                         <a:t>15</a:t>
                       </a:r>
@@ -4242,6 +4515,9 @@
                     <a:bodyPr/>
                     <a:lstStyle/>
                     <a:p>
+                      <a:pPr>
+                        <a:defRPr sz="1200"/>
+                      </a:pPr>
                       <a:r>
                         <a:t>7249141800021</a:t>
                       </a:r>
@@ -4254,6 +4530,9 @@
                     <a:bodyPr/>
                     <a:lstStyle/>
                     <a:p>
+                      <a:pPr>
+                        <a:defRPr sz="1200"/>
+                      </a:pPr>
                       <a:r>
                         <a:t>PASS</a:t>
                       </a:r>
@@ -4266,6 +4545,9 @@
                     <a:bodyPr/>
                     <a:lstStyle/>
                     <a:p>
+                      <a:pPr>
+                        <a:defRPr sz="1200"/>
+                      </a:pPr>
                       <a:r>
                         <a:t>-62</a:t>
                       </a:r>
@@ -4278,6 +4560,9 @@
                     <a:bodyPr/>
                     <a:lstStyle/>
                     <a:p>
+                      <a:pPr>
+                        <a:defRPr sz="1200"/>
+                      </a:pPr>
                       <a:r>
                         <a:t>-63</a:t>
                       </a:r>
@@ -4290,6 +4575,9 @@
                     <a:bodyPr/>
                     <a:lstStyle/>
                     <a:p>
+                      <a:pPr>
+                        <a:defRPr sz="1200"/>
+                      </a:pPr>
                       <a:r>
                         <a:t>-65</a:t>
                       </a:r>
@@ -4304,6 +4592,9 @@
                     <a:bodyPr/>
                     <a:lstStyle/>
                     <a:p>
+                      <a:pPr>
+                        <a:defRPr sz="1200"/>
+                      </a:pPr>
                       <a:r>
                         <a:t>16</a:t>
                       </a:r>
@@ -4316,6 +4607,9 @@
                     <a:bodyPr/>
                     <a:lstStyle/>
                     <a:p>
+                      <a:pPr>
+                        <a:defRPr sz="1200"/>
+                      </a:pPr>
                       <a:r>
                         <a:t>7249141800023</a:t>
                       </a:r>
@@ -4328,6 +4622,9 @@
                     <a:bodyPr/>
                     <a:lstStyle/>
                     <a:p>
+                      <a:pPr>
+                        <a:defRPr sz="1200"/>
+                      </a:pPr>
                       <a:r>
                         <a:t>PASS</a:t>
                       </a:r>
@@ -4340,6 +4637,9 @@
                     <a:bodyPr/>
                     <a:lstStyle/>
                     <a:p>
+                      <a:pPr>
+                        <a:defRPr sz="1200"/>
+                      </a:pPr>
                       <a:r>
                         <a:t>-55</a:t>
                       </a:r>
@@ -4352,6 +4652,9 @@
                     <a:bodyPr/>
                     <a:lstStyle/>
                     <a:p>
+                      <a:pPr>
+                        <a:defRPr sz="1200"/>
+                      </a:pPr>
                       <a:r>
                         <a:t>-60</a:t>
                       </a:r>
@@ -4364,6 +4667,9 @@
                     <a:bodyPr/>
                     <a:lstStyle/>
                     <a:p>
+                      <a:pPr>
+                        <a:defRPr sz="1200"/>
+                      </a:pPr>
                       <a:r>
                         <a:t>-65</a:t>
                       </a:r>
@@ -4378,6 +4684,9 @@
                     <a:bodyPr/>
                     <a:lstStyle/>
                     <a:p>
+                      <a:pPr>
+                        <a:defRPr sz="1200"/>
+                      </a:pPr>
                       <a:r>
                         <a:t>17</a:t>
                       </a:r>
@@ -4390,6 +4699,9 @@
                     <a:bodyPr/>
                     <a:lstStyle/>
                     <a:p>
+                      <a:pPr>
+                        <a:defRPr sz="1200"/>
+                      </a:pPr>
                       <a:r>
                         <a:t>7249141800024</a:t>
                       </a:r>
@@ -4402,6 +4714,9 @@
                     <a:bodyPr/>
                     <a:lstStyle/>
                     <a:p>
+                      <a:pPr>
+                        <a:defRPr sz="1200"/>
+                      </a:pPr>
                       <a:r>
                         <a:t>PASS</a:t>
                       </a:r>
@@ -4414,6 +4729,9 @@
                     <a:bodyPr/>
                     <a:lstStyle/>
                     <a:p>
+                      <a:pPr>
+                        <a:defRPr sz="1200"/>
+                      </a:pPr>
                       <a:r>
                         <a:t>-54</a:t>
                       </a:r>
@@ -4426,6 +4744,9 @@
                     <a:bodyPr/>
                     <a:lstStyle/>
                     <a:p>
+                      <a:pPr>
+                        <a:defRPr sz="1200"/>
+                      </a:pPr>
                       <a:r>
                         <a:t>-52</a:t>
                       </a:r>
@@ -4438,6 +4759,9 @@
                     <a:bodyPr/>
                     <a:lstStyle/>
                     <a:p>
+                      <a:pPr>
+                        <a:defRPr sz="1200"/>
+                      </a:pPr>
                       <a:r>
                         <a:t>-65</a:t>
                       </a:r>
@@ -4452,6 +4776,9 @@
                     <a:bodyPr/>
                     <a:lstStyle/>
                     <a:p>
+                      <a:pPr>
+                        <a:defRPr sz="1200"/>
+                      </a:pPr>
                       <a:r>
                         <a:t>18</a:t>
                       </a:r>
@@ -4464,6 +4791,9 @@
                     <a:bodyPr/>
                     <a:lstStyle/>
                     <a:p>
+                      <a:pPr>
+                        <a:defRPr sz="1200"/>
+                      </a:pPr>
                       <a:r>
                         <a:t>7249141800028</a:t>
                       </a:r>
@@ -4476,6 +4806,9 @@
                     <a:bodyPr/>
                     <a:lstStyle/>
                     <a:p>
+                      <a:pPr>
+                        <a:defRPr sz="1200"/>
+                      </a:pPr>
                       <a:r>
                         <a:t>PASS</a:t>
                       </a:r>
@@ -4488,6 +4821,9 @@
                     <a:bodyPr/>
                     <a:lstStyle/>
                     <a:p>
+                      <a:pPr>
+                        <a:defRPr sz="1200"/>
+                      </a:pPr>
                       <a:r>
                         <a:t>-48</a:t>
                       </a:r>
@@ -4500,6 +4836,9 @@
                     <a:bodyPr/>
                     <a:lstStyle/>
                     <a:p>
+                      <a:pPr>
+                        <a:defRPr sz="1200"/>
+                      </a:pPr>
                       <a:r>
                         <a:t>-54</a:t>
                       </a:r>
@@ -4512,6 +4851,9 @@
                     <a:bodyPr/>
                     <a:lstStyle/>
                     <a:p>
+                      <a:pPr>
+                        <a:defRPr sz="1200"/>
+                      </a:pPr>
                       <a:r>
                         <a:t>-65</a:t>
                       </a:r>
@@ -4526,6 +4868,9 @@
                     <a:bodyPr/>
                     <a:lstStyle/>
                     <a:p>
+                      <a:pPr>
+                        <a:defRPr sz="1200"/>
+                      </a:pPr>
                       <a:r>
                         <a:t>19</a:t>
                       </a:r>
@@ -4538,6 +4883,9 @@
                     <a:bodyPr/>
                     <a:lstStyle/>
                     <a:p>
+                      <a:pPr>
+                        <a:defRPr sz="1200"/>
+                      </a:pPr>
                       <a:r>
                         <a:t>7249141800029</a:t>
                       </a:r>
@@ -4550,6 +4898,9 @@
                     <a:bodyPr/>
                     <a:lstStyle/>
                     <a:p>
+                      <a:pPr>
+                        <a:defRPr sz="1200"/>
+                      </a:pPr>
                       <a:r>
                         <a:t>PASS</a:t>
                       </a:r>
@@ -4562,6 +4913,9 @@
                     <a:bodyPr/>
                     <a:lstStyle/>
                     <a:p>
+                      <a:pPr>
+                        <a:defRPr sz="1200"/>
+                      </a:pPr>
                       <a:r>
                         <a:t>-65</a:t>
                       </a:r>
@@ -4574,6 +4928,9 @@
                     <a:bodyPr/>
                     <a:lstStyle/>
                     <a:p>
+                      <a:pPr>
+                        <a:defRPr sz="1200"/>
+                      </a:pPr>
                       <a:r>
                         <a:t>-63</a:t>
                       </a:r>
@@ -4586,6 +4943,9 @@
                     <a:bodyPr/>
                     <a:lstStyle/>
                     <a:p>
+                      <a:pPr>
+                        <a:defRPr sz="1200"/>
+                      </a:pPr>
                       <a:r>
                         <a:t>-65</a:t>
                       </a:r>
@@ -4600,6 +4960,9 @@
                     <a:bodyPr/>
                     <a:lstStyle/>
                     <a:p>
+                      <a:pPr>
+                        <a:defRPr sz="1200"/>
+                      </a:pPr>
                       <a:r>
                         <a:t>20</a:t>
                       </a:r>
@@ -4612,6 +4975,9 @@
                     <a:bodyPr/>
                     <a:lstStyle/>
                     <a:p>
+                      <a:pPr>
+                        <a:defRPr sz="1200"/>
+                      </a:pPr>
                       <a:r>
                         <a:t>7249141800031</a:t>
                       </a:r>
@@ -4624,6 +4990,9 @@
                     <a:bodyPr/>
                     <a:lstStyle/>
                     <a:p>
+                      <a:pPr>
+                        <a:defRPr sz="1200"/>
+                      </a:pPr>
                       <a:r>
                         <a:t>PASS</a:t>
                       </a:r>
@@ -4636,6 +5005,9 @@
                     <a:bodyPr/>
                     <a:lstStyle/>
                     <a:p>
+                      <a:pPr>
+                        <a:defRPr sz="1200"/>
+                      </a:pPr>
                       <a:r>
                         <a:t>-64</a:t>
                       </a:r>
@@ -4648,6 +5020,9 @@
                     <a:bodyPr/>
                     <a:lstStyle/>
                     <a:p>
+                      <a:pPr>
+                        <a:defRPr sz="1200"/>
+                      </a:pPr>
                       <a:r>
                         <a:t>-52</a:t>
                       </a:r>
@@ -4660,6 +5035,9 @@
                     <a:bodyPr/>
                     <a:lstStyle/>
                     <a:p>
+                      <a:pPr>
+                        <a:defRPr sz="1200"/>
+                      </a:pPr>
                       <a:r>
                         <a:t>-65</a:t>
                       </a:r>
@@ -4674,6 +5052,9 @@
                     <a:bodyPr/>
                     <a:lstStyle/>
                     <a:p>
+                      <a:pPr>
+                        <a:defRPr sz="1200"/>
+                      </a:pPr>
                       <a:r>
                         <a:t>21</a:t>
                       </a:r>
@@ -4686,6 +5067,9 @@
                     <a:bodyPr/>
                     <a:lstStyle/>
                     <a:p>
+                      <a:pPr>
+                        <a:defRPr sz="1200"/>
+                      </a:pPr>
                       <a:r>
                         <a:t>7249141800033</a:t>
                       </a:r>
@@ -4698,6 +5082,9 @@
                     <a:bodyPr/>
                     <a:lstStyle/>
                     <a:p>
+                      <a:pPr>
+                        <a:defRPr sz="1200"/>
+                      </a:pPr>
                       <a:r>
                         <a:t>PASS</a:t>
                       </a:r>
@@ -4710,6 +5097,9 @@
                     <a:bodyPr/>
                     <a:lstStyle/>
                     <a:p>
+                      <a:pPr>
+                        <a:defRPr sz="1200"/>
+                      </a:pPr>
                       <a:r>
                         <a:t>-59</a:t>
                       </a:r>
@@ -4722,6 +5112,9 @@
                     <a:bodyPr/>
                     <a:lstStyle/>
                     <a:p>
+                      <a:pPr>
+                        <a:defRPr sz="1200"/>
+                      </a:pPr>
                       <a:r>
                         <a:t>-59</a:t>
                       </a:r>
@@ -4734,6 +5127,9 @@
                     <a:bodyPr/>
                     <a:lstStyle/>
                     <a:p>
+                      <a:pPr>
+                        <a:defRPr sz="1200"/>
+                      </a:pPr>
                       <a:r>
                         <a:t>-65</a:t>
                       </a:r>
@@ -4748,6 +5144,9 @@
                     <a:bodyPr/>
                     <a:lstStyle/>
                     <a:p>
+                      <a:pPr>
+                        <a:defRPr sz="1200"/>
+                      </a:pPr>
                       <a:r>
                         <a:t>22</a:t>
                       </a:r>
@@ -4760,6 +5159,9 @@
                     <a:bodyPr/>
                     <a:lstStyle/>
                     <a:p>
+                      <a:pPr>
+                        <a:defRPr sz="1200"/>
+                      </a:pPr>
                       <a:r>
                         <a:t>7249141800036</a:t>
                       </a:r>
@@ -4772,6 +5174,9 @@
                     <a:bodyPr/>
                     <a:lstStyle/>
                     <a:p>
+                      <a:pPr>
+                        <a:defRPr sz="1200"/>
+                      </a:pPr>
                       <a:r>
                         <a:t>PASS</a:t>
                       </a:r>
@@ -4784,6 +5189,9 @@
                     <a:bodyPr/>
                     <a:lstStyle/>
                     <a:p>
+                      <a:pPr>
+                        <a:defRPr sz="1200"/>
+                      </a:pPr>
                       <a:r>
                         <a:t>-58</a:t>
                       </a:r>
@@ -4796,6 +5204,9 @@
                     <a:bodyPr/>
                     <a:lstStyle/>
                     <a:p>
+                      <a:pPr>
+                        <a:defRPr sz="1200"/>
+                      </a:pPr>
                       <a:r>
                         <a:t>-64</a:t>
                       </a:r>
@@ -4808,6 +5219,9 @@
                     <a:bodyPr/>
                     <a:lstStyle/>
                     <a:p>
+                      <a:pPr>
+                        <a:defRPr sz="1200"/>
+                      </a:pPr>
                       <a:r>
                         <a:t>-65</a:t>
                       </a:r>
@@ -4822,6 +5236,9 @@
                     <a:bodyPr/>
                     <a:lstStyle/>
                     <a:p>
+                      <a:pPr>
+                        <a:defRPr sz="1200"/>
+                      </a:pPr>
                       <a:r>
                         <a:t>23</a:t>
                       </a:r>
@@ -4834,6 +5251,9 @@
                     <a:bodyPr/>
                     <a:lstStyle/>
                     <a:p>
+                      <a:pPr>
+                        <a:defRPr sz="1200"/>
+                      </a:pPr>
                       <a:r>
                         <a:t>7249141800037</a:t>
                       </a:r>
@@ -4846,6 +5266,9 @@
                     <a:bodyPr/>
                     <a:lstStyle/>
                     <a:p>
+                      <a:pPr>
+                        <a:defRPr sz="1200"/>
+                      </a:pPr>
                       <a:r>
                         <a:t>PASS</a:t>
                       </a:r>
@@ -4858,6 +5281,9 @@
                     <a:bodyPr/>
                     <a:lstStyle/>
                     <a:p>
+                      <a:pPr>
+                        <a:defRPr sz="1200"/>
+                      </a:pPr>
                       <a:r>
                         <a:t>-43</a:t>
                       </a:r>
@@ -4870,6 +5296,9 @@
                     <a:bodyPr/>
                     <a:lstStyle/>
                     <a:p>
+                      <a:pPr>
+                        <a:defRPr sz="1200"/>
+                      </a:pPr>
                       <a:r>
                         <a:t>-46</a:t>
                       </a:r>
@@ -4882,6 +5311,9 @@
                     <a:bodyPr/>
                     <a:lstStyle/>
                     <a:p>
+                      <a:pPr>
+                        <a:defRPr sz="1200"/>
+                      </a:pPr>
                       <a:r>
                         <a:t>-65</a:t>
                       </a:r>
@@ -4896,6 +5328,9 @@
                     <a:bodyPr/>
                     <a:lstStyle/>
                     <a:p>
+                      <a:pPr>
+                        <a:defRPr sz="1200"/>
+                      </a:pPr>
                       <a:r>
                         <a:t>24</a:t>
                       </a:r>
@@ -4908,6 +5343,9 @@
                     <a:bodyPr/>
                     <a:lstStyle/>
                     <a:p>
+                      <a:pPr>
+                        <a:defRPr sz="1200"/>
+                      </a:pPr>
                       <a:r>
                         <a:t>7249141800038</a:t>
                       </a:r>
@@ -4920,6 +5358,9 @@
                     <a:bodyPr/>
                     <a:lstStyle/>
                     <a:p>
+                      <a:pPr>
+                        <a:defRPr sz="1200"/>
+                      </a:pPr>
                       <a:r>
                         <a:t>PASS</a:t>
                       </a:r>
@@ -4932,6 +5373,9 @@
                     <a:bodyPr/>
                     <a:lstStyle/>
                     <a:p>
+                      <a:pPr>
+                        <a:defRPr sz="1200"/>
+                      </a:pPr>
                       <a:r>
                         <a:t>-54</a:t>
                       </a:r>
@@ -4944,6 +5388,9 @@
                     <a:bodyPr/>
                     <a:lstStyle/>
                     <a:p>
+                      <a:pPr>
+                        <a:defRPr sz="1200"/>
+                      </a:pPr>
                       <a:r>
                         <a:t>-49</a:t>
                       </a:r>
@@ -4956,6 +5403,9 @@
                     <a:bodyPr/>
                     <a:lstStyle/>
                     <a:p>
+                      <a:pPr>
+                        <a:defRPr sz="1200"/>
+                      </a:pPr>
                       <a:r>
                         <a:t>-65</a:t>
                       </a:r>
@@ -4970,6 +5420,9 @@
                     <a:bodyPr/>
                     <a:lstStyle/>
                     <a:p>
+                      <a:pPr>
+                        <a:defRPr sz="1200"/>
+                      </a:pPr>
                       <a:r>
                         <a:t>25</a:t>
                       </a:r>
@@ -4982,6 +5435,9 @@
                     <a:bodyPr/>
                     <a:lstStyle/>
                     <a:p>
+                      <a:pPr>
+                        <a:defRPr sz="1200"/>
+                      </a:pPr>
                       <a:r>
                         <a:t>7249141800042</a:t>
                       </a:r>
@@ -4994,6 +5450,9 @@
                     <a:bodyPr/>
                     <a:lstStyle/>
                     <a:p>
+                      <a:pPr>
+                        <a:defRPr sz="1200"/>
+                      </a:pPr>
                       <a:r>
                         <a:t>PASS</a:t>
                       </a:r>
@@ -5006,6 +5465,9 @@
                     <a:bodyPr/>
                     <a:lstStyle/>
                     <a:p>
+                      <a:pPr>
+                        <a:defRPr sz="1200"/>
+                      </a:pPr>
                       <a:r>
                         <a:t>-54</a:t>
                       </a:r>
@@ -5018,6 +5480,9 @@
                     <a:bodyPr/>
                     <a:lstStyle/>
                     <a:p>
+                      <a:pPr>
+                        <a:defRPr sz="1200"/>
+                      </a:pPr>
                       <a:r>
                         <a:t>-62</a:t>
                       </a:r>
@@ -5030,6 +5495,9 @@
                     <a:bodyPr/>
                     <a:lstStyle/>
                     <a:p>
+                      <a:pPr>
+                        <a:defRPr sz="1200"/>
+                      </a:pPr>
                       <a:r>
                         <a:t>-65</a:t>
                       </a:r>
@@ -5044,6 +5512,9 @@
                     <a:bodyPr/>
                     <a:lstStyle/>
                     <a:p>
+                      <a:pPr>
+                        <a:defRPr sz="1200"/>
+                      </a:pPr>
                       <a:r>
                         <a:t>26</a:t>
                       </a:r>
@@ -5056,6 +5527,9 @@
                     <a:bodyPr/>
                     <a:lstStyle/>
                     <a:p>
+                      <a:pPr>
+                        <a:defRPr sz="1200"/>
+                      </a:pPr>
                       <a:r>
                         <a:t>7249141800044</a:t>
                       </a:r>
@@ -5068,6 +5542,9 @@
                     <a:bodyPr/>
                     <a:lstStyle/>
                     <a:p>
+                      <a:pPr>
+                        <a:defRPr sz="1200"/>
+                      </a:pPr>
                       <a:r>
                         <a:t>PASS</a:t>
                       </a:r>
@@ -5080,6 +5557,9 @@
                     <a:bodyPr/>
                     <a:lstStyle/>
                     <a:p>
+                      <a:pPr>
+                        <a:defRPr sz="1200"/>
+                      </a:pPr>
                       <a:r>
                         <a:t>-63</a:t>
                       </a:r>
@@ -5092,6 +5572,9 @@
                     <a:bodyPr/>
                     <a:lstStyle/>
                     <a:p>
+                      <a:pPr>
+                        <a:defRPr sz="1200"/>
+                      </a:pPr>
                       <a:r>
                         <a:t>-64</a:t>
                       </a:r>
@@ -5104,6 +5587,9 @@
                     <a:bodyPr/>
                     <a:lstStyle/>
                     <a:p>
+                      <a:pPr>
+                        <a:defRPr sz="1200"/>
+                      </a:pPr>
                       <a:r>
                         <a:t>-65</a:t>
                       </a:r>
@@ -5118,6 +5604,9 @@
                     <a:bodyPr/>
                     <a:lstStyle/>
                     <a:p>
+                      <a:pPr>
+                        <a:defRPr sz="1200"/>
+                      </a:pPr>
                       <a:r>
                         <a:t>27</a:t>
                       </a:r>
@@ -5130,6 +5619,9 @@
                     <a:bodyPr/>
                     <a:lstStyle/>
                     <a:p>
+                      <a:pPr>
+                        <a:defRPr sz="1200"/>
+                      </a:pPr>
                       <a:r>
                         <a:t>7249141800045</a:t>
                       </a:r>
@@ -5142,6 +5634,9 @@
                     <a:bodyPr/>
                     <a:lstStyle/>
                     <a:p>
+                      <a:pPr>
+                        <a:defRPr sz="1200"/>
+                      </a:pPr>
                       <a:r>
                         <a:t>PASS</a:t>
                       </a:r>
@@ -5154,6 +5649,9 @@
                     <a:bodyPr/>
                     <a:lstStyle/>
                     <a:p>
+                      <a:pPr>
+                        <a:defRPr sz="1200"/>
+                      </a:pPr>
                       <a:r>
                         <a:t>-58</a:t>
                       </a:r>
@@ -5166,6 +5664,9 @@
                     <a:bodyPr/>
                     <a:lstStyle/>
                     <a:p>
+                      <a:pPr>
+                        <a:defRPr sz="1200"/>
+                      </a:pPr>
                       <a:r>
                         <a:t>-55</a:t>
                       </a:r>
@@ -5178,6 +5679,9 @@
                     <a:bodyPr/>
                     <a:lstStyle/>
                     <a:p>
+                      <a:pPr>
+                        <a:defRPr sz="1200"/>
+                      </a:pPr>
                       <a:r>
                         <a:t>-65</a:t>
                       </a:r>
@@ -5192,6 +5696,9 @@
                     <a:bodyPr/>
                     <a:lstStyle/>
                     <a:p>
+                      <a:pPr>
+                        <a:defRPr sz="1200"/>
+                      </a:pPr>
                       <a:r>
                         <a:t>28</a:t>
                       </a:r>
@@ -5204,6 +5711,9 @@
                     <a:bodyPr/>
                     <a:lstStyle/>
                     <a:p>
+                      <a:pPr>
+                        <a:defRPr sz="1200"/>
+                      </a:pPr>
                       <a:r>
                         <a:t>7249141800046</a:t>
                       </a:r>
@@ -5216,6 +5726,9 @@
                     <a:bodyPr/>
                     <a:lstStyle/>
                     <a:p>
+                      <a:pPr>
+                        <a:defRPr sz="1200"/>
+                      </a:pPr>
                       <a:r>
                         <a:t>PASS</a:t>
                       </a:r>
@@ -5228,6 +5741,9 @@
                     <a:bodyPr/>
                     <a:lstStyle/>
                     <a:p>
+                      <a:pPr>
+                        <a:defRPr sz="1200"/>
+                      </a:pPr>
                       <a:r>
                         <a:t>-60</a:t>
                       </a:r>
@@ -5240,6 +5756,9 @@
                     <a:bodyPr/>
                     <a:lstStyle/>
                     <a:p>
+                      <a:pPr>
+                        <a:defRPr sz="1200"/>
+                      </a:pPr>
                       <a:r>
                         <a:t>-64</a:t>
                       </a:r>
@@ -5252,6 +5771,9 @@
                     <a:bodyPr/>
                     <a:lstStyle/>
                     <a:p>
+                      <a:pPr>
+                        <a:defRPr sz="1200"/>
+                      </a:pPr>
                       <a:r>
                         <a:t>-65</a:t>
                       </a:r>
@@ -5266,6 +5788,9 @@
                     <a:bodyPr/>
                     <a:lstStyle/>
                     <a:p>
+                      <a:pPr>
+                        <a:defRPr sz="1200"/>
+                      </a:pPr>
                       <a:r>
                         <a:t>29</a:t>
                       </a:r>
@@ -5278,6 +5803,9 @@
                     <a:bodyPr/>
                     <a:lstStyle/>
                     <a:p>
+                      <a:pPr>
+                        <a:defRPr sz="1200"/>
+                      </a:pPr>
                       <a:r>
                         <a:t>7249141800047</a:t>
                       </a:r>
@@ -5290,6 +5818,9 @@
                     <a:bodyPr/>
                     <a:lstStyle/>
                     <a:p>
+                      <a:pPr>
+                        <a:defRPr sz="1200"/>
+                      </a:pPr>
                       <a:r>
                         <a:t>PASS</a:t>
                       </a:r>
@@ -5302,6 +5833,9 @@
                     <a:bodyPr/>
                     <a:lstStyle/>
                     <a:p>
+                      <a:pPr>
+                        <a:defRPr sz="1200"/>
+                      </a:pPr>
                       <a:r>
                         <a:t>-56</a:t>
                       </a:r>
@@ -5314,6 +5848,9 @@
                     <a:bodyPr/>
                     <a:lstStyle/>
                     <a:p>
+                      <a:pPr>
+                        <a:defRPr sz="1200"/>
+                      </a:pPr>
                       <a:r>
                         <a:t>-49</a:t>
                       </a:r>
@@ -5326,6 +5863,9 @@
                     <a:bodyPr/>
                     <a:lstStyle/>
                     <a:p>
+                      <a:pPr>
+                        <a:defRPr sz="1200"/>
+                      </a:pPr>
                       <a:r>
                         <a:t>-65</a:t>
                       </a:r>

</xml_diff>

<commit_message>
dev formating table font and column width
</commit_message>
<xml_diff>
--- a/pptx/result/report.pptx
+++ b/pptx/result/report.pptx
@@ -3098,7 +3098,7 @@
         </p:nvGraphicFramePr>
         <p:xfrm>
           <a:off x="0" y="0"/>
-          <a:ext cx="4572000" cy="1828800"/>
+          <a:ext cx="6705600" cy="0"/>
         </p:xfrm>
         <a:graphic>
           <a:graphicData uri="http://schemas.openxmlformats.org/drawingml/2006/table">
@@ -3107,14 +3107,14 @@
                 <a:tableStyleId>{5C22544A-7EE6-4342-B048-85BDC9FD1C3A}</a:tableStyleId>
               </a:tblPr>
               <a:tblGrid>
-                <a:gridCol w="762000"/>
-                <a:gridCol w="762000"/>
-                <a:gridCol w="762000"/>
-                <a:gridCol w="762000"/>
-                <a:gridCol w="762000"/>
-                <a:gridCol w="762000"/>
+                <a:gridCol w="609600"/>
+                <a:gridCol w="2743200"/>
+                <a:gridCol w="1676400"/>
+                <a:gridCol w="609600"/>
+                <a:gridCol w="457200"/>
+                <a:gridCol w="609600"/>
               </a:tblGrid>
-              <a:tr h="60960">
+              <a:tr h="0">
                 <a:tc>
                   <a:txBody>
                     <a:bodyPr/>
@@ -3206,7 +3206,7 @@
                   <a:tcPr/>
                 </a:tc>
               </a:tr>
-              <a:tr h="60960">
+              <a:tr h="0">
                 <a:tc>
                   <a:txBody>
                     <a:bodyPr/>
@@ -3298,7 +3298,7 @@
                   <a:tcPr/>
                 </a:tc>
               </a:tr>
-              <a:tr h="60960">
+              <a:tr h="0">
                 <a:tc>
                   <a:txBody>
                     <a:bodyPr/>
@@ -3323,7 +3323,15 @@
                         <a:defRPr sz="1200"/>
                       </a:pPr>
                       <a:r>
-                        <a:t>7249141700003</a:t>
+                        <a:t>sdfsdfsfdsdfsdfsdf</a:t>
+                      </a:r>
+                    </a:p>
+                    <a:p>
+                      <a:pPr>
+                        <a:defRPr sz="1200"/>
+                      </a:pPr>
+                      <a:r>
+                        <a:t>sfsdfsdfsdfsd</a:t>
                       </a:r>
                     </a:p>
                   </a:txBody>
@@ -3390,7 +3398,7 @@
                   <a:tcPr/>
                 </a:tc>
               </a:tr>
-              <a:tr h="60960">
+              <a:tr h="0">
                 <a:tc>
                   <a:txBody>
                     <a:bodyPr/>
@@ -3482,7 +3490,7 @@
                   <a:tcPr/>
                 </a:tc>
               </a:tr>
-              <a:tr h="60960">
+              <a:tr h="0">
                 <a:tc>
                   <a:txBody>
                     <a:bodyPr/>
@@ -3574,7 +3582,7 @@
                   <a:tcPr/>
                 </a:tc>
               </a:tr>
-              <a:tr h="60960">
+              <a:tr h="0">
                 <a:tc>
                   <a:txBody>
                     <a:bodyPr/>
@@ -3666,7 +3674,7 @@
                   <a:tcPr/>
                 </a:tc>
               </a:tr>
-              <a:tr h="60960">
+              <a:tr h="0">
                 <a:tc>
                   <a:txBody>
                     <a:bodyPr/>
@@ -3758,7 +3766,7 @@
                   <a:tcPr/>
                 </a:tc>
               </a:tr>
-              <a:tr h="60960">
+              <a:tr h="0">
                 <a:tc>
                   <a:txBody>
                     <a:bodyPr/>
@@ -3850,7 +3858,7 @@
                   <a:tcPr/>
                 </a:tc>
               </a:tr>
-              <a:tr h="60960">
+              <a:tr h="0">
                 <a:tc>
                   <a:txBody>
                     <a:bodyPr/>
@@ -3942,7 +3950,7 @@
                   <a:tcPr/>
                 </a:tc>
               </a:tr>
-              <a:tr h="60960">
+              <a:tr h="0">
                 <a:tc>
                   <a:txBody>
                     <a:bodyPr/>
@@ -4034,7 +4042,7 @@
                   <a:tcPr/>
                 </a:tc>
               </a:tr>
-              <a:tr h="60960">
+              <a:tr h="0">
                 <a:tc>
                   <a:txBody>
                     <a:bodyPr/>
@@ -4126,7 +4134,7 @@
                   <a:tcPr/>
                 </a:tc>
               </a:tr>
-              <a:tr h="60960">
+              <a:tr h="0">
                 <a:tc>
                   <a:txBody>
                     <a:bodyPr/>
@@ -4218,7 +4226,7 @@
                   <a:tcPr/>
                 </a:tc>
               </a:tr>
-              <a:tr h="60960">
+              <a:tr h="0">
                 <a:tc>
                   <a:txBody>
                     <a:bodyPr/>
@@ -4310,7 +4318,7 @@
                   <a:tcPr/>
                 </a:tc>
               </a:tr>
-              <a:tr h="60960">
+              <a:tr h="0">
                 <a:tc>
                   <a:txBody>
                     <a:bodyPr/>
@@ -4402,7 +4410,7 @@
                   <a:tcPr/>
                 </a:tc>
               </a:tr>
-              <a:tr h="60960">
+              <a:tr h="0">
                 <a:tc>
                   <a:txBody>
                     <a:bodyPr/>
@@ -4494,7 +4502,7 @@
                   <a:tcPr/>
                 </a:tc>
               </a:tr>
-              <a:tr h="60960">
+              <a:tr h="0">
                 <a:tc>
                   <a:txBody>
                     <a:bodyPr/>
@@ -4586,7 +4594,7 @@
                   <a:tcPr/>
                 </a:tc>
               </a:tr>
-              <a:tr h="60960">
+              <a:tr h="0">
                 <a:tc>
                   <a:txBody>
                     <a:bodyPr/>
@@ -4678,7 +4686,7 @@
                   <a:tcPr/>
                 </a:tc>
               </a:tr>
-              <a:tr h="60960">
+              <a:tr h="0">
                 <a:tc>
                   <a:txBody>
                     <a:bodyPr/>
@@ -4770,7 +4778,7 @@
                   <a:tcPr/>
                 </a:tc>
               </a:tr>
-              <a:tr h="60960">
+              <a:tr h="0">
                 <a:tc>
                   <a:txBody>
                     <a:bodyPr/>
@@ -4862,7 +4870,7 @@
                   <a:tcPr/>
                 </a:tc>
               </a:tr>
-              <a:tr h="60960">
+              <a:tr h="0">
                 <a:tc>
                   <a:txBody>
                     <a:bodyPr/>
@@ -4954,7 +4962,7 @@
                   <a:tcPr/>
                 </a:tc>
               </a:tr>
-              <a:tr h="60960">
+              <a:tr h="0">
                 <a:tc>
                   <a:txBody>
                     <a:bodyPr/>
@@ -5046,7 +5054,7 @@
                   <a:tcPr/>
                 </a:tc>
               </a:tr>
-              <a:tr h="60960">
+              <a:tr h="0">
                 <a:tc>
                   <a:txBody>
                     <a:bodyPr/>
@@ -5138,7 +5146,7 @@
                   <a:tcPr/>
                 </a:tc>
               </a:tr>
-              <a:tr h="60960">
+              <a:tr h="0">
                 <a:tc>
                   <a:txBody>
                     <a:bodyPr/>
@@ -5230,7 +5238,7 @@
                   <a:tcPr/>
                 </a:tc>
               </a:tr>
-              <a:tr h="60960">
+              <a:tr h="0">
                 <a:tc>
                   <a:txBody>
                     <a:bodyPr/>
@@ -5322,7 +5330,7 @@
                   <a:tcPr/>
                 </a:tc>
               </a:tr>
-              <a:tr h="60960">
+              <a:tr h="0">
                 <a:tc>
                   <a:txBody>
                     <a:bodyPr/>
@@ -5414,7 +5422,7 @@
                   <a:tcPr/>
                 </a:tc>
               </a:tr>
-              <a:tr h="60960">
+              <a:tr h="0">
                 <a:tc>
                   <a:txBody>
                     <a:bodyPr/>
@@ -5506,7 +5514,7 @@
                   <a:tcPr/>
                 </a:tc>
               </a:tr>
-              <a:tr h="60960">
+              <a:tr h="0">
                 <a:tc>
                   <a:txBody>
                     <a:bodyPr/>
@@ -5598,7 +5606,7 @@
                   <a:tcPr/>
                 </a:tc>
               </a:tr>
-              <a:tr h="60960">
+              <a:tr h="0">
                 <a:tc>
                   <a:txBody>
                     <a:bodyPr/>
@@ -5690,7 +5698,7 @@
                   <a:tcPr/>
                 </a:tc>
               </a:tr>
-              <a:tr h="60960">
+              <a:tr h="0">
                 <a:tc>
                   <a:txBody>
                     <a:bodyPr/>
@@ -5782,7 +5790,7 @@
                   <a:tcPr/>
                 </a:tc>
               </a:tr>
-              <a:tr h="60960">
+              <a:tr h="0">
                 <a:tc>
                   <a:txBody>
                     <a:bodyPr/>

</xml_diff>

<commit_message>
add function to modify cell color
</commit_message>
<xml_diff>
--- a/pptx/result/report.pptx
+++ b/pptx/result/report.pptx
@@ -3235,7 +3235,11 @@
                       </a:r>
                     </a:p>
                   </a:txBody>
-                  <a:tcPr/>
+                  <a:tcPr>
+                    <a:solidFill>
+                      <a:srgbClr val="FF0000"/>
+                    </a:solidFill>
+                  </a:tcPr>
                 </a:tc>
                 <a:tc>
                   <a:txBody>
@@ -3350,7 +3354,11 @@
                       </a:r>
                     </a:p>
                   </a:txBody>
-                  <a:tcPr/>
+                  <a:tcPr>
+                    <a:solidFill>
+                      <a:srgbClr val="FF0000"/>
+                    </a:solidFill>
+                  </a:tcPr>
                 </a:tc>
                 <a:tc>
                   <a:txBody>
@@ -3457,7 +3465,11 @@
                       </a:r>
                     </a:p>
                   </a:txBody>
-                  <a:tcPr/>
+                  <a:tcPr>
+                    <a:solidFill>
+                      <a:srgbClr val="FF0000"/>
+                    </a:solidFill>
+                  </a:tcPr>
                 </a:tc>
                 <a:tc>
                   <a:txBody>
@@ -3472,7 +3484,11 @@
                       </a:r>
                     </a:p>
                   </a:txBody>
-                  <a:tcPr/>
+                  <a:tcPr>
+                    <a:solidFill>
+                      <a:srgbClr val="FF0000"/>
+                    </a:solidFill>
+                  </a:tcPr>
                 </a:tc>
                 <a:tc>
                   <a:txBody>
@@ -3487,7 +3503,11 @@
                       </a:r>
                     </a:p>
                   </a:txBody>
-                  <a:tcPr/>
+                  <a:tcPr>
+                    <a:solidFill>
+                      <a:srgbClr val="FF0000"/>
+                    </a:solidFill>
+                  </a:tcPr>
                 </a:tc>
               </a:tr>
               <a:tr h="0">

</xml_diff>

<commit_message>
add func add_text_to_cel, font_cel , setFont, add class Font
</commit_message>
<xml_diff>
--- a/pptx/result/report.pptx
+++ b/pptx/result/report.pptx
@@ -3132,7 +3132,7 @@
         </p:nvGraphicFramePr>
         <p:xfrm>
           <a:off x="0" y="0"/>
-          <a:ext cx="5943600" cy="0"/>
+          <a:ext cx="7010400" cy="0"/>
         </p:xfrm>
         <a:graphic>
           <a:graphicData uri="http://schemas.openxmlformats.org/drawingml/2006/table">
@@ -3146,7 +3146,7 @@
                 <a:gridCol w="1676400"/>
                 <a:gridCol w="609600"/>
                 <a:gridCol w="457200"/>
-                <a:gridCol w="609600"/>
+                <a:gridCol w="1676400"/>
               </a:tblGrid>
               <a:tr h="0">
                 <a:tc>
@@ -3376,6 +3376,11 @@
                         <a:defRPr sz="1200"/>
                       </a:pPr>
                       <a:r>
+                        <a:rPr>
+                          <a:solidFill>
+                            <a:srgbClr val="00FF00"/>
+                          </a:solidFill>
+                        </a:rPr>
                         <a:t>PASS</a:t>
                       </a:r>
                     </a:p>
@@ -3487,6 +3492,11 @@
                         <a:defRPr sz="1200"/>
                       </a:pPr>
                       <a:r>
+                        <a:rPr>
+                          <a:solidFill>
+                            <a:srgbClr val="00FF00"/>
+                          </a:solidFill>
+                        </a:rPr>
                         <a:t>-52</a:t>
                       </a:r>
                     </a:p>
@@ -3518,6 +3528,14 @@
                       </a:pPr>
                       <a:r>
                         <a:t>-65</a:t>
+                      </a:r>
+                      <a:r>
+                        <a:rPr>
+                          <a:solidFill>
+                            <a:srgbClr val="FFFFFF"/>
+                          </a:solidFill>
+                        </a:rPr>
+                        <a:t>asdfasdf</a:t>
                       </a:r>
                     </a:p>
                   </a:txBody>

</xml_diff>

<commit_message>
update function format_table to resize_table
</commit_message>
<xml_diff>
--- a/pptx/result/report.pptx
+++ b/pptx/result/report.pptx
@@ -3132,7 +3132,7 @@
         </p:nvGraphicFramePr>
         <p:xfrm>
           <a:off x="0" y="0"/>
-          <a:ext cx="7010400" cy="0"/>
+          <a:ext cx="6382000" cy="0"/>
         </p:xfrm>
         <a:graphic>
           <a:graphicData uri="http://schemas.openxmlformats.org/drawingml/2006/table">
@@ -3141,12 +3141,12 @@
                 <a:tableStyleId>{5C22544A-7EE6-4342-B048-85BDC9FD1C3A}</a:tableStyleId>
               </a:tblPr>
               <a:tblGrid>
-                <a:gridCol w="609600"/>
-                <a:gridCol w="1981200"/>
-                <a:gridCol w="1676400"/>
-                <a:gridCol w="609600"/>
-                <a:gridCol w="457200"/>
-                <a:gridCol w="1676400"/>
+                <a:gridCol w="598000"/>
+                <a:gridCol w="1741000"/>
+                <a:gridCol w="1487000"/>
+                <a:gridCol w="598000"/>
+                <a:gridCol w="471000"/>
+                <a:gridCol w="1487000"/>
               </a:tblGrid>
               <a:tr h="0">
                 <a:tc>
@@ -3154,8 +3154,8 @@
                     <a:bodyPr/>
                     <a:lstStyle/>
                     <a:p>
-                      <a:pPr>
-                        <a:defRPr sz="1200"/>
+                      <a:pPr algn="ctr">
+                        <a:defRPr sz="1000"/>
                       </a:pPr>
                       <a:r>
                         <a:t>Item</a:t>
@@ -3169,8 +3169,8 @@
                     <a:bodyPr/>
                     <a:lstStyle/>
                     <a:p>
-                      <a:pPr>
-                        <a:defRPr sz="1200"/>
+                      <a:pPr algn="ctr">
+                        <a:defRPr sz="1000"/>
                       </a:pPr>
                       <a:r>
                         <a:t>UNIT PN</a:t>
@@ -3184,8 +3184,8 @@
                     <a:bodyPr/>
                     <a:lstStyle/>
                     <a:p>
-                      <a:pPr>
-                        <a:defRPr sz="1200"/>
+                      <a:pPr algn="ctr">
+                        <a:defRPr sz="1000"/>
                       </a:pPr>
                       <a:r>
                         <a:t>Test Result</a:t>
@@ -3199,8 +3199,8 @@
                     <a:bodyPr/>
                     <a:lstStyle/>
                     <a:p>
-                      <a:pPr>
-                        <a:defRPr sz="1200"/>
+                      <a:pPr algn="ctr">
+                        <a:defRPr sz="1000"/>
                       </a:pPr>
                       <a:r>
                         <a:t>Main</a:t>
@@ -3214,8 +3214,8 @@
                     <a:bodyPr/>
                     <a:lstStyle/>
                     <a:p>
-                      <a:pPr>
-                        <a:defRPr sz="1200"/>
+                      <a:pPr algn="ctr">
+                        <a:defRPr sz="1000"/>
                       </a:pPr>
                       <a:r>
                         <a:t>Aux</a:t>
@@ -3229,8 +3229,8 @@
                     <a:bodyPr/>
                     <a:lstStyle/>
                     <a:p>
-                      <a:pPr>
-                        <a:defRPr sz="1200"/>
+                      <a:pPr algn="ctr">
+                        <a:defRPr sz="1000"/>
                       </a:pPr>
                       <a:r>
                         <a:t>Spec</a:t>
@@ -3247,7 +3247,7 @@
                     <a:lstStyle/>
                     <a:p>
                       <a:pPr>
-                        <a:defRPr sz="1200"/>
+                        <a:defRPr sz="1000"/>
                       </a:pPr>
                       <a:r>
                         <a:t>1</a:t>
@@ -3262,7 +3262,7 @@
                     <a:lstStyle/>
                     <a:p>
                       <a:pPr>
-                        <a:defRPr sz="1200"/>
+                        <a:defRPr sz="1000"/>
                       </a:pPr>
                       <a:r>
                         <a:t>7249141700002</a:t>
@@ -3281,7 +3281,7 @@
                     <a:lstStyle/>
                     <a:p>
                       <a:pPr>
-                        <a:defRPr sz="1200"/>
+                        <a:defRPr sz="1000"/>
                       </a:pPr>
                       <a:r>
                         <a:t>PASS</a:t>
@@ -3296,7 +3296,7 @@
                     <a:lstStyle/>
                     <a:p>
                       <a:pPr>
-                        <a:defRPr sz="1200"/>
+                        <a:defRPr sz="1000"/>
                       </a:pPr>
                       <a:r>
                         <a:t>-62</a:t>
@@ -3311,7 +3311,7 @@
                     <a:lstStyle/>
                     <a:p>
                       <a:pPr>
-                        <a:defRPr sz="1200"/>
+                        <a:defRPr sz="1000"/>
                       </a:pPr>
                       <a:r>
                         <a:t>-57</a:t>
@@ -3326,7 +3326,7 @@
                     <a:lstStyle/>
                     <a:p>
                       <a:pPr>
-                        <a:defRPr sz="1200"/>
+                        <a:defRPr sz="1000"/>
                       </a:pPr>
                       <a:r>
                         <a:t>-65</a:t>
@@ -3343,7 +3343,7 @@
                     <a:lstStyle/>
                     <a:p>
                       <a:pPr>
-                        <a:defRPr sz="1200"/>
+                        <a:defRPr sz="1000"/>
                       </a:pPr>
                       <a:r>
                         <a:t>2</a:t>
@@ -3358,7 +3358,7 @@
                     <a:lstStyle/>
                     <a:p>
                       <a:pPr>
-                        <a:defRPr sz="1200"/>
+                        <a:defRPr sz="1000"/>
                       </a:pPr>
                       <a:r>
                         <a:t>7249141700003</a:t>
@@ -3373,10 +3373,10 @@
                     <a:lstStyle/>
                     <a:p>
                       <a:pPr>
-                        <a:defRPr sz="1200"/>
-                      </a:pPr>
-                      <a:r>
-                        <a:rPr sz="1200" b="1" i="1">
+                        <a:defRPr sz="1000"/>
+                      </a:pPr>
+                      <a:r>
+                        <a:rPr sz="1000" b="1" i="1">
                           <a:solidFill>
                             <a:srgbClr val="0000FF"/>
                           </a:solidFill>
@@ -3394,7 +3394,7 @@
                     <a:lstStyle/>
                     <a:p>
                       <a:pPr>
-                        <a:defRPr sz="1200"/>
+                        <a:defRPr sz="1000"/>
                       </a:pPr>
                       <a:r>
                         <a:t>-56</a:t>
@@ -3413,7 +3413,7 @@
                     <a:lstStyle/>
                     <a:p>
                       <a:pPr>
-                        <a:defRPr sz="1200"/>
+                        <a:defRPr sz="1000"/>
                       </a:pPr>
                       <a:r>
                         <a:t>-57</a:t>
@@ -3428,7 +3428,7 @@
                     <a:lstStyle/>
                     <a:p>
                       <a:pPr>
-                        <a:defRPr sz="1200"/>
+                        <a:defRPr sz="1000"/>
                       </a:pPr>
                       <a:r>
                         <a:t>-65</a:t>
@@ -3445,7 +3445,7 @@
                     <a:lstStyle/>
                     <a:p>
                       <a:pPr>
-                        <a:defRPr sz="1200"/>
+                        <a:defRPr sz="1000"/>
                       </a:pPr>
                       <a:r>
                         <a:t>3</a:t>
@@ -3460,7 +3460,7 @@
                     <a:lstStyle/>
                     <a:p>
                       <a:pPr>
-                        <a:defRPr sz="1200"/>
+                        <a:defRPr sz="1000"/>
                       </a:pPr>
                       <a:r>
                         <a:t>7249141700005</a:t>
@@ -3475,7 +3475,7 @@
                     <a:lstStyle/>
                     <a:p>
                       <a:pPr>
-                        <a:defRPr sz="1200"/>
+                        <a:defRPr sz="1000"/>
                       </a:pPr>
                       <a:r>
                         <a:t>PASS</a:t>
@@ -3490,10 +3490,10 @@
                     <a:lstStyle/>
                     <a:p>
                       <a:pPr>
-                        <a:defRPr sz="1200"/>
-                      </a:pPr>
-                      <a:r>
-                        <a:rPr sz="1200" b="1" i="1">
+                        <a:defRPr sz="1000"/>
+                      </a:pPr>
+                      <a:r>
+                        <a:rPr sz="1000" b="1" i="1">
                           <a:solidFill>
                             <a:srgbClr val="0000FF"/>
                           </a:solidFill>
@@ -3511,7 +3511,7 @@
                     <a:lstStyle/>
                     <a:p>
                       <a:pPr>
-                        <a:defRPr sz="1200"/>
+                        <a:defRPr sz="1000"/>
                       </a:pPr>
                       <a:r>
                         <a:t>-53</a:t>
@@ -3526,13 +3526,13 @@
                     <a:lstStyle/>
                     <a:p>
                       <a:pPr>
-                        <a:defRPr sz="1200"/>
+                        <a:defRPr sz="1000"/>
                       </a:pPr>
                       <a:r>
                         <a:t>-65</a:t>
                       </a:r>
                       <a:r>
-                        <a:rPr sz="1200" b="1" i="1">
+                        <a:rPr sz="1000" b="1" i="1">
                           <a:solidFill>
                             <a:srgbClr val="0000FF"/>
                           </a:solidFill>
@@ -3552,7 +3552,7 @@
                     <a:lstStyle/>
                     <a:p>
                       <a:pPr>
-                        <a:defRPr sz="1200"/>
+                        <a:defRPr sz="1000"/>
                       </a:pPr>
                       <a:r>
                         <a:t>4</a:t>
@@ -3567,7 +3567,7 @@
                     <a:lstStyle/>
                     <a:p>
                       <a:pPr>
-                        <a:defRPr sz="1200"/>
+                        <a:defRPr sz="1000"/>
                       </a:pPr>
                       <a:r>
                         <a:t>7249141700008</a:t>
@@ -3582,7 +3582,7 @@
                     <a:lstStyle/>
                     <a:p>
                       <a:pPr>
-                        <a:defRPr sz="1200"/>
+                        <a:defRPr sz="1000"/>
                       </a:pPr>
                       <a:r>
                         <a:t>PASS</a:t>
@@ -3597,7 +3597,7 @@
                     <a:lstStyle/>
                     <a:p>
                       <a:pPr>
-                        <a:defRPr sz="1200"/>
+                        <a:defRPr sz="1000"/>
                       </a:pPr>
                       <a:r>
                         <a:t>-52</a:t>
@@ -3612,7 +3612,7 @@
                     <a:lstStyle/>
                     <a:p>
                       <a:pPr>
-                        <a:defRPr sz="1200"/>
+                        <a:defRPr sz="1000"/>
                       </a:pPr>
                       <a:r>
                         <a:t>-53</a:t>
@@ -3627,7 +3627,7 @@
                     <a:lstStyle/>
                     <a:p>
                       <a:pPr>
-                        <a:defRPr sz="1200"/>
+                        <a:defRPr sz="1000"/>
                       </a:pPr>
                       <a:r>
                         <a:t>-65</a:t>
@@ -3644,7 +3644,7 @@
                     <a:lstStyle/>
                     <a:p>
                       <a:pPr>
-                        <a:defRPr sz="1200"/>
+                        <a:defRPr sz="1000"/>
                       </a:pPr>
                       <a:r>
                         <a:t>5</a:t>
@@ -3659,7 +3659,7 @@
                     <a:lstStyle/>
                     <a:p>
                       <a:pPr>
-                        <a:defRPr sz="1200"/>
+                        <a:defRPr sz="1000"/>
                       </a:pPr>
                       <a:r>
                         <a:t>7249141700009</a:t>
@@ -3674,7 +3674,7 @@
                     <a:lstStyle/>
                     <a:p>
                       <a:pPr>
-                        <a:defRPr sz="1200"/>
+                        <a:defRPr sz="1000"/>
                       </a:pPr>
                       <a:r>
                         <a:t>PASS</a:t>
@@ -3689,7 +3689,7 @@
                     <a:lstStyle/>
                     <a:p>
                       <a:pPr>
-                        <a:defRPr sz="1200"/>
+                        <a:defRPr sz="1000"/>
                       </a:pPr>
                       <a:r>
                         <a:t>-45</a:t>
@@ -3704,7 +3704,7 @@
                     <a:lstStyle/>
                     <a:p>
                       <a:pPr>
-                        <a:defRPr sz="1200"/>
+                        <a:defRPr sz="1000"/>
                       </a:pPr>
                       <a:r>
                         <a:t>-52</a:t>
@@ -3719,7 +3719,7 @@
                     <a:lstStyle/>
                     <a:p>
                       <a:pPr>
-                        <a:defRPr sz="1200"/>
+                        <a:defRPr sz="1000"/>
                       </a:pPr>
                       <a:r>
                         <a:t>-65</a:t>
@@ -3736,7 +3736,7 @@
                     <a:lstStyle/>
                     <a:p>
                       <a:pPr>
-                        <a:defRPr sz="1200"/>
+                        <a:defRPr sz="1000"/>
                       </a:pPr>
                       <a:r>
                         <a:t>6</a:t>
@@ -3751,7 +3751,7 @@
                     <a:lstStyle/>
                     <a:p>
                       <a:pPr>
-                        <a:defRPr sz="1200"/>
+                        <a:defRPr sz="1000"/>
                       </a:pPr>
                       <a:r>
                         <a:t>7249141700011</a:t>
@@ -3766,7 +3766,7 @@
                     <a:lstStyle/>
                     <a:p>
                       <a:pPr>
-                        <a:defRPr sz="1200"/>
+                        <a:defRPr sz="1000"/>
                       </a:pPr>
                       <a:r>
                         <a:t>PASS</a:t>
@@ -3781,7 +3781,7 @@
                     <a:lstStyle/>
                     <a:p>
                       <a:pPr>
-                        <a:defRPr sz="1200"/>
+                        <a:defRPr sz="1000"/>
                       </a:pPr>
                       <a:r>
                         <a:t>-62</a:t>
@@ -3796,7 +3796,7 @@
                     <a:lstStyle/>
                     <a:p>
                       <a:pPr>
-                        <a:defRPr sz="1200"/>
+                        <a:defRPr sz="1000"/>
                       </a:pPr>
                       <a:r>
                         <a:t>-56</a:t>
@@ -3811,7 +3811,7 @@
                     <a:lstStyle/>
                     <a:p>
                       <a:pPr>
-                        <a:defRPr sz="1200"/>
+                        <a:defRPr sz="1000"/>
                       </a:pPr>
                       <a:r>
                         <a:t>-65</a:t>
@@ -3828,7 +3828,7 @@
                     <a:lstStyle/>
                     <a:p>
                       <a:pPr>
-                        <a:defRPr sz="1200"/>
+                        <a:defRPr sz="1000"/>
                       </a:pPr>
                       <a:r>
                         <a:t>7</a:t>
@@ -3843,7 +3843,7 @@
                     <a:lstStyle/>
                     <a:p>
                       <a:pPr>
-                        <a:defRPr sz="1200"/>
+                        <a:defRPr sz="1000"/>
                       </a:pPr>
                       <a:r>
                         <a:t>7249141700012</a:t>
@@ -3858,7 +3858,7 @@
                     <a:lstStyle/>
                     <a:p>
                       <a:pPr>
-                        <a:defRPr sz="1200"/>
+                        <a:defRPr sz="1000"/>
                       </a:pPr>
                       <a:r>
                         <a:t>PASS</a:t>
@@ -3873,7 +3873,7 @@
                     <a:lstStyle/>
                     <a:p>
                       <a:pPr>
-                        <a:defRPr sz="1200"/>
+                        <a:defRPr sz="1000"/>
                       </a:pPr>
                       <a:r>
                         <a:t>-61</a:t>
@@ -3888,7 +3888,7 @@
                     <a:lstStyle/>
                     <a:p>
                       <a:pPr>
-                        <a:defRPr sz="1200"/>
+                        <a:defRPr sz="1000"/>
                       </a:pPr>
                       <a:r>
                         <a:t>-61</a:t>
@@ -3903,7 +3903,7 @@
                     <a:lstStyle/>
                     <a:p>
                       <a:pPr>
-                        <a:defRPr sz="1200"/>
+                        <a:defRPr sz="1000"/>
                       </a:pPr>
                       <a:r>
                         <a:t>-65</a:t>
@@ -3920,7 +3920,7 @@
                     <a:lstStyle/>
                     <a:p>
                       <a:pPr>
-                        <a:defRPr sz="1200"/>
+                        <a:defRPr sz="1000"/>
                       </a:pPr>
                       <a:r>
                         <a:t>8</a:t>
@@ -3935,7 +3935,7 @@
                     <a:lstStyle/>
                     <a:p>
                       <a:pPr>
-                        <a:defRPr sz="1200"/>
+                        <a:defRPr sz="1000"/>
                       </a:pPr>
                       <a:r>
                         <a:t>7249141800002</a:t>
@@ -3950,7 +3950,7 @@
                     <a:lstStyle/>
                     <a:p>
                       <a:pPr>
-                        <a:defRPr sz="1200"/>
+                        <a:defRPr sz="1000"/>
                       </a:pPr>
                       <a:r>
                         <a:t>PASS</a:t>
@@ -3965,7 +3965,7 @@
                     <a:lstStyle/>
                     <a:p>
                       <a:pPr>
-                        <a:defRPr sz="1200"/>
+                        <a:defRPr sz="1000"/>
                       </a:pPr>
                       <a:r>
                         <a:t>-64</a:t>
@@ -3980,7 +3980,7 @@
                     <a:lstStyle/>
                     <a:p>
                       <a:pPr>
-                        <a:defRPr sz="1200"/>
+                        <a:defRPr sz="1000"/>
                       </a:pPr>
                       <a:r>
                         <a:t>-65</a:t>
@@ -3995,7 +3995,7 @@
                     <a:lstStyle/>
                     <a:p>
                       <a:pPr>
-                        <a:defRPr sz="1200"/>
+                        <a:defRPr sz="1000"/>
                       </a:pPr>
                       <a:r>
                         <a:t>-65</a:t>
@@ -4012,7 +4012,7 @@
                     <a:lstStyle/>
                     <a:p>
                       <a:pPr>
-                        <a:defRPr sz="1200"/>
+                        <a:defRPr sz="1000"/>
                       </a:pPr>
                       <a:r>
                         <a:t>9</a:t>
@@ -4027,7 +4027,7 @@
                     <a:lstStyle/>
                     <a:p>
                       <a:pPr>
-                        <a:defRPr sz="1200"/>
+                        <a:defRPr sz="1000"/>
                       </a:pPr>
                       <a:r>
                         <a:t>7249141800006</a:t>
@@ -4042,7 +4042,7 @@
                     <a:lstStyle/>
                     <a:p>
                       <a:pPr>
-                        <a:defRPr sz="1200"/>
+                        <a:defRPr sz="1000"/>
                       </a:pPr>
                       <a:r>
                         <a:t>PASS</a:t>
@@ -4057,7 +4057,7 @@
                     <a:lstStyle/>
                     <a:p>
                       <a:pPr>
-                        <a:defRPr sz="1200"/>
+                        <a:defRPr sz="1000"/>
                       </a:pPr>
                       <a:r>
                         <a:t>-64</a:t>
@@ -4072,7 +4072,7 @@
                     <a:lstStyle/>
                     <a:p>
                       <a:pPr>
-                        <a:defRPr sz="1200"/>
+                        <a:defRPr sz="1000"/>
                       </a:pPr>
                       <a:r>
                         <a:t>-59</a:t>
@@ -4087,7 +4087,7 @@
                     <a:lstStyle/>
                     <a:p>
                       <a:pPr>
-                        <a:defRPr sz="1200"/>
+                        <a:defRPr sz="1000"/>
                       </a:pPr>
                       <a:r>
                         <a:t>-65</a:t>
@@ -4104,7 +4104,7 @@
                     <a:lstStyle/>
                     <a:p>
                       <a:pPr>
-                        <a:defRPr sz="1200"/>
+                        <a:defRPr sz="1000"/>
                       </a:pPr>
                       <a:r>
                         <a:t>10</a:t>
@@ -4119,7 +4119,7 @@
                     <a:lstStyle/>
                     <a:p>
                       <a:pPr>
-                        <a:defRPr sz="1200"/>
+                        <a:defRPr sz="1000"/>
                       </a:pPr>
                       <a:r>
                         <a:t>7249141800012</a:t>
@@ -4134,7 +4134,7 @@
                     <a:lstStyle/>
                     <a:p>
                       <a:pPr>
-                        <a:defRPr sz="1200"/>
+                        <a:defRPr sz="1000"/>
                       </a:pPr>
                       <a:r>
                         <a:t>PASS</a:t>
@@ -4149,7 +4149,7 @@
                     <a:lstStyle/>
                     <a:p>
                       <a:pPr>
-                        <a:defRPr sz="1200"/>
+                        <a:defRPr sz="1000"/>
                       </a:pPr>
                       <a:r>
                         <a:t>-60</a:t>
@@ -4164,7 +4164,7 @@
                     <a:lstStyle/>
                     <a:p>
                       <a:pPr>
-                        <a:defRPr sz="1200"/>
+                        <a:defRPr sz="1000"/>
                       </a:pPr>
                       <a:r>
                         <a:t>-65</a:t>
@@ -4179,7 +4179,7 @@
                     <a:lstStyle/>
                     <a:p>
                       <a:pPr>
-                        <a:defRPr sz="1200"/>
+                        <a:defRPr sz="1000"/>
                       </a:pPr>
                       <a:r>
                         <a:t>-65</a:t>
@@ -4196,7 +4196,7 @@
                     <a:lstStyle/>
                     <a:p>
                       <a:pPr>
-                        <a:defRPr sz="1200"/>
+                        <a:defRPr sz="1000"/>
                       </a:pPr>
                       <a:r>
                         <a:t>11</a:t>
@@ -4211,7 +4211,7 @@
                     <a:lstStyle/>
                     <a:p>
                       <a:pPr>
-                        <a:defRPr sz="1200"/>
+                        <a:defRPr sz="1000"/>
                       </a:pPr>
                       <a:r>
                         <a:t>7249141800014</a:t>
@@ -4226,7 +4226,7 @@
                     <a:lstStyle/>
                     <a:p>
                       <a:pPr>
-                        <a:defRPr sz="1200"/>
+                        <a:defRPr sz="1000"/>
                       </a:pPr>
                       <a:r>
                         <a:t>PASS</a:t>
@@ -4241,7 +4241,7 @@
                     <a:lstStyle/>
                     <a:p>
                       <a:pPr>
-                        <a:defRPr sz="1200"/>
+                        <a:defRPr sz="1000"/>
                       </a:pPr>
                       <a:r>
                         <a:t>-54</a:t>
@@ -4256,7 +4256,7 @@
                     <a:lstStyle/>
                     <a:p>
                       <a:pPr>
-                        <a:defRPr sz="1200"/>
+                        <a:defRPr sz="1000"/>
                       </a:pPr>
                       <a:r>
                         <a:t>-59</a:t>
@@ -4271,7 +4271,7 @@
                     <a:lstStyle/>
                     <a:p>
                       <a:pPr>
-                        <a:defRPr sz="1200"/>
+                        <a:defRPr sz="1000"/>
                       </a:pPr>
                       <a:r>
                         <a:t>-65</a:t>
@@ -4288,7 +4288,7 @@
                     <a:lstStyle/>
                     <a:p>
                       <a:pPr>
-                        <a:defRPr sz="1200"/>
+                        <a:defRPr sz="1000"/>
                       </a:pPr>
                       <a:r>
                         <a:t>12</a:t>
@@ -4303,7 +4303,7 @@
                     <a:lstStyle/>
                     <a:p>
                       <a:pPr>
-                        <a:defRPr sz="1200"/>
+                        <a:defRPr sz="1000"/>
                       </a:pPr>
                       <a:r>
                         <a:t>7249141800017</a:t>
@@ -4318,7 +4318,7 @@
                     <a:lstStyle/>
                     <a:p>
                       <a:pPr>
-                        <a:defRPr sz="1200"/>
+                        <a:defRPr sz="1000"/>
                       </a:pPr>
                       <a:r>
                         <a:t>PASS</a:t>
@@ -4333,7 +4333,7 @@
                     <a:lstStyle/>
                     <a:p>
                       <a:pPr>
-                        <a:defRPr sz="1200"/>
+                        <a:defRPr sz="1000"/>
                       </a:pPr>
                       <a:r>
                         <a:t>-55</a:t>
@@ -4348,7 +4348,7 @@
                     <a:lstStyle/>
                     <a:p>
                       <a:pPr>
-                        <a:defRPr sz="1200"/>
+                        <a:defRPr sz="1000"/>
                       </a:pPr>
                       <a:r>
                         <a:t>-57</a:t>
@@ -4363,7 +4363,7 @@
                     <a:lstStyle/>
                     <a:p>
                       <a:pPr>
-                        <a:defRPr sz="1200"/>
+                        <a:defRPr sz="1000"/>
                       </a:pPr>
                       <a:r>
                         <a:t>-65</a:t>
@@ -4380,7 +4380,7 @@
                     <a:lstStyle/>
                     <a:p>
                       <a:pPr>
-                        <a:defRPr sz="1200"/>
+                        <a:defRPr sz="1000"/>
                       </a:pPr>
                       <a:r>
                         <a:t>13</a:t>
@@ -4395,7 +4395,7 @@
                     <a:lstStyle/>
                     <a:p>
                       <a:pPr>
-                        <a:defRPr sz="1200"/>
+                        <a:defRPr sz="1000"/>
                       </a:pPr>
                       <a:r>
                         <a:t>7249141800018</a:t>
@@ -4410,7 +4410,7 @@
                     <a:lstStyle/>
                     <a:p>
                       <a:pPr>
-                        <a:defRPr sz="1200"/>
+                        <a:defRPr sz="1000"/>
                       </a:pPr>
                       <a:r>
                         <a:t>PASS</a:t>
@@ -4425,7 +4425,7 @@
                     <a:lstStyle/>
                     <a:p>
                       <a:pPr>
-                        <a:defRPr sz="1200"/>
+                        <a:defRPr sz="1000"/>
                       </a:pPr>
                       <a:r>
                         <a:t>-64</a:t>
@@ -4440,7 +4440,7 @@
                     <a:lstStyle/>
                     <a:p>
                       <a:pPr>
-                        <a:defRPr sz="1200"/>
+                        <a:defRPr sz="1000"/>
                       </a:pPr>
                       <a:r>
                         <a:t>-55</a:t>
@@ -4455,7 +4455,7 @@
                     <a:lstStyle/>
                     <a:p>
                       <a:pPr>
-                        <a:defRPr sz="1200"/>
+                        <a:defRPr sz="1000"/>
                       </a:pPr>
                       <a:r>
                         <a:t>-65</a:t>
@@ -4472,7 +4472,7 @@
                     <a:lstStyle/>
                     <a:p>
                       <a:pPr>
-                        <a:defRPr sz="1200"/>
+                        <a:defRPr sz="1000"/>
                       </a:pPr>
                       <a:r>
                         <a:t>14</a:t>
@@ -4487,7 +4487,7 @@
                     <a:lstStyle/>
                     <a:p>
                       <a:pPr>
-                        <a:defRPr sz="1200"/>
+                        <a:defRPr sz="1000"/>
                       </a:pPr>
                       <a:r>
                         <a:t>7249141800020</a:t>
@@ -4502,7 +4502,7 @@
                     <a:lstStyle/>
                     <a:p>
                       <a:pPr>
-                        <a:defRPr sz="1200"/>
+                        <a:defRPr sz="1000"/>
                       </a:pPr>
                       <a:r>
                         <a:t>PASS</a:t>
@@ -4517,7 +4517,7 @@
                     <a:lstStyle/>
                     <a:p>
                       <a:pPr>
-                        <a:defRPr sz="1200"/>
+                        <a:defRPr sz="1000"/>
                       </a:pPr>
                       <a:r>
                         <a:t>-54</a:t>
@@ -4532,7 +4532,7 @@
                     <a:lstStyle/>
                     <a:p>
                       <a:pPr>
-                        <a:defRPr sz="1200"/>
+                        <a:defRPr sz="1000"/>
                       </a:pPr>
                       <a:r>
                         <a:t>-60</a:t>
@@ -4547,7 +4547,7 @@
                     <a:lstStyle/>
                     <a:p>
                       <a:pPr>
-                        <a:defRPr sz="1200"/>
+                        <a:defRPr sz="1000"/>
                       </a:pPr>
                       <a:r>
                         <a:t>-65</a:t>
@@ -4564,7 +4564,7 @@
                     <a:lstStyle/>
                     <a:p>
                       <a:pPr>
-                        <a:defRPr sz="1200"/>
+                        <a:defRPr sz="1000"/>
                       </a:pPr>
                       <a:r>
                         <a:t>15</a:t>
@@ -4579,7 +4579,7 @@
                     <a:lstStyle/>
                     <a:p>
                       <a:pPr>
-                        <a:defRPr sz="1200"/>
+                        <a:defRPr sz="1000"/>
                       </a:pPr>
                       <a:r>
                         <a:t>7249141800021</a:t>
@@ -4594,7 +4594,7 @@
                     <a:lstStyle/>
                     <a:p>
                       <a:pPr>
-                        <a:defRPr sz="1200"/>
+                        <a:defRPr sz="1000"/>
                       </a:pPr>
                       <a:r>
                         <a:t>PASS</a:t>
@@ -4609,7 +4609,7 @@
                     <a:lstStyle/>
                     <a:p>
                       <a:pPr>
-                        <a:defRPr sz="1200"/>
+                        <a:defRPr sz="1000"/>
                       </a:pPr>
                       <a:r>
                         <a:t>-62</a:t>
@@ -4624,7 +4624,7 @@
                     <a:lstStyle/>
                     <a:p>
                       <a:pPr>
-                        <a:defRPr sz="1200"/>
+                        <a:defRPr sz="1000"/>
                       </a:pPr>
                       <a:r>
                         <a:t>-63</a:t>
@@ -4639,7 +4639,7 @@
                     <a:lstStyle/>
                     <a:p>
                       <a:pPr>
-                        <a:defRPr sz="1200"/>
+                        <a:defRPr sz="1000"/>
                       </a:pPr>
                       <a:r>
                         <a:t>-65</a:t>
@@ -4656,7 +4656,7 @@
                     <a:lstStyle/>
                     <a:p>
                       <a:pPr>
-                        <a:defRPr sz="1200"/>
+                        <a:defRPr sz="1000"/>
                       </a:pPr>
                       <a:r>
                         <a:t>16</a:t>
@@ -4671,7 +4671,7 @@
                     <a:lstStyle/>
                     <a:p>
                       <a:pPr>
-                        <a:defRPr sz="1200"/>
+                        <a:defRPr sz="1000"/>
                       </a:pPr>
                       <a:r>
                         <a:t>7249141800023</a:t>
@@ -4686,7 +4686,7 @@
                     <a:lstStyle/>
                     <a:p>
                       <a:pPr>
-                        <a:defRPr sz="1200"/>
+                        <a:defRPr sz="1000"/>
                       </a:pPr>
                       <a:r>
                         <a:t>PASS</a:t>
@@ -4701,7 +4701,7 @@
                     <a:lstStyle/>
                     <a:p>
                       <a:pPr>
-                        <a:defRPr sz="1200"/>
+                        <a:defRPr sz="1000"/>
                       </a:pPr>
                       <a:r>
                         <a:t>-55</a:t>
@@ -4716,7 +4716,7 @@
                     <a:lstStyle/>
                     <a:p>
                       <a:pPr>
-                        <a:defRPr sz="1200"/>
+                        <a:defRPr sz="1000"/>
                       </a:pPr>
                       <a:r>
                         <a:t>-60</a:t>
@@ -4731,7 +4731,7 @@
                     <a:lstStyle/>
                     <a:p>
                       <a:pPr>
-                        <a:defRPr sz="1200"/>
+                        <a:defRPr sz="1000"/>
                       </a:pPr>
                       <a:r>
                         <a:t>-65</a:t>
@@ -4748,7 +4748,7 @@
                     <a:lstStyle/>
                     <a:p>
                       <a:pPr>
-                        <a:defRPr sz="1200"/>
+                        <a:defRPr sz="1000"/>
                       </a:pPr>
                       <a:r>
                         <a:t>17</a:t>
@@ -4763,7 +4763,7 @@
                     <a:lstStyle/>
                     <a:p>
                       <a:pPr>
-                        <a:defRPr sz="1200"/>
+                        <a:defRPr sz="1000"/>
                       </a:pPr>
                       <a:r>
                         <a:t>7249141800024</a:t>
@@ -4778,7 +4778,7 @@
                     <a:lstStyle/>
                     <a:p>
                       <a:pPr>
-                        <a:defRPr sz="1200"/>
+                        <a:defRPr sz="1000"/>
                       </a:pPr>
                       <a:r>
                         <a:t>PASS</a:t>
@@ -4793,7 +4793,7 @@
                     <a:lstStyle/>
                     <a:p>
                       <a:pPr>
-                        <a:defRPr sz="1200"/>
+                        <a:defRPr sz="1000"/>
                       </a:pPr>
                       <a:r>
                         <a:t>-54</a:t>
@@ -4808,7 +4808,7 @@
                     <a:lstStyle/>
                     <a:p>
                       <a:pPr>
-                        <a:defRPr sz="1200"/>
+                        <a:defRPr sz="1000"/>
                       </a:pPr>
                       <a:r>
                         <a:t>-52</a:t>
@@ -4823,7 +4823,7 @@
                     <a:lstStyle/>
                     <a:p>
                       <a:pPr>
-                        <a:defRPr sz="1200"/>
+                        <a:defRPr sz="1000"/>
                       </a:pPr>
                       <a:r>
                         <a:t>-65</a:t>
@@ -4840,7 +4840,7 @@
                     <a:lstStyle/>
                     <a:p>
                       <a:pPr>
-                        <a:defRPr sz="1200"/>
+                        <a:defRPr sz="1000"/>
                       </a:pPr>
                       <a:r>
                         <a:t>18</a:t>
@@ -4855,7 +4855,7 @@
                     <a:lstStyle/>
                     <a:p>
                       <a:pPr>
-                        <a:defRPr sz="1200"/>
+                        <a:defRPr sz="1000"/>
                       </a:pPr>
                       <a:r>
                         <a:t>7249141800028</a:t>
@@ -4870,7 +4870,7 @@
                     <a:lstStyle/>
                     <a:p>
                       <a:pPr>
-                        <a:defRPr sz="1200"/>
+                        <a:defRPr sz="1000"/>
                       </a:pPr>
                       <a:r>
                         <a:t>PASS</a:t>
@@ -4885,7 +4885,7 @@
                     <a:lstStyle/>
                     <a:p>
                       <a:pPr>
-                        <a:defRPr sz="1200"/>
+                        <a:defRPr sz="1000"/>
                       </a:pPr>
                       <a:r>
                         <a:t>-48</a:t>
@@ -4900,7 +4900,7 @@
                     <a:lstStyle/>
                     <a:p>
                       <a:pPr>
-                        <a:defRPr sz="1200"/>
+                        <a:defRPr sz="1000"/>
                       </a:pPr>
                       <a:r>
                         <a:t>-54</a:t>
@@ -4915,7 +4915,7 @@
                     <a:lstStyle/>
                     <a:p>
                       <a:pPr>
-                        <a:defRPr sz="1200"/>
+                        <a:defRPr sz="1000"/>
                       </a:pPr>
                       <a:r>
                         <a:t>-65</a:t>
@@ -4932,7 +4932,7 @@
                     <a:lstStyle/>
                     <a:p>
                       <a:pPr>
-                        <a:defRPr sz="1200"/>
+                        <a:defRPr sz="1000"/>
                       </a:pPr>
                       <a:r>
                         <a:t>19</a:t>
@@ -4947,7 +4947,7 @@
                     <a:lstStyle/>
                     <a:p>
                       <a:pPr>
-                        <a:defRPr sz="1200"/>
+                        <a:defRPr sz="1000"/>
                       </a:pPr>
                       <a:r>
                         <a:t>7249141800029</a:t>
@@ -4962,7 +4962,7 @@
                     <a:lstStyle/>
                     <a:p>
                       <a:pPr>
-                        <a:defRPr sz="1200"/>
+                        <a:defRPr sz="1000"/>
                       </a:pPr>
                       <a:r>
                         <a:t>PASS</a:t>
@@ -4977,7 +4977,7 @@
                     <a:lstStyle/>
                     <a:p>
                       <a:pPr>
-                        <a:defRPr sz="1200"/>
+                        <a:defRPr sz="1000"/>
                       </a:pPr>
                       <a:r>
                         <a:t>-65</a:t>
@@ -4992,7 +4992,7 @@
                     <a:lstStyle/>
                     <a:p>
                       <a:pPr>
-                        <a:defRPr sz="1200"/>
+                        <a:defRPr sz="1000"/>
                       </a:pPr>
                       <a:r>
                         <a:t>-63</a:t>
@@ -5007,7 +5007,7 @@
                     <a:lstStyle/>
                     <a:p>
                       <a:pPr>
-                        <a:defRPr sz="1200"/>
+                        <a:defRPr sz="1000"/>
                       </a:pPr>
                       <a:r>
                         <a:t>-65</a:t>
@@ -5024,7 +5024,7 @@
                     <a:lstStyle/>
                     <a:p>
                       <a:pPr>
-                        <a:defRPr sz="1200"/>
+                        <a:defRPr sz="1000"/>
                       </a:pPr>
                       <a:r>
                         <a:t>20</a:t>
@@ -5039,7 +5039,7 @@
                     <a:lstStyle/>
                     <a:p>
                       <a:pPr>
-                        <a:defRPr sz="1200"/>
+                        <a:defRPr sz="1000"/>
                       </a:pPr>
                       <a:r>
                         <a:t>7249141800031</a:t>
@@ -5054,7 +5054,7 @@
                     <a:lstStyle/>
                     <a:p>
                       <a:pPr>
-                        <a:defRPr sz="1200"/>
+                        <a:defRPr sz="1000"/>
                       </a:pPr>
                       <a:r>
                         <a:t>PASS</a:t>
@@ -5069,7 +5069,7 @@
                     <a:lstStyle/>
                     <a:p>
                       <a:pPr>
-                        <a:defRPr sz="1200"/>
+                        <a:defRPr sz="1000"/>
                       </a:pPr>
                       <a:r>
                         <a:t>-64</a:t>
@@ -5084,7 +5084,7 @@
                     <a:lstStyle/>
                     <a:p>
                       <a:pPr>
-                        <a:defRPr sz="1200"/>
+                        <a:defRPr sz="1000"/>
                       </a:pPr>
                       <a:r>
                         <a:t>-52</a:t>
@@ -5099,7 +5099,7 @@
                     <a:lstStyle/>
                     <a:p>
                       <a:pPr>
-                        <a:defRPr sz="1200"/>
+                        <a:defRPr sz="1000"/>
                       </a:pPr>
                       <a:r>
                         <a:t>-65</a:t>
@@ -5116,7 +5116,7 @@
                     <a:lstStyle/>
                     <a:p>
                       <a:pPr>
-                        <a:defRPr sz="1200"/>
+                        <a:defRPr sz="1000"/>
                       </a:pPr>
                       <a:r>
                         <a:t>21</a:t>
@@ -5131,7 +5131,7 @@
                     <a:lstStyle/>
                     <a:p>
                       <a:pPr>
-                        <a:defRPr sz="1200"/>
+                        <a:defRPr sz="1000"/>
                       </a:pPr>
                       <a:r>
                         <a:t>7249141800033</a:t>
@@ -5146,7 +5146,7 @@
                     <a:lstStyle/>
                     <a:p>
                       <a:pPr>
-                        <a:defRPr sz="1200"/>
+                        <a:defRPr sz="1000"/>
                       </a:pPr>
                       <a:r>
                         <a:t>PASS</a:t>
@@ -5161,7 +5161,7 @@
                     <a:lstStyle/>
                     <a:p>
                       <a:pPr>
-                        <a:defRPr sz="1200"/>
+                        <a:defRPr sz="1000"/>
                       </a:pPr>
                       <a:r>
                         <a:t>-59</a:t>
@@ -5176,7 +5176,7 @@
                     <a:lstStyle/>
                     <a:p>
                       <a:pPr>
-                        <a:defRPr sz="1200"/>
+                        <a:defRPr sz="1000"/>
                       </a:pPr>
                       <a:r>
                         <a:t>-59</a:t>
@@ -5191,7 +5191,7 @@
                     <a:lstStyle/>
                     <a:p>
                       <a:pPr>
-                        <a:defRPr sz="1200"/>
+                        <a:defRPr sz="1000"/>
                       </a:pPr>
                       <a:r>
                         <a:t>-65</a:t>
@@ -5208,7 +5208,7 @@
                     <a:lstStyle/>
                     <a:p>
                       <a:pPr>
-                        <a:defRPr sz="1200"/>
+                        <a:defRPr sz="1000"/>
                       </a:pPr>
                       <a:r>
                         <a:t>22</a:t>
@@ -5223,7 +5223,7 @@
                     <a:lstStyle/>
                     <a:p>
                       <a:pPr>
-                        <a:defRPr sz="1200"/>
+                        <a:defRPr sz="1000"/>
                       </a:pPr>
                       <a:r>
                         <a:t>7249141800036</a:t>
@@ -5238,7 +5238,7 @@
                     <a:lstStyle/>
                     <a:p>
                       <a:pPr>
-                        <a:defRPr sz="1200"/>
+                        <a:defRPr sz="1000"/>
                       </a:pPr>
                       <a:r>
                         <a:t>PASS</a:t>
@@ -5253,7 +5253,7 @@
                     <a:lstStyle/>
                     <a:p>
                       <a:pPr>
-                        <a:defRPr sz="1200"/>
+                        <a:defRPr sz="1000"/>
                       </a:pPr>
                       <a:r>
                         <a:t>-58</a:t>
@@ -5268,7 +5268,7 @@
                     <a:lstStyle/>
                     <a:p>
                       <a:pPr>
-                        <a:defRPr sz="1200"/>
+                        <a:defRPr sz="1000"/>
                       </a:pPr>
                       <a:r>
                         <a:t>-64</a:t>
@@ -5283,7 +5283,7 @@
                     <a:lstStyle/>
                     <a:p>
                       <a:pPr>
-                        <a:defRPr sz="1200"/>
+                        <a:defRPr sz="1000"/>
                       </a:pPr>
                       <a:r>
                         <a:t>-65</a:t>
@@ -5300,7 +5300,7 @@
                     <a:lstStyle/>
                     <a:p>
                       <a:pPr>
-                        <a:defRPr sz="1200"/>
+                        <a:defRPr sz="1000"/>
                       </a:pPr>
                       <a:r>
                         <a:t>23</a:t>
@@ -5315,7 +5315,7 @@
                     <a:lstStyle/>
                     <a:p>
                       <a:pPr>
-                        <a:defRPr sz="1200"/>
+                        <a:defRPr sz="1000"/>
                       </a:pPr>
                       <a:r>
                         <a:t>7249141800037</a:t>
@@ -5330,7 +5330,7 @@
                     <a:lstStyle/>
                     <a:p>
                       <a:pPr>
-                        <a:defRPr sz="1200"/>
+                        <a:defRPr sz="1000"/>
                       </a:pPr>
                       <a:r>
                         <a:t>PASS</a:t>
@@ -5345,7 +5345,7 @@
                     <a:lstStyle/>
                     <a:p>
                       <a:pPr>
-                        <a:defRPr sz="1200"/>
+                        <a:defRPr sz="1000"/>
                       </a:pPr>
                       <a:r>
                         <a:t>-43</a:t>
@@ -5360,7 +5360,7 @@
                     <a:lstStyle/>
                     <a:p>
                       <a:pPr>
-                        <a:defRPr sz="1200"/>
+                        <a:defRPr sz="1000"/>
                       </a:pPr>
                       <a:r>
                         <a:t>-46</a:t>
@@ -5375,7 +5375,7 @@
                     <a:lstStyle/>
                     <a:p>
                       <a:pPr>
-                        <a:defRPr sz="1200"/>
+                        <a:defRPr sz="1000"/>
                       </a:pPr>
                       <a:r>
                         <a:t>-65</a:t>
@@ -5392,7 +5392,7 @@
                     <a:lstStyle/>
                     <a:p>
                       <a:pPr>
-                        <a:defRPr sz="1200"/>
+                        <a:defRPr sz="1000"/>
                       </a:pPr>
                       <a:r>
                         <a:t>24</a:t>
@@ -5407,7 +5407,7 @@
                     <a:lstStyle/>
                     <a:p>
                       <a:pPr>
-                        <a:defRPr sz="1200"/>
+                        <a:defRPr sz="1000"/>
                       </a:pPr>
                       <a:r>
                         <a:t>7249141800038</a:t>
@@ -5422,7 +5422,7 @@
                     <a:lstStyle/>
                     <a:p>
                       <a:pPr>
-                        <a:defRPr sz="1200"/>
+                        <a:defRPr sz="1000"/>
                       </a:pPr>
                       <a:r>
                         <a:t>PASS</a:t>
@@ -5437,7 +5437,7 @@
                     <a:lstStyle/>
                     <a:p>
                       <a:pPr>
-                        <a:defRPr sz="1200"/>
+                        <a:defRPr sz="1000"/>
                       </a:pPr>
                       <a:r>
                         <a:t>-54</a:t>
@@ -5452,7 +5452,7 @@
                     <a:lstStyle/>
                     <a:p>
                       <a:pPr>
-                        <a:defRPr sz="1200"/>
+                        <a:defRPr sz="1000"/>
                       </a:pPr>
                       <a:r>
                         <a:t>-49</a:t>
@@ -5467,7 +5467,7 @@
                     <a:lstStyle/>
                     <a:p>
                       <a:pPr>
-                        <a:defRPr sz="1200"/>
+                        <a:defRPr sz="1000"/>
                       </a:pPr>
                       <a:r>
                         <a:t>-65</a:t>
@@ -5484,7 +5484,7 @@
                     <a:lstStyle/>
                     <a:p>
                       <a:pPr>
-                        <a:defRPr sz="1200"/>
+                        <a:defRPr sz="1000"/>
                       </a:pPr>
                       <a:r>
                         <a:t>25</a:t>
@@ -5499,7 +5499,7 @@
                     <a:lstStyle/>
                     <a:p>
                       <a:pPr>
-                        <a:defRPr sz="1200"/>
+                        <a:defRPr sz="1000"/>
                       </a:pPr>
                       <a:r>
                         <a:t>7249141800042</a:t>
@@ -5514,7 +5514,7 @@
                     <a:lstStyle/>
                     <a:p>
                       <a:pPr>
-                        <a:defRPr sz="1200"/>
+                        <a:defRPr sz="1000"/>
                       </a:pPr>
                       <a:r>
                         <a:t>PASS</a:t>
@@ -5529,7 +5529,7 @@
                     <a:lstStyle/>
                     <a:p>
                       <a:pPr>
-                        <a:defRPr sz="1200"/>
+                        <a:defRPr sz="1000"/>
                       </a:pPr>
                       <a:r>
                         <a:t>-54</a:t>
@@ -5544,7 +5544,7 @@
                     <a:lstStyle/>
                     <a:p>
                       <a:pPr>
-                        <a:defRPr sz="1200"/>
+                        <a:defRPr sz="1000"/>
                       </a:pPr>
                       <a:r>
                         <a:t>-62</a:t>
@@ -5559,7 +5559,7 @@
                     <a:lstStyle/>
                     <a:p>
                       <a:pPr>
-                        <a:defRPr sz="1200"/>
+                        <a:defRPr sz="1000"/>
                       </a:pPr>
                       <a:r>
                         <a:t>-65</a:t>
@@ -5576,7 +5576,7 @@
                     <a:lstStyle/>
                     <a:p>
                       <a:pPr>
-                        <a:defRPr sz="1200"/>
+                        <a:defRPr sz="1000"/>
                       </a:pPr>
                       <a:r>
                         <a:t>26</a:t>
@@ -5591,7 +5591,7 @@
                     <a:lstStyle/>
                     <a:p>
                       <a:pPr>
-                        <a:defRPr sz="1200"/>
+                        <a:defRPr sz="1000"/>
                       </a:pPr>
                       <a:r>
                         <a:t>7249141800044</a:t>
@@ -5606,7 +5606,7 @@
                     <a:lstStyle/>
                     <a:p>
                       <a:pPr>
-                        <a:defRPr sz="1200"/>
+                        <a:defRPr sz="1000"/>
                       </a:pPr>
                       <a:r>
                         <a:t>PASS</a:t>
@@ -5621,7 +5621,7 @@
                     <a:lstStyle/>
                     <a:p>
                       <a:pPr>
-                        <a:defRPr sz="1200"/>
+                        <a:defRPr sz="1000"/>
                       </a:pPr>
                       <a:r>
                         <a:t>-63</a:t>
@@ -5636,7 +5636,7 @@
                     <a:lstStyle/>
                     <a:p>
                       <a:pPr>
-                        <a:defRPr sz="1200"/>
+                        <a:defRPr sz="1000"/>
                       </a:pPr>
                       <a:r>
                         <a:t>-64</a:t>
@@ -5651,7 +5651,7 @@
                     <a:lstStyle/>
                     <a:p>
                       <a:pPr>
-                        <a:defRPr sz="1200"/>
+                        <a:defRPr sz="1000"/>
                       </a:pPr>
                       <a:r>
                         <a:t>-65</a:t>
@@ -5668,7 +5668,7 @@
                     <a:lstStyle/>
                     <a:p>
                       <a:pPr>
-                        <a:defRPr sz="1200"/>
+                        <a:defRPr sz="1000"/>
                       </a:pPr>
                       <a:r>
                         <a:t>27</a:t>
@@ -5683,7 +5683,7 @@
                     <a:lstStyle/>
                     <a:p>
                       <a:pPr>
-                        <a:defRPr sz="1200"/>
+                        <a:defRPr sz="1000"/>
                       </a:pPr>
                       <a:r>
                         <a:t>7249141800045</a:t>
@@ -5698,7 +5698,7 @@
                     <a:lstStyle/>
                     <a:p>
                       <a:pPr>
-                        <a:defRPr sz="1200"/>
+                        <a:defRPr sz="1000"/>
                       </a:pPr>
                       <a:r>
                         <a:t>PASS</a:t>
@@ -5713,7 +5713,7 @@
                     <a:lstStyle/>
                     <a:p>
                       <a:pPr>
-                        <a:defRPr sz="1200"/>
+                        <a:defRPr sz="1000"/>
                       </a:pPr>
                       <a:r>
                         <a:t>-58</a:t>
@@ -5728,7 +5728,7 @@
                     <a:lstStyle/>
                     <a:p>
                       <a:pPr>
-                        <a:defRPr sz="1200"/>
+                        <a:defRPr sz="1000"/>
                       </a:pPr>
                       <a:r>
                         <a:t>-55</a:t>
@@ -5743,7 +5743,7 @@
                     <a:lstStyle/>
                     <a:p>
                       <a:pPr>
-                        <a:defRPr sz="1200"/>
+                        <a:defRPr sz="1000"/>
                       </a:pPr>
                       <a:r>
                         <a:t>-65</a:t>
@@ -5760,7 +5760,7 @@
                     <a:lstStyle/>
                     <a:p>
                       <a:pPr>
-                        <a:defRPr sz="1200"/>
+                        <a:defRPr sz="1000"/>
                       </a:pPr>
                       <a:r>
                         <a:t>28</a:t>
@@ -5775,7 +5775,7 @@
                     <a:lstStyle/>
                     <a:p>
                       <a:pPr>
-                        <a:defRPr sz="1200"/>
+                        <a:defRPr sz="1000"/>
                       </a:pPr>
                       <a:r>
                         <a:t>7249141800046</a:t>
@@ -5790,7 +5790,7 @@
                     <a:lstStyle/>
                     <a:p>
                       <a:pPr>
-                        <a:defRPr sz="1200"/>
+                        <a:defRPr sz="1000"/>
                       </a:pPr>
                       <a:r>
                         <a:t>PASS</a:t>
@@ -5805,7 +5805,7 @@
                     <a:lstStyle/>
                     <a:p>
                       <a:pPr>
-                        <a:defRPr sz="1200"/>
+                        <a:defRPr sz="1000"/>
                       </a:pPr>
                       <a:r>
                         <a:t>-60</a:t>
@@ -5820,7 +5820,7 @@
                     <a:lstStyle/>
                     <a:p>
                       <a:pPr>
-                        <a:defRPr sz="1200"/>
+                        <a:defRPr sz="1000"/>
                       </a:pPr>
                       <a:r>
                         <a:t>-64</a:t>
@@ -5835,7 +5835,7 @@
                     <a:lstStyle/>
                     <a:p>
                       <a:pPr>
-                        <a:defRPr sz="1200"/>
+                        <a:defRPr sz="1000"/>
                       </a:pPr>
                       <a:r>
                         <a:t>-65</a:t>
@@ -5852,7 +5852,7 @@
                     <a:lstStyle/>
                     <a:p>
                       <a:pPr>
-                        <a:defRPr sz="1200"/>
+                        <a:defRPr sz="1000"/>
                       </a:pPr>
                       <a:r>
                         <a:t>29</a:t>
@@ -5867,7 +5867,7 @@
                     <a:lstStyle/>
                     <a:p>
                       <a:pPr>
-                        <a:defRPr sz="1200"/>
+                        <a:defRPr sz="1000"/>
                       </a:pPr>
                       <a:r>
                         <a:t>7249141800047</a:t>
@@ -5882,7 +5882,7 @@
                     <a:lstStyle/>
                     <a:p>
                       <a:pPr>
-                        <a:defRPr sz="1200"/>
+                        <a:defRPr sz="1000"/>
                       </a:pPr>
                       <a:r>
                         <a:t>PASS</a:t>
@@ -5897,7 +5897,7 @@
                     <a:lstStyle/>
                     <a:p>
                       <a:pPr>
-                        <a:defRPr sz="1200"/>
+                        <a:defRPr sz="1000"/>
                       </a:pPr>
                       <a:r>
                         <a:t>-56</a:t>
@@ -5912,7 +5912,7 @@
                     <a:lstStyle/>
                     <a:p>
                       <a:pPr>
-                        <a:defRPr sz="1200"/>
+                        <a:defRPr sz="1000"/>
                       </a:pPr>
                       <a:r>
                         <a:t>-49</a:t>
@@ -5927,7 +5927,7 @@
                     <a:lstStyle/>
                     <a:p>
                       <a:pPr>
-                        <a:defRPr sz="1200"/>
+                        <a:defRPr sz="1000"/>
                       </a:pPr>
                       <a:r>
                         <a:t>-65</a:t>
@@ -5951,7 +5951,7 @@
         </p:nvGraphicFramePr>
         <p:xfrm>
           <a:off x="0" y="0"/>
-          <a:ext cx="7010400" cy="0"/>
+          <a:ext cx="7550400" cy="0"/>
         </p:xfrm>
         <a:graphic>
           <a:graphicData uri="http://schemas.openxmlformats.org/drawingml/2006/table">
@@ -5960,12 +5960,12 @@
                 <a:tableStyleId>{5C22544A-7EE6-4342-B048-85BDC9FD1C3A}</a:tableStyleId>
               </a:tblPr>
               <a:tblGrid>
-                <a:gridCol w="609600"/>
-                <a:gridCol w="1981200"/>
-                <a:gridCol w="1676400"/>
-                <a:gridCol w="609600"/>
-                <a:gridCol w="457200"/>
-                <a:gridCol w="1676400"/>
+                <a:gridCol w="699600"/>
+                <a:gridCol w="2071200"/>
+                <a:gridCol w="1766400"/>
+                <a:gridCol w="699600"/>
+                <a:gridCol w="547200"/>
+                <a:gridCol w="1766400"/>
               </a:tblGrid>
               <a:tr h="0">
                 <a:tc>
@@ -5973,7 +5973,7 @@
                     <a:bodyPr/>
                     <a:lstStyle/>
                     <a:p>
-                      <a:pPr>
+                      <a:pPr algn="ctr">
                         <a:defRPr sz="1200"/>
                       </a:pPr>
                       <a:r>
@@ -5988,7 +5988,7 @@
                     <a:bodyPr/>
                     <a:lstStyle/>
                     <a:p>
-                      <a:pPr>
+                      <a:pPr algn="ctr">
                         <a:defRPr sz="1200"/>
                       </a:pPr>
                       <a:r>
@@ -6003,7 +6003,7 @@
                     <a:bodyPr/>
                     <a:lstStyle/>
                     <a:p>
-                      <a:pPr>
+                      <a:pPr algn="ctr">
                         <a:defRPr sz="1200"/>
                       </a:pPr>
                       <a:r>
@@ -6018,7 +6018,7 @@
                     <a:bodyPr/>
                     <a:lstStyle/>
                     <a:p>
-                      <a:pPr>
+                      <a:pPr algn="ctr">
                         <a:defRPr sz="1200"/>
                       </a:pPr>
                       <a:r>
@@ -6033,7 +6033,7 @@
                     <a:bodyPr/>
                     <a:lstStyle/>
                     <a:p>
-                      <a:pPr>
+                      <a:pPr algn="ctr">
                         <a:defRPr sz="1200"/>
                       </a:pPr>
                       <a:r>
@@ -6048,7 +6048,7 @@
                     <a:bodyPr/>
                     <a:lstStyle/>
                     <a:p>
-                      <a:pPr>
+                      <a:pPr algn="ctr">
                         <a:defRPr sz="1200"/>
                       </a:pPr>
                       <a:r>

</xml_diff>

<commit_message>
add instruction and syntax error
</commit_message>
<xml_diff>
--- a/pptx/result/report.pptx
+++ b/pptx/result/report.pptx
@@ -3132,7 +3132,7 @@
         </p:nvGraphicFramePr>
         <p:xfrm>
           <a:off x="0" y="0"/>
-          <a:ext cx="6382000" cy="0"/>
+          <a:ext cx="7550400" cy="0"/>
         </p:xfrm>
         <a:graphic>
           <a:graphicData uri="http://schemas.openxmlformats.org/drawingml/2006/table">
@@ -3141,12 +3141,12 @@
                 <a:tableStyleId>{5C22544A-7EE6-4342-B048-85BDC9FD1C3A}</a:tableStyleId>
               </a:tblPr>
               <a:tblGrid>
-                <a:gridCol w="598000"/>
-                <a:gridCol w="1741000"/>
-                <a:gridCol w="1487000"/>
-                <a:gridCol w="598000"/>
-                <a:gridCol w="471000"/>
-                <a:gridCol w="1487000"/>
+                <a:gridCol w="699600"/>
+                <a:gridCol w="2071200"/>
+                <a:gridCol w="1766400"/>
+                <a:gridCol w="699600"/>
+                <a:gridCol w="547200"/>
+                <a:gridCol w="1766400"/>
               </a:tblGrid>
               <a:tr h="0">
                 <a:tc>
@@ -3154,8 +3154,8 @@
                     <a:bodyPr/>
                     <a:lstStyle/>
                     <a:p>
-                      <a:pPr algn="ctr">
-                        <a:defRPr sz="1000"/>
+                      <a:pPr>
+                        <a:defRPr sz="1200"/>
                       </a:pPr>
                       <a:r>
                         <a:t>Item</a:t>
@@ -3169,8 +3169,8 @@
                     <a:bodyPr/>
                     <a:lstStyle/>
                     <a:p>
-                      <a:pPr algn="ctr">
-                        <a:defRPr sz="1000"/>
+                      <a:pPr>
+                        <a:defRPr sz="1200"/>
                       </a:pPr>
                       <a:r>
                         <a:t>UNIT PN</a:t>
@@ -3184,8 +3184,8 @@
                     <a:bodyPr/>
                     <a:lstStyle/>
                     <a:p>
-                      <a:pPr algn="ctr">
-                        <a:defRPr sz="1000"/>
+                      <a:pPr>
+                        <a:defRPr sz="1200"/>
                       </a:pPr>
                       <a:r>
                         <a:t>Test Result</a:t>
@@ -3199,8 +3199,8 @@
                     <a:bodyPr/>
                     <a:lstStyle/>
                     <a:p>
-                      <a:pPr algn="ctr">
-                        <a:defRPr sz="1000"/>
+                      <a:pPr>
+                        <a:defRPr sz="1200"/>
                       </a:pPr>
                       <a:r>
                         <a:t>Main</a:t>
@@ -3214,8 +3214,8 @@
                     <a:bodyPr/>
                     <a:lstStyle/>
                     <a:p>
-                      <a:pPr algn="ctr">
-                        <a:defRPr sz="1000"/>
+                      <a:pPr>
+                        <a:defRPr sz="1200"/>
                       </a:pPr>
                       <a:r>
                         <a:t>Aux</a:t>
@@ -3229,8 +3229,8 @@
                     <a:bodyPr/>
                     <a:lstStyle/>
                     <a:p>
-                      <a:pPr algn="ctr">
-                        <a:defRPr sz="1000"/>
+                      <a:pPr>
+                        <a:defRPr sz="1200"/>
                       </a:pPr>
                       <a:r>
                         <a:t>Spec</a:t>
@@ -3247,7 +3247,7 @@
                     <a:lstStyle/>
                     <a:p>
                       <a:pPr>
-                        <a:defRPr sz="1000"/>
+                        <a:defRPr sz="1200"/>
                       </a:pPr>
                       <a:r>
                         <a:t>1</a:t>
@@ -3262,7 +3262,7 @@
                     <a:lstStyle/>
                     <a:p>
                       <a:pPr>
-                        <a:defRPr sz="1000"/>
+                        <a:defRPr sz="1200"/>
                       </a:pPr>
                       <a:r>
                         <a:t>7249141700002</a:t>
@@ -3281,7 +3281,7 @@
                     <a:lstStyle/>
                     <a:p>
                       <a:pPr>
-                        <a:defRPr sz="1000"/>
+                        <a:defRPr sz="1200"/>
                       </a:pPr>
                       <a:r>
                         <a:t>PASS</a:t>
@@ -3296,7 +3296,7 @@
                     <a:lstStyle/>
                     <a:p>
                       <a:pPr>
-                        <a:defRPr sz="1000"/>
+                        <a:defRPr sz="1200"/>
                       </a:pPr>
                       <a:r>
                         <a:t>-62</a:t>
@@ -3311,7 +3311,7 @@
                     <a:lstStyle/>
                     <a:p>
                       <a:pPr>
-                        <a:defRPr sz="1000"/>
+                        <a:defRPr sz="1200"/>
                       </a:pPr>
                       <a:r>
                         <a:t>-57</a:t>
@@ -3326,7 +3326,7 @@
                     <a:lstStyle/>
                     <a:p>
                       <a:pPr>
-                        <a:defRPr sz="1000"/>
+                        <a:defRPr sz="1200"/>
                       </a:pPr>
                       <a:r>
                         <a:t>-65</a:t>
@@ -3343,7 +3343,7 @@
                     <a:lstStyle/>
                     <a:p>
                       <a:pPr>
-                        <a:defRPr sz="1000"/>
+                        <a:defRPr sz="1200"/>
                       </a:pPr>
                       <a:r>
                         <a:t>2</a:t>
@@ -3358,7 +3358,7 @@
                     <a:lstStyle/>
                     <a:p>
                       <a:pPr>
-                        <a:defRPr sz="1000"/>
+                        <a:defRPr sz="1200"/>
                       </a:pPr>
                       <a:r>
                         <a:t>7249141700003</a:t>
@@ -3373,7 +3373,7 @@
                     <a:lstStyle/>
                     <a:p>
                       <a:pPr>
-                        <a:defRPr sz="1000"/>
+                        <a:defRPr sz="1200"/>
                       </a:pPr>
                       <a:r>
                         <a:rPr sz="1000" b="1" i="1">
@@ -3394,7 +3394,7 @@
                     <a:lstStyle/>
                     <a:p>
                       <a:pPr>
-                        <a:defRPr sz="1000"/>
+                        <a:defRPr sz="1200"/>
                       </a:pPr>
                       <a:r>
                         <a:t>-56</a:t>
@@ -3413,7 +3413,7 @@
                     <a:lstStyle/>
                     <a:p>
                       <a:pPr>
-                        <a:defRPr sz="1000"/>
+                        <a:defRPr sz="1200"/>
                       </a:pPr>
                       <a:r>
                         <a:t>-57</a:t>
@@ -3428,7 +3428,7 @@
                     <a:lstStyle/>
                     <a:p>
                       <a:pPr>
-                        <a:defRPr sz="1000"/>
+                        <a:defRPr sz="1200"/>
                       </a:pPr>
                       <a:r>
                         <a:t>-65</a:t>
@@ -3445,7 +3445,7 @@
                     <a:lstStyle/>
                     <a:p>
                       <a:pPr>
-                        <a:defRPr sz="1000"/>
+                        <a:defRPr sz="1200"/>
                       </a:pPr>
                       <a:r>
                         <a:t>3</a:t>
@@ -3460,7 +3460,7 @@
                     <a:lstStyle/>
                     <a:p>
                       <a:pPr>
-                        <a:defRPr sz="1000"/>
+                        <a:defRPr sz="1200"/>
                       </a:pPr>
                       <a:r>
                         <a:t>7249141700005</a:t>
@@ -3475,7 +3475,7 @@
                     <a:lstStyle/>
                     <a:p>
                       <a:pPr>
-                        <a:defRPr sz="1000"/>
+                        <a:defRPr sz="1200"/>
                       </a:pPr>
                       <a:r>
                         <a:t>PASS</a:t>
@@ -3490,7 +3490,7 @@
                     <a:lstStyle/>
                     <a:p>
                       <a:pPr>
-                        <a:defRPr sz="1000"/>
+                        <a:defRPr sz="1200"/>
                       </a:pPr>
                       <a:r>
                         <a:rPr sz="1000" b="1" i="1">
@@ -3511,7 +3511,7 @@
                     <a:lstStyle/>
                     <a:p>
                       <a:pPr>
-                        <a:defRPr sz="1000"/>
+                        <a:defRPr sz="1200"/>
                       </a:pPr>
                       <a:r>
                         <a:t>-53</a:t>
@@ -3526,7 +3526,7 @@
                     <a:lstStyle/>
                     <a:p>
                       <a:pPr>
-                        <a:defRPr sz="1000"/>
+                        <a:defRPr sz="1200"/>
                       </a:pPr>
                       <a:r>
                         <a:t>-65</a:t>
@@ -3552,7 +3552,7 @@
                     <a:lstStyle/>
                     <a:p>
                       <a:pPr>
-                        <a:defRPr sz="1000"/>
+                        <a:defRPr sz="1200"/>
                       </a:pPr>
                       <a:r>
                         <a:t>4</a:t>
@@ -3567,7 +3567,7 @@
                     <a:lstStyle/>
                     <a:p>
                       <a:pPr>
-                        <a:defRPr sz="1000"/>
+                        <a:defRPr sz="1200"/>
                       </a:pPr>
                       <a:r>
                         <a:t>7249141700008</a:t>
@@ -3582,7 +3582,7 @@
                     <a:lstStyle/>
                     <a:p>
                       <a:pPr>
-                        <a:defRPr sz="1000"/>
+                        <a:defRPr sz="1200"/>
                       </a:pPr>
                       <a:r>
                         <a:t>PASS</a:t>
@@ -3597,7 +3597,7 @@
                     <a:lstStyle/>
                     <a:p>
                       <a:pPr>
-                        <a:defRPr sz="1000"/>
+                        <a:defRPr sz="1200"/>
                       </a:pPr>
                       <a:r>
                         <a:t>-52</a:t>
@@ -3612,7 +3612,7 @@
                     <a:lstStyle/>
                     <a:p>
                       <a:pPr>
-                        <a:defRPr sz="1000"/>
+                        <a:defRPr sz="1200"/>
                       </a:pPr>
                       <a:r>
                         <a:t>-53</a:t>
@@ -3627,7 +3627,7 @@
                     <a:lstStyle/>
                     <a:p>
                       <a:pPr>
-                        <a:defRPr sz="1000"/>
+                        <a:defRPr sz="1200"/>
                       </a:pPr>
                       <a:r>
                         <a:t>-65</a:t>
@@ -3644,7 +3644,7 @@
                     <a:lstStyle/>
                     <a:p>
                       <a:pPr>
-                        <a:defRPr sz="1000"/>
+                        <a:defRPr sz="1200"/>
                       </a:pPr>
                       <a:r>
                         <a:t>5</a:t>
@@ -3659,7 +3659,7 @@
                     <a:lstStyle/>
                     <a:p>
                       <a:pPr>
-                        <a:defRPr sz="1000"/>
+                        <a:defRPr sz="1200"/>
                       </a:pPr>
                       <a:r>
                         <a:t>7249141700009</a:t>
@@ -3674,7 +3674,7 @@
                     <a:lstStyle/>
                     <a:p>
                       <a:pPr>
-                        <a:defRPr sz="1000"/>
+                        <a:defRPr sz="1200"/>
                       </a:pPr>
                       <a:r>
                         <a:t>PASS</a:t>
@@ -3689,7 +3689,7 @@
                     <a:lstStyle/>
                     <a:p>
                       <a:pPr>
-                        <a:defRPr sz="1000"/>
+                        <a:defRPr sz="1200"/>
                       </a:pPr>
                       <a:r>
                         <a:t>-45</a:t>
@@ -3704,7 +3704,7 @@
                     <a:lstStyle/>
                     <a:p>
                       <a:pPr>
-                        <a:defRPr sz="1000"/>
+                        <a:defRPr sz="1200"/>
                       </a:pPr>
                       <a:r>
                         <a:t>-52</a:t>
@@ -3719,7 +3719,7 @@
                     <a:lstStyle/>
                     <a:p>
                       <a:pPr>
-                        <a:defRPr sz="1000"/>
+                        <a:defRPr sz="1200"/>
                       </a:pPr>
                       <a:r>
                         <a:t>-65</a:t>
@@ -3736,7 +3736,7 @@
                     <a:lstStyle/>
                     <a:p>
                       <a:pPr>
-                        <a:defRPr sz="1000"/>
+                        <a:defRPr sz="1200"/>
                       </a:pPr>
                       <a:r>
                         <a:t>6</a:t>
@@ -3751,7 +3751,7 @@
                     <a:lstStyle/>
                     <a:p>
                       <a:pPr>
-                        <a:defRPr sz="1000"/>
+                        <a:defRPr sz="1200"/>
                       </a:pPr>
                       <a:r>
                         <a:t>7249141700011</a:t>
@@ -3766,7 +3766,7 @@
                     <a:lstStyle/>
                     <a:p>
                       <a:pPr>
-                        <a:defRPr sz="1000"/>
+                        <a:defRPr sz="1200"/>
                       </a:pPr>
                       <a:r>
                         <a:t>PASS</a:t>
@@ -3781,7 +3781,7 @@
                     <a:lstStyle/>
                     <a:p>
                       <a:pPr>
-                        <a:defRPr sz="1000"/>
+                        <a:defRPr sz="1200"/>
                       </a:pPr>
                       <a:r>
                         <a:t>-62</a:t>
@@ -3796,7 +3796,7 @@
                     <a:lstStyle/>
                     <a:p>
                       <a:pPr>
-                        <a:defRPr sz="1000"/>
+                        <a:defRPr sz="1200"/>
                       </a:pPr>
                       <a:r>
                         <a:t>-56</a:t>
@@ -3811,7 +3811,7 @@
                     <a:lstStyle/>
                     <a:p>
                       <a:pPr>
-                        <a:defRPr sz="1000"/>
+                        <a:defRPr sz="1200"/>
                       </a:pPr>
                       <a:r>
                         <a:t>-65</a:t>
@@ -3828,7 +3828,7 @@
                     <a:lstStyle/>
                     <a:p>
                       <a:pPr>
-                        <a:defRPr sz="1000"/>
+                        <a:defRPr sz="1200"/>
                       </a:pPr>
                       <a:r>
                         <a:t>7</a:t>
@@ -3843,7 +3843,7 @@
                     <a:lstStyle/>
                     <a:p>
                       <a:pPr>
-                        <a:defRPr sz="1000"/>
+                        <a:defRPr sz="1200"/>
                       </a:pPr>
                       <a:r>
                         <a:t>7249141700012</a:t>
@@ -3858,7 +3858,7 @@
                     <a:lstStyle/>
                     <a:p>
                       <a:pPr>
-                        <a:defRPr sz="1000"/>
+                        <a:defRPr sz="1200"/>
                       </a:pPr>
                       <a:r>
                         <a:t>PASS</a:t>
@@ -3873,7 +3873,7 @@
                     <a:lstStyle/>
                     <a:p>
                       <a:pPr>
-                        <a:defRPr sz="1000"/>
+                        <a:defRPr sz="1200"/>
                       </a:pPr>
                       <a:r>
                         <a:t>-61</a:t>
@@ -3888,7 +3888,7 @@
                     <a:lstStyle/>
                     <a:p>
                       <a:pPr>
-                        <a:defRPr sz="1000"/>
+                        <a:defRPr sz="1200"/>
                       </a:pPr>
                       <a:r>
                         <a:t>-61</a:t>
@@ -3903,7 +3903,7 @@
                     <a:lstStyle/>
                     <a:p>
                       <a:pPr>
-                        <a:defRPr sz="1000"/>
+                        <a:defRPr sz="1200"/>
                       </a:pPr>
                       <a:r>
                         <a:t>-65</a:t>
@@ -3920,7 +3920,7 @@
                     <a:lstStyle/>
                     <a:p>
                       <a:pPr>
-                        <a:defRPr sz="1000"/>
+                        <a:defRPr sz="1200"/>
                       </a:pPr>
                       <a:r>
                         <a:t>8</a:t>
@@ -3935,7 +3935,7 @@
                     <a:lstStyle/>
                     <a:p>
                       <a:pPr>
-                        <a:defRPr sz="1000"/>
+                        <a:defRPr sz="1200"/>
                       </a:pPr>
                       <a:r>
                         <a:t>7249141800002</a:t>
@@ -3950,7 +3950,7 @@
                     <a:lstStyle/>
                     <a:p>
                       <a:pPr>
-                        <a:defRPr sz="1000"/>
+                        <a:defRPr sz="1200"/>
                       </a:pPr>
                       <a:r>
                         <a:t>PASS</a:t>
@@ -3965,7 +3965,7 @@
                     <a:lstStyle/>
                     <a:p>
                       <a:pPr>
-                        <a:defRPr sz="1000"/>
+                        <a:defRPr sz="1200"/>
                       </a:pPr>
                       <a:r>
                         <a:t>-64</a:t>
@@ -3980,7 +3980,7 @@
                     <a:lstStyle/>
                     <a:p>
                       <a:pPr>
-                        <a:defRPr sz="1000"/>
+                        <a:defRPr sz="1200"/>
                       </a:pPr>
                       <a:r>
                         <a:t>-65</a:t>
@@ -3995,7 +3995,7 @@
                     <a:lstStyle/>
                     <a:p>
                       <a:pPr>
-                        <a:defRPr sz="1000"/>
+                        <a:defRPr sz="1200"/>
                       </a:pPr>
                       <a:r>
                         <a:t>-65</a:t>
@@ -4012,7 +4012,7 @@
                     <a:lstStyle/>
                     <a:p>
                       <a:pPr>
-                        <a:defRPr sz="1000"/>
+                        <a:defRPr sz="1200"/>
                       </a:pPr>
                       <a:r>
                         <a:t>9</a:t>
@@ -4027,7 +4027,7 @@
                     <a:lstStyle/>
                     <a:p>
                       <a:pPr>
-                        <a:defRPr sz="1000"/>
+                        <a:defRPr sz="1200"/>
                       </a:pPr>
                       <a:r>
                         <a:t>7249141800006</a:t>
@@ -4042,7 +4042,7 @@
                     <a:lstStyle/>
                     <a:p>
                       <a:pPr>
-                        <a:defRPr sz="1000"/>
+                        <a:defRPr sz="1200"/>
                       </a:pPr>
                       <a:r>
                         <a:t>PASS</a:t>
@@ -4057,7 +4057,7 @@
                     <a:lstStyle/>
                     <a:p>
                       <a:pPr>
-                        <a:defRPr sz="1000"/>
+                        <a:defRPr sz="1200"/>
                       </a:pPr>
                       <a:r>
                         <a:t>-64</a:t>
@@ -4072,7 +4072,7 @@
                     <a:lstStyle/>
                     <a:p>
                       <a:pPr>
-                        <a:defRPr sz="1000"/>
+                        <a:defRPr sz="1200"/>
                       </a:pPr>
                       <a:r>
                         <a:t>-59</a:t>
@@ -4087,7 +4087,7 @@
                     <a:lstStyle/>
                     <a:p>
                       <a:pPr>
-                        <a:defRPr sz="1000"/>
+                        <a:defRPr sz="1200"/>
                       </a:pPr>
                       <a:r>
                         <a:t>-65</a:t>
@@ -4104,7 +4104,7 @@
                     <a:lstStyle/>
                     <a:p>
                       <a:pPr>
-                        <a:defRPr sz="1000"/>
+                        <a:defRPr sz="1200"/>
                       </a:pPr>
                       <a:r>
                         <a:t>10</a:t>
@@ -4119,7 +4119,7 @@
                     <a:lstStyle/>
                     <a:p>
                       <a:pPr>
-                        <a:defRPr sz="1000"/>
+                        <a:defRPr sz="1200"/>
                       </a:pPr>
                       <a:r>
                         <a:t>7249141800012</a:t>
@@ -4134,7 +4134,7 @@
                     <a:lstStyle/>
                     <a:p>
                       <a:pPr>
-                        <a:defRPr sz="1000"/>
+                        <a:defRPr sz="1200"/>
                       </a:pPr>
                       <a:r>
                         <a:t>PASS</a:t>
@@ -4149,7 +4149,7 @@
                     <a:lstStyle/>
                     <a:p>
                       <a:pPr>
-                        <a:defRPr sz="1000"/>
+                        <a:defRPr sz="1200"/>
                       </a:pPr>
                       <a:r>
                         <a:t>-60</a:t>
@@ -4164,7 +4164,7 @@
                     <a:lstStyle/>
                     <a:p>
                       <a:pPr>
-                        <a:defRPr sz="1000"/>
+                        <a:defRPr sz="1200"/>
                       </a:pPr>
                       <a:r>
                         <a:t>-65</a:t>
@@ -4179,7 +4179,7 @@
                     <a:lstStyle/>
                     <a:p>
                       <a:pPr>
-                        <a:defRPr sz="1000"/>
+                        <a:defRPr sz="1200"/>
                       </a:pPr>
                       <a:r>
                         <a:t>-65</a:t>
@@ -4196,7 +4196,7 @@
                     <a:lstStyle/>
                     <a:p>
                       <a:pPr>
-                        <a:defRPr sz="1000"/>
+                        <a:defRPr sz="1200"/>
                       </a:pPr>
                       <a:r>
                         <a:t>11</a:t>
@@ -4211,7 +4211,7 @@
                     <a:lstStyle/>
                     <a:p>
                       <a:pPr>
-                        <a:defRPr sz="1000"/>
+                        <a:defRPr sz="1200"/>
                       </a:pPr>
                       <a:r>
                         <a:t>7249141800014</a:t>
@@ -4226,7 +4226,7 @@
                     <a:lstStyle/>
                     <a:p>
                       <a:pPr>
-                        <a:defRPr sz="1000"/>
+                        <a:defRPr sz="1200"/>
                       </a:pPr>
                       <a:r>
                         <a:t>PASS</a:t>
@@ -4241,7 +4241,7 @@
                     <a:lstStyle/>
                     <a:p>
                       <a:pPr>
-                        <a:defRPr sz="1000"/>
+                        <a:defRPr sz="1200"/>
                       </a:pPr>
                       <a:r>
                         <a:t>-54</a:t>
@@ -4256,7 +4256,7 @@
                     <a:lstStyle/>
                     <a:p>
                       <a:pPr>
-                        <a:defRPr sz="1000"/>
+                        <a:defRPr sz="1200"/>
                       </a:pPr>
                       <a:r>
                         <a:t>-59</a:t>
@@ -4271,7 +4271,7 @@
                     <a:lstStyle/>
                     <a:p>
                       <a:pPr>
-                        <a:defRPr sz="1000"/>
+                        <a:defRPr sz="1200"/>
                       </a:pPr>
                       <a:r>
                         <a:t>-65</a:t>
@@ -4288,7 +4288,7 @@
                     <a:lstStyle/>
                     <a:p>
                       <a:pPr>
-                        <a:defRPr sz="1000"/>
+                        <a:defRPr sz="1200"/>
                       </a:pPr>
                       <a:r>
                         <a:t>12</a:t>
@@ -4303,7 +4303,7 @@
                     <a:lstStyle/>
                     <a:p>
                       <a:pPr>
-                        <a:defRPr sz="1000"/>
+                        <a:defRPr sz="1200"/>
                       </a:pPr>
                       <a:r>
                         <a:t>7249141800017</a:t>
@@ -4318,7 +4318,7 @@
                     <a:lstStyle/>
                     <a:p>
                       <a:pPr>
-                        <a:defRPr sz="1000"/>
+                        <a:defRPr sz="1200"/>
                       </a:pPr>
                       <a:r>
                         <a:t>PASS</a:t>
@@ -4333,7 +4333,7 @@
                     <a:lstStyle/>
                     <a:p>
                       <a:pPr>
-                        <a:defRPr sz="1000"/>
+                        <a:defRPr sz="1200"/>
                       </a:pPr>
                       <a:r>
                         <a:t>-55</a:t>
@@ -4348,7 +4348,7 @@
                     <a:lstStyle/>
                     <a:p>
                       <a:pPr>
-                        <a:defRPr sz="1000"/>
+                        <a:defRPr sz="1200"/>
                       </a:pPr>
                       <a:r>
                         <a:t>-57</a:t>
@@ -4363,7 +4363,7 @@
                     <a:lstStyle/>
                     <a:p>
                       <a:pPr>
-                        <a:defRPr sz="1000"/>
+                        <a:defRPr sz="1200"/>
                       </a:pPr>
                       <a:r>
                         <a:t>-65</a:t>
@@ -4380,7 +4380,7 @@
                     <a:lstStyle/>
                     <a:p>
                       <a:pPr>
-                        <a:defRPr sz="1000"/>
+                        <a:defRPr sz="1200"/>
                       </a:pPr>
                       <a:r>
                         <a:t>13</a:t>
@@ -4395,7 +4395,7 @@
                     <a:lstStyle/>
                     <a:p>
                       <a:pPr>
-                        <a:defRPr sz="1000"/>
+                        <a:defRPr sz="1200"/>
                       </a:pPr>
                       <a:r>
                         <a:t>7249141800018</a:t>
@@ -4410,7 +4410,7 @@
                     <a:lstStyle/>
                     <a:p>
                       <a:pPr>
-                        <a:defRPr sz="1000"/>
+                        <a:defRPr sz="1200"/>
                       </a:pPr>
                       <a:r>
                         <a:t>PASS</a:t>
@@ -4425,7 +4425,7 @@
                     <a:lstStyle/>
                     <a:p>
                       <a:pPr>
-                        <a:defRPr sz="1000"/>
+                        <a:defRPr sz="1200"/>
                       </a:pPr>
                       <a:r>
                         <a:t>-64</a:t>
@@ -4440,7 +4440,7 @@
                     <a:lstStyle/>
                     <a:p>
                       <a:pPr>
-                        <a:defRPr sz="1000"/>
+                        <a:defRPr sz="1200"/>
                       </a:pPr>
                       <a:r>
                         <a:t>-55</a:t>
@@ -4455,7 +4455,7 @@
                     <a:lstStyle/>
                     <a:p>
                       <a:pPr>
-                        <a:defRPr sz="1000"/>
+                        <a:defRPr sz="1200"/>
                       </a:pPr>
                       <a:r>
                         <a:t>-65</a:t>
@@ -4472,7 +4472,7 @@
                     <a:lstStyle/>
                     <a:p>
                       <a:pPr>
-                        <a:defRPr sz="1000"/>
+                        <a:defRPr sz="1200"/>
                       </a:pPr>
                       <a:r>
                         <a:t>14</a:t>
@@ -4487,7 +4487,7 @@
                     <a:lstStyle/>
                     <a:p>
                       <a:pPr>
-                        <a:defRPr sz="1000"/>
+                        <a:defRPr sz="1200"/>
                       </a:pPr>
                       <a:r>
                         <a:t>7249141800020</a:t>
@@ -4502,7 +4502,7 @@
                     <a:lstStyle/>
                     <a:p>
                       <a:pPr>
-                        <a:defRPr sz="1000"/>
+                        <a:defRPr sz="1200"/>
                       </a:pPr>
                       <a:r>
                         <a:t>PASS</a:t>
@@ -4517,7 +4517,7 @@
                     <a:lstStyle/>
                     <a:p>
                       <a:pPr>
-                        <a:defRPr sz="1000"/>
+                        <a:defRPr sz="1200"/>
                       </a:pPr>
                       <a:r>
                         <a:t>-54</a:t>
@@ -4532,7 +4532,7 @@
                     <a:lstStyle/>
                     <a:p>
                       <a:pPr>
-                        <a:defRPr sz="1000"/>
+                        <a:defRPr sz="1200"/>
                       </a:pPr>
                       <a:r>
                         <a:t>-60</a:t>
@@ -4547,7 +4547,7 @@
                     <a:lstStyle/>
                     <a:p>
                       <a:pPr>
-                        <a:defRPr sz="1000"/>
+                        <a:defRPr sz="1200"/>
                       </a:pPr>
                       <a:r>
                         <a:t>-65</a:t>
@@ -4564,7 +4564,7 @@
                     <a:lstStyle/>
                     <a:p>
                       <a:pPr>
-                        <a:defRPr sz="1000"/>
+                        <a:defRPr sz="1200"/>
                       </a:pPr>
                       <a:r>
                         <a:t>15</a:t>
@@ -4579,7 +4579,7 @@
                     <a:lstStyle/>
                     <a:p>
                       <a:pPr>
-                        <a:defRPr sz="1000"/>
+                        <a:defRPr sz="1200"/>
                       </a:pPr>
                       <a:r>
                         <a:t>7249141800021</a:t>
@@ -4594,7 +4594,7 @@
                     <a:lstStyle/>
                     <a:p>
                       <a:pPr>
-                        <a:defRPr sz="1000"/>
+                        <a:defRPr sz="1200"/>
                       </a:pPr>
                       <a:r>
                         <a:t>PASS</a:t>
@@ -4609,7 +4609,7 @@
                     <a:lstStyle/>
                     <a:p>
                       <a:pPr>
-                        <a:defRPr sz="1000"/>
+                        <a:defRPr sz="1200"/>
                       </a:pPr>
                       <a:r>
                         <a:t>-62</a:t>
@@ -4624,7 +4624,7 @@
                     <a:lstStyle/>
                     <a:p>
                       <a:pPr>
-                        <a:defRPr sz="1000"/>
+                        <a:defRPr sz="1200"/>
                       </a:pPr>
                       <a:r>
                         <a:t>-63</a:t>
@@ -4639,7 +4639,7 @@
                     <a:lstStyle/>
                     <a:p>
                       <a:pPr>
-                        <a:defRPr sz="1000"/>
+                        <a:defRPr sz="1200"/>
                       </a:pPr>
                       <a:r>
                         <a:t>-65</a:t>
@@ -4656,7 +4656,7 @@
                     <a:lstStyle/>
                     <a:p>
                       <a:pPr>
-                        <a:defRPr sz="1000"/>
+                        <a:defRPr sz="1200"/>
                       </a:pPr>
                       <a:r>
                         <a:t>16</a:t>
@@ -4671,7 +4671,7 @@
                     <a:lstStyle/>
                     <a:p>
                       <a:pPr>
-                        <a:defRPr sz="1000"/>
+                        <a:defRPr sz="1200"/>
                       </a:pPr>
                       <a:r>
                         <a:t>7249141800023</a:t>
@@ -4686,7 +4686,7 @@
                     <a:lstStyle/>
                     <a:p>
                       <a:pPr>
-                        <a:defRPr sz="1000"/>
+                        <a:defRPr sz="1200"/>
                       </a:pPr>
                       <a:r>
                         <a:t>PASS</a:t>
@@ -4701,7 +4701,7 @@
                     <a:lstStyle/>
                     <a:p>
                       <a:pPr>
-                        <a:defRPr sz="1000"/>
+                        <a:defRPr sz="1200"/>
                       </a:pPr>
                       <a:r>
                         <a:t>-55</a:t>
@@ -4716,7 +4716,7 @@
                     <a:lstStyle/>
                     <a:p>
                       <a:pPr>
-                        <a:defRPr sz="1000"/>
+                        <a:defRPr sz="1200"/>
                       </a:pPr>
                       <a:r>
                         <a:t>-60</a:t>
@@ -4731,7 +4731,7 @@
                     <a:lstStyle/>
                     <a:p>
                       <a:pPr>
-                        <a:defRPr sz="1000"/>
+                        <a:defRPr sz="1200"/>
                       </a:pPr>
                       <a:r>
                         <a:t>-65</a:t>
@@ -4748,7 +4748,7 @@
                     <a:lstStyle/>
                     <a:p>
                       <a:pPr>
-                        <a:defRPr sz="1000"/>
+                        <a:defRPr sz="1200"/>
                       </a:pPr>
                       <a:r>
                         <a:t>17</a:t>
@@ -4763,7 +4763,7 @@
                     <a:lstStyle/>
                     <a:p>
                       <a:pPr>
-                        <a:defRPr sz="1000"/>
+                        <a:defRPr sz="1200"/>
                       </a:pPr>
                       <a:r>
                         <a:t>7249141800024</a:t>
@@ -4778,7 +4778,7 @@
                     <a:lstStyle/>
                     <a:p>
                       <a:pPr>
-                        <a:defRPr sz="1000"/>
+                        <a:defRPr sz="1200"/>
                       </a:pPr>
                       <a:r>
                         <a:t>PASS</a:t>
@@ -4793,7 +4793,7 @@
                     <a:lstStyle/>
                     <a:p>
                       <a:pPr>
-                        <a:defRPr sz="1000"/>
+                        <a:defRPr sz="1200"/>
                       </a:pPr>
                       <a:r>
                         <a:t>-54</a:t>
@@ -4808,7 +4808,7 @@
                     <a:lstStyle/>
                     <a:p>
                       <a:pPr>
-                        <a:defRPr sz="1000"/>
+                        <a:defRPr sz="1200"/>
                       </a:pPr>
                       <a:r>
                         <a:t>-52</a:t>
@@ -4823,7 +4823,7 @@
                     <a:lstStyle/>
                     <a:p>
                       <a:pPr>
-                        <a:defRPr sz="1000"/>
+                        <a:defRPr sz="1200"/>
                       </a:pPr>
                       <a:r>
                         <a:t>-65</a:t>
@@ -4840,7 +4840,7 @@
                     <a:lstStyle/>
                     <a:p>
                       <a:pPr>
-                        <a:defRPr sz="1000"/>
+                        <a:defRPr sz="1200"/>
                       </a:pPr>
                       <a:r>
                         <a:t>18</a:t>
@@ -4855,7 +4855,7 @@
                     <a:lstStyle/>
                     <a:p>
                       <a:pPr>
-                        <a:defRPr sz="1000"/>
+                        <a:defRPr sz="1200"/>
                       </a:pPr>
                       <a:r>
                         <a:t>7249141800028</a:t>
@@ -4870,7 +4870,7 @@
                     <a:lstStyle/>
                     <a:p>
                       <a:pPr>
-                        <a:defRPr sz="1000"/>
+                        <a:defRPr sz="1200"/>
                       </a:pPr>
                       <a:r>
                         <a:t>PASS</a:t>
@@ -4885,7 +4885,7 @@
                     <a:lstStyle/>
                     <a:p>
                       <a:pPr>
-                        <a:defRPr sz="1000"/>
+                        <a:defRPr sz="1200"/>
                       </a:pPr>
                       <a:r>
                         <a:t>-48</a:t>
@@ -4900,7 +4900,7 @@
                     <a:lstStyle/>
                     <a:p>
                       <a:pPr>
-                        <a:defRPr sz="1000"/>
+                        <a:defRPr sz="1200"/>
                       </a:pPr>
                       <a:r>
                         <a:t>-54</a:t>
@@ -4915,7 +4915,7 @@
                     <a:lstStyle/>
                     <a:p>
                       <a:pPr>
-                        <a:defRPr sz="1000"/>
+                        <a:defRPr sz="1200"/>
                       </a:pPr>
                       <a:r>
                         <a:t>-65</a:t>
@@ -4932,7 +4932,7 @@
                     <a:lstStyle/>
                     <a:p>
                       <a:pPr>
-                        <a:defRPr sz="1000"/>
+                        <a:defRPr sz="1200"/>
                       </a:pPr>
                       <a:r>
                         <a:t>19</a:t>
@@ -4947,7 +4947,7 @@
                     <a:lstStyle/>
                     <a:p>
                       <a:pPr>
-                        <a:defRPr sz="1000"/>
+                        <a:defRPr sz="1200"/>
                       </a:pPr>
                       <a:r>
                         <a:t>7249141800029</a:t>
@@ -4962,7 +4962,7 @@
                     <a:lstStyle/>
                     <a:p>
                       <a:pPr>
-                        <a:defRPr sz="1000"/>
+                        <a:defRPr sz="1200"/>
                       </a:pPr>
                       <a:r>
                         <a:t>PASS</a:t>
@@ -4977,7 +4977,7 @@
                     <a:lstStyle/>
                     <a:p>
                       <a:pPr>
-                        <a:defRPr sz="1000"/>
+                        <a:defRPr sz="1200"/>
                       </a:pPr>
                       <a:r>
                         <a:t>-65</a:t>
@@ -4992,7 +4992,7 @@
                     <a:lstStyle/>
                     <a:p>
                       <a:pPr>
-                        <a:defRPr sz="1000"/>
+                        <a:defRPr sz="1200"/>
                       </a:pPr>
                       <a:r>
                         <a:t>-63</a:t>
@@ -5007,7 +5007,7 @@
                     <a:lstStyle/>
                     <a:p>
                       <a:pPr>
-                        <a:defRPr sz="1000"/>
+                        <a:defRPr sz="1200"/>
                       </a:pPr>
                       <a:r>
                         <a:t>-65</a:t>
@@ -5024,7 +5024,7 @@
                     <a:lstStyle/>
                     <a:p>
                       <a:pPr>
-                        <a:defRPr sz="1000"/>
+                        <a:defRPr sz="1200"/>
                       </a:pPr>
                       <a:r>
                         <a:t>20</a:t>
@@ -5039,7 +5039,7 @@
                     <a:lstStyle/>
                     <a:p>
                       <a:pPr>
-                        <a:defRPr sz="1000"/>
+                        <a:defRPr sz="1200"/>
                       </a:pPr>
                       <a:r>
                         <a:t>7249141800031</a:t>
@@ -5054,7 +5054,7 @@
                     <a:lstStyle/>
                     <a:p>
                       <a:pPr>
-                        <a:defRPr sz="1000"/>
+                        <a:defRPr sz="1200"/>
                       </a:pPr>
                       <a:r>
                         <a:t>PASS</a:t>
@@ -5069,7 +5069,7 @@
                     <a:lstStyle/>
                     <a:p>
                       <a:pPr>
-                        <a:defRPr sz="1000"/>
+                        <a:defRPr sz="1200"/>
                       </a:pPr>
                       <a:r>
                         <a:t>-64</a:t>
@@ -5084,7 +5084,7 @@
                     <a:lstStyle/>
                     <a:p>
                       <a:pPr>
-                        <a:defRPr sz="1000"/>
+                        <a:defRPr sz="1200"/>
                       </a:pPr>
                       <a:r>
                         <a:t>-52</a:t>
@@ -5099,7 +5099,7 @@
                     <a:lstStyle/>
                     <a:p>
                       <a:pPr>
-                        <a:defRPr sz="1000"/>
+                        <a:defRPr sz="1200"/>
                       </a:pPr>
                       <a:r>
                         <a:t>-65</a:t>
@@ -5116,7 +5116,7 @@
                     <a:lstStyle/>
                     <a:p>
                       <a:pPr>
-                        <a:defRPr sz="1000"/>
+                        <a:defRPr sz="1200"/>
                       </a:pPr>
                       <a:r>
                         <a:t>21</a:t>
@@ -5131,7 +5131,7 @@
                     <a:lstStyle/>
                     <a:p>
                       <a:pPr>
-                        <a:defRPr sz="1000"/>
+                        <a:defRPr sz="1200"/>
                       </a:pPr>
                       <a:r>
                         <a:t>7249141800033</a:t>
@@ -5146,7 +5146,7 @@
                     <a:lstStyle/>
                     <a:p>
                       <a:pPr>
-                        <a:defRPr sz="1000"/>
+                        <a:defRPr sz="1200"/>
                       </a:pPr>
                       <a:r>
                         <a:t>PASS</a:t>
@@ -5161,7 +5161,7 @@
                     <a:lstStyle/>
                     <a:p>
                       <a:pPr>
-                        <a:defRPr sz="1000"/>
+                        <a:defRPr sz="1200"/>
                       </a:pPr>
                       <a:r>
                         <a:t>-59</a:t>
@@ -5176,7 +5176,7 @@
                     <a:lstStyle/>
                     <a:p>
                       <a:pPr>
-                        <a:defRPr sz="1000"/>
+                        <a:defRPr sz="1200"/>
                       </a:pPr>
                       <a:r>
                         <a:t>-59</a:t>
@@ -5191,7 +5191,7 @@
                     <a:lstStyle/>
                     <a:p>
                       <a:pPr>
-                        <a:defRPr sz="1000"/>
+                        <a:defRPr sz="1200"/>
                       </a:pPr>
                       <a:r>
                         <a:t>-65</a:t>
@@ -5208,7 +5208,7 @@
                     <a:lstStyle/>
                     <a:p>
                       <a:pPr>
-                        <a:defRPr sz="1000"/>
+                        <a:defRPr sz="1200"/>
                       </a:pPr>
                       <a:r>
                         <a:t>22</a:t>
@@ -5223,7 +5223,7 @@
                     <a:lstStyle/>
                     <a:p>
                       <a:pPr>
-                        <a:defRPr sz="1000"/>
+                        <a:defRPr sz="1200"/>
                       </a:pPr>
                       <a:r>
                         <a:t>7249141800036</a:t>
@@ -5238,7 +5238,7 @@
                     <a:lstStyle/>
                     <a:p>
                       <a:pPr>
-                        <a:defRPr sz="1000"/>
+                        <a:defRPr sz="1200"/>
                       </a:pPr>
                       <a:r>
                         <a:t>PASS</a:t>
@@ -5253,7 +5253,7 @@
                     <a:lstStyle/>
                     <a:p>
                       <a:pPr>
-                        <a:defRPr sz="1000"/>
+                        <a:defRPr sz="1200"/>
                       </a:pPr>
                       <a:r>
                         <a:t>-58</a:t>
@@ -5268,7 +5268,7 @@
                     <a:lstStyle/>
                     <a:p>
                       <a:pPr>
-                        <a:defRPr sz="1000"/>
+                        <a:defRPr sz="1200"/>
                       </a:pPr>
                       <a:r>
                         <a:t>-64</a:t>
@@ -5283,7 +5283,7 @@
                     <a:lstStyle/>
                     <a:p>
                       <a:pPr>
-                        <a:defRPr sz="1000"/>
+                        <a:defRPr sz="1200"/>
                       </a:pPr>
                       <a:r>
                         <a:t>-65</a:t>
@@ -5300,7 +5300,7 @@
                     <a:lstStyle/>
                     <a:p>
                       <a:pPr>
-                        <a:defRPr sz="1000"/>
+                        <a:defRPr sz="1200"/>
                       </a:pPr>
                       <a:r>
                         <a:t>23</a:t>
@@ -5315,7 +5315,7 @@
                     <a:lstStyle/>
                     <a:p>
                       <a:pPr>
-                        <a:defRPr sz="1000"/>
+                        <a:defRPr sz="1200"/>
                       </a:pPr>
                       <a:r>
                         <a:t>7249141800037</a:t>
@@ -5330,7 +5330,7 @@
                     <a:lstStyle/>
                     <a:p>
                       <a:pPr>
-                        <a:defRPr sz="1000"/>
+                        <a:defRPr sz="1200"/>
                       </a:pPr>
                       <a:r>
                         <a:t>PASS</a:t>
@@ -5345,7 +5345,7 @@
                     <a:lstStyle/>
                     <a:p>
                       <a:pPr>
-                        <a:defRPr sz="1000"/>
+                        <a:defRPr sz="1200"/>
                       </a:pPr>
                       <a:r>
                         <a:t>-43</a:t>
@@ -5360,7 +5360,7 @@
                     <a:lstStyle/>
                     <a:p>
                       <a:pPr>
-                        <a:defRPr sz="1000"/>
+                        <a:defRPr sz="1200"/>
                       </a:pPr>
                       <a:r>
                         <a:t>-46</a:t>
@@ -5375,7 +5375,7 @@
                     <a:lstStyle/>
                     <a:p>
                       <a:pPr>
-                        <a:defRPr sz="1000"/>
+                        <a:defRPr sz="1200"/>
                       </a:pPr>
                       <a:r>
                         <a:t>-65</a:t>
@@ -5392,7 +5392,7 @@
                     <a:lstStyle/>
                     <a:p>
                       <a:pPr>
-                        <a:defRPr sz="1000"/>
+                        <a:defRPr sz="1200"/>
                       </a:pPr>
                       <a:r>
                         <a:t>24</a:t>
@@ -5407,7 +5407,7 @@
                     <a:lstStyle/>
                     <a:p>
                       <a:pPr>
-                        <a:defRPr sz="1000"/>
+                        <a:defRPr sz="1200"/>
                       </a:pPr>
                       <a:r>
                         <a:t>7249141800038</a:t>
@@ -5422,7 +5422,7 @@
                     <a:lstStyle/>
                     <a:p>
                       <a:pPr>
-                        <a:defRPr sz="1000"/>
+                        <a:defRPr sz="1200"/>
                       </a:pPr>
                       <a:r>
                         <a:t>PASS</a:t>
@@ -5437,7 +5437,7 @@
                     <a:lstStyle/>
                     <a:p>
                       <a:pPr>
-                        <a:defRPr sz="1000"/>
+                        <a:defRPr sz="1200"/>
                       </a:pPr>
                       <a:r>
                         <a:t>-54</a:t>
@@ -5452,7 +5452,7 @@
                     <a:lstStyle/>
                     <a:p>
                       <a:pPr>
-                        <a:defRPr sz="1000"/>
+                        <a:defRPr sz="1200"/>
                       </a:pPr>
                       <a:r>
                         <a:t>-49</a:t>
@@ -5467,7 +5467,7 @@
                     <a:lstStyle/>
                     <a:p>
                       <a:pPr>
-                        <a:defRPr sz="1000"/>
+                        <a:defRPr sz="1200"/>
                       </a:pPr>
                       <a:r>
                         <a:t>-65</a:t>
@@ -5484,7 +5484,7 @@
                     <a:lstStyle/>
                     <a:p>
                       <a:pPr>
-                        <a:defRPr sz="1000"/>
+                        <a:defRPr sz="1200"/>
                       </a:pPr>
                       <a:r>
                         <a:t>25</a:t>
@@ -5499,7 +5499,7 @@
                     <a:lstStyle/>
                     <a:p>
                       <a:pPr>
-                        <a:defRPr sz="1000"/>
+                        <a:defRPr sz="1200"/>
                       </a:pPr>
                       <a:r>
                         <a:t>7249141800042</a:t>
@@ -5514,7 +5514,7 @@
                     <a:lstStyle/>
                     <a:p>
                       <a:pPr>
-                        <a:defRPr sz="1000"/>
+                        <a:defRPr sz="1200"/>
                       </a:pPr>
                       <a:r>
                         <a:t>PASS</a:t>
@@ -5529,7 +5529,7 @@
                     <a:lstStyle/>
                     <a:p>
                       <a:pPr>
-                        <a:defRPr sz="1000"/>
+                        <a:defRPr sz="1200"/>
                       </a:pPr>
                       <a:r>
                         <a:t>-54</a:t>
@@ -5544,7 +5544,7 @@
                     <a:lstStyle/>
                     <a:p>
                       <a:pPr>
-                        <a:defRPr sz="1000"/>
+                        <a:defRPr sz="1200"/>
                       </a:pPr>
                       <a:r>
                         <a:t>-62</a:t>
@@ -5559,7 +5559,7 @@
                     <a:lstStyle/>
                     <a:p>
                       <a:pPr>
-                        <a:defRPr sz="1000"/>
+                        <a:defRPr sz="1200"/>
                       </a:pPr>
                       <a:r>
                         <a:t>-65</a:t>
@@ -5576,7 +5576,7 @@
                     <a:lstStyle/>
                     <a:p>
                       <a:pPr>
-                        <a:defRPr sz="1000"/>
+                        <a:defRPr sz="1200"/>
                       </a:pPr>
                       <a:r>
                         <a:t>26</a:t>
@@ -5591,7 +5591,7 @@
                     <a:lstStyle/>
                     <a:p>
                       <a:pPr>
-                        <a:defRPr sz="1000"/>
+                        <a:defRPr sz="1200"/>
                       </a:pPr>
                       <a:r>
                         <a:t>7249141800044</a:t>
@@ -5606,7 +5606,7 @@
                     <a:lstStyle/>
                     <a:p>
                       <a:pPr>
-                        <a:defRPr sz="1000"/>
+                        <a:defRPr sz="1200"/>
                       </a:pPr>
                       <a:r>
                         <a:t>PASS</a:t>
@@ -5621,7 +5621,7 @@
                     <a:lstStyle/>
                     <a:p>
                       <a:pPr>
-                        <a:defRPr sz="1000"/>
+                        <a:defRPr sz="1200"/>
                       </a:pPr>
                       <a:r>
                         <a:t>-63</a:t>
@@ -5636,7 +5636,7 @@
                     <a:lstStyle/>
                     <a:p>
                       <a:pPr>
-                        <a:defRPr sz="1000"/>
+                        <a:defRPr sz="1200"/>
                       </a:pPr>
                       <a:r>
                         <a:t>-64</a:t>
@@ -5651,7 +5651,7 @@
                     <a:lstStyle/>
                     <a:p>
                       <a:pPr>
-                        <a:defRPr sz="1000"/>
+                        <a:defRPr sz="1200"/>
                       </a:pPr>
                       <a:r>
                         <a:t>-65</a:t>
@@ -5668,7 +5668,7 @@
                     <a:lstStyle/>
                     <a:p>
                       <a:pPr>
-                        <a:defRPr sz="1000"/>
+                        <a:defRPr sz="1200"/>
                       </a:pPr>
                       <a:r>
                         <a:t>27</a:t>
@@ -5683,7 +5683,7 @@
                     <a:lstStyle/>
                     <a:p>
                       <a:pPr>
-                        <a:defRPr sz="1000"/>
+                        <a:defRPr sz="1200"/>
                       </a:pPr>
                       <a:r>
                         <a:t>7249141800045</a:t>
@@ -5698,7 +5698,7 @@
                     <a:lstStyle/>
                     <a:p>
                       <a:pPr>
-                        <a:defRPr sz="1000"/>
+                        <a:defRPr sz="1200"/>
                       </a:pPr>
                       <a:r>
                         <a:t>PASS</a:t>
@@ -5713,7 +5713,7 @@
                     <a:lstStyle/>
                     <a:p>
                       <a:pPr>
-                        <a:defRPr sz="1000"/>
+                        <a:defRPr sz="1200"/>
                       </a:pPr>
                       <a:r>
                         <a:t>-58</a:t>
@@ -5728,7 +5728,7 @@
                     <a:lstStyle/>
                     <a:p>
                       <a:pPr>
-                        <a:defRPr sz="1000"/>
+                        <a:defRPr sz="1200"/>
                       </a:pPr>
                       <a:r>
                         <a:t>-55</a:t>
@@ -5743,7 +5743,7 @@
                     <a:lstStyle/>
                     <a:p>
                       <a:pPr>
-                        <a:defRPr sz="1000"/>
+                        <a:defRPr sz="1200"/>
                       </a:pPr>
                       <a:r>
                         <a:t>-65</a:t>
@@ -5760,7 +5760,7 @@
                     <a:lstStyle/>
                     <a:p>
                       <a:pPr>
-                        <a:defRPr sz="1000"/>
+                        <a:defRPr sz="1200"/>
                       </a:pPr>
                       <a:r>
                         <a:t>28</a:t>
@@ -5775,7 +5775,7 @@
                     <a:lstStyle/>
                     <a:p>
                       <a:pPr>
-                        <a:defRPr sz="1000"/>
+                        <a:defRPr sz="1200"/>
                       </a:pPr>
                       <a:r>
                         <a:t>7249141800046</a:t>
@@ -5790,7 +5790,7 @@
                     <a:lstStyle/>
                     <a:p>
                       <a:pPr>
-                        <a:defRPr sz="1000"/>
+                        <a:defRPr sz="1200"/>
                       </a:pPr>
                       <a:r>
                         <a:t>PASS</a:t>
@@ -5805,7 +5805,7 @@
                     <a:lstStyle/>
                     <a:p>
                       <a:pPr>
-                        <a:defRPr sz="1000"/>
+                        <a:defRPr sz="1200"/>
                       </a:pPr>
                       <a:r>
                         <a:t>-60</a:t>
@@ -5820,7 +5820,7 @@
                     <a:lstStyle/>
                     <a:p>
                       <a:pPr>
-                        <a:defRPr sz="1000"/>
+                        <a:defRPr sz="1200"/>
                       </a:pPr>
                       <a:r>
                         <a:t>-64</a:t>
@@ -5835,7 +5835,7 @@
                     <a:lstStyle/>
                     <a:p>
                       <a:pPr>
-                        <a:defRPr sz="1000"/>
+                        <a:defRPr sz="1200"/>
                       </a:pPr>
                       <a:r>
                         <a:t>-65</a:t>
@@ -5852,7 +5852,7 @@
                     <a:lstStyle/>
                     <a:p>
                       <a:pPr>
-                        <a:defRPr sz="1000"/>
+                        <a:defRPr sz="1200"/>
                       </a:pPr>
                       <a:r>
                         <a:t>29</a:t>
@@ -5867,7 +5867,7 @@
                     <a:lstStyle/>
                     <a:p>
                       <a:pPr>
-                        <a:defRPr sz="1000"/>
+                        <a:defRPr sz="1200"/>
                       </a:pPr>
                       <a:r>
                         <a:t>7249141800047</a:t>
@@ -5882,7 +5882,7 @@
                     <a:lstStyle/>
                     <a:p>
                       <a:pPr>
-                        <a:defRPr sz="1000"/>
+                        <a:defRPr sz="1200"/>
                       </a:pPr>
                       <a:r>
                         <a:t>PASS</a:t>
@@ -5897,7 +5897,7 @@
                     <a:lstStyle/>
                     <a:p>
                       <a:pPr>
-                        <a:defRPr sz="1000"/>
+                        <a:defRPr sz="1200"/>
                       </a:pPr>
                       <a:r>
                         <a:t>-56</a:t>
@@ -5912,7 +5912,7 @@
                     <a:lstStyle/>
                     <a:p>
                       <a:pPr>
-                        <a:defRPr sz="1000"/>
+                        <a:defRPr sz="1200"/>
                       </a:pPr>
                       <a:r>
                         <a:t>-49</a:t>
@@ -5927,7 +5927,7 @@
                     <a:lstStyle/>
                     <a:p>
                       <a:pPr>
-                        <a:defRPr sz="1000"/>
+                        <a:defRPr sz="1200"/>
                       </a:pPr>
                       <a:r>
                         <a:t>-65</a:t>
@@ -5973,7 +5973,7 @@
                     <a:bodyPr/>
                     <a:lstStyle/>
                     <a:p>
-                      <a:pPr algn="ctr">
+                      <a:pPr>
                         <a:defRPr sz="1200"/>
                       </a:pPr>
                       <a:r>
@@ -5988,7 +5988,7 @@
                     <a:bodyPr/>
                     <a:lstStyle/>
                     <a:p>
-                      <a:pPr algn="ctr">
+                      <a:pPr>
                         <a:defRPr sz="1200"/>
                       </a:pPr>
                       <a:r>
@@ -6003,7 +6003,7 @@
                     <a:bodyPr/>
                     <a:lstStyle/>
                     <a:p>
-                      <a:pPr algn="ctr">
+                      <a:pPr>
                         <a:defRPr sz="1200"/>
                       </a:pPr>
                       <a:r>
@@ -6018,7 +6018,7 @@
                     <a:bodyPr/>
                     <a:lstStyle/>
                     <a:p>
-                      <a:pPr algn="ctr">
+                      <a:pPr>
                         <a:defRPr sz="1200"/>
                       </a:pPr>
                       <a:r>
@@ -6033,7 +6033,7 @@
                     <a:bodyPr/>
                     <a:lstStyle/>
                     <a:p>
-                      <a:pPr algn="ctr">
+                      <a:pPr>
                         <a:defRPr sz="1200"/>
                       </a:pPr>
                       <a:r>
@@ -6048,7 +6048,7 @@
                     <a:bodyPr/>
                     <a:lstStyle/>
                     <a:p>
-                      <a:pPr algn="ctr">
+                      <a:pPr>
                         <a:defRPr sz="1200"/>
                       </a:pPr>
                       <a:r>

</xml_diff>

<commit_message>
deal datetime dtype and fill table color
</commit_message>
<xml_diff>
--- a/pptx/result/report.pptx
+++ b/pptx/result/report.pptx
@@ -3857,7 +3857,7 @@
         </p:nvGraphicFramePr>
         <p:xfrm>
           <a:off x="9144000" y="914400"/>
-          <a:ext cx="2974000" cy="914400"/>
+          <a:ext cx="1831000" cy="914400"/>
         </p:xfrm>
         <a:graphic>
           <a:graphicData uri="http://schemas.openxmlformats.org/drawingml/2006/table">
@@ -3867,7 +3867,7 @@
               </a:tblPr>
               <a:tblGrid>
                 <a:gridCol w="471000"/>
-                <a:gridCol w="2503000"/>
+                <a:gridCol w="1360000"/>
               </a:tblGrid>
               <a:tr h="304800">
                 <a:tc>
@@ -3883,7 +3883,11 @@
                       </a:r>
                     </a:p>
                   </a:txBody>
-                  <a:tcPr/>
+                  <a:tcPr>
+                    <a:solidFill>
+                      <a:srgbClr val="FFF0C9"/>
+                    </a:solidFill>
+                  </a:tcPr>
                 </a:tc>
                 <a:tc>
                   <a:txBody>
@@ -3894,11 +3898,15 @@
                         <a:defRPr sz="1000"/>
                       </a:pPr>
                       <a:r>
-                        <a:t>2021-03-24 00:00:00</a:t>
+                        <a:t>2021/03/24</a:t>
                       </a:r>
                     </a:p>
                   </a:txBody>
-                  <a:tcPr/>
+                  <a:tcPr>
+                    <a:solidFill>
+                      <a:srgbClr val="FFF0C9"/>
+                    </a:solidFill>
+                  </a:tcPr>
                 </a:tc>
               </a:tr>
               <a:tr h="304800">
@@ -3915,7 +3923,11 @@
                       </a:r>
                     </a:p>
                   </a:txBody>
-                  <a:tcPr/>
+                  <a:tcPr>
+                    <a:solidFill>
+                      <a:srgbClr val="FFF0C9"/>
+                    </a:solidFill>
+                  </a:tcPr>
                 </a:tc>
                 <a:tc>
                   <a:txBody>
@@ -3926,11 +3938,15 @@
                         <a:defRPr sz="1000"/>
                       </a:pPr>
                       <a:r>
-                        <a:t>2021-04-19 00:00:00</a:t>
+                        <a:t>2021/04/19</a:t>
                       </a:r>
                     </a:p>
                   </a:txBody>
-                  <a:tcPr/>
+                  <a:tcPr>
+                    <a:solidFill>
+                      <a:srgbClr val="FFF0C9"/>
+                    </a:solidFill>
+                  </a:tcPr>
                 </a:tc>
               </a:tr>
               <a:tr h="304800">
@@ -3947,7 +3963,11 @@
                       </a:r>
                     </a:p>
                   </a:txBody>
-                  <a:tcPr/>
+                  <a:tcPr>
+                    <a:solidFill>
+                      <a:srgbClr val="FFF0C9"/>
+                    </a:solidFill>
+                  </a:tcPr>
                 </a:tc>
                 <a:tc>
                   <a:txBody>
@@ -3958,11 +3978,15 @@
                         <a:defRPr sz="1000"/>
                       </a:pPr>
                       <a:r>
-                        <a:t>2021-04-19 00:00:00</a:t>
+                        <a:t>2021/04/19</a:t>
                       </a:r>
                     </a:p>
                   </a:txBody>
-                  <a:tcPr/>
+                  <a:tcPr>
+                    <a:solidFill>
+                      <a:srgbClr val="FFF0C9"/>
+                    </a:solidFill>
+                  </a:tcPr>
                 </a:tc>
               </a:tr>
             </a:tbl>

</xml_diff>

<commit_message>
new and test print_table_xml
</commit_message>
<xml_diff>
--- a/pptx/result/report.pptx
+++ b/pptx/result/report.pptx
@@ -63,7 +63,7 @@
         <p:txBody>
           <a:bodyPr/>
           <a:p>
-            <a:fld id="{5F1185F7-0AF2-4EFE-A89C-8733D87F9AC4}" type="slidenum">
+            <a:fld id="{56EE11D6-31A1-4FAE-AEE0-216B51294C7F}" type="slidenum">
               <a:t>&lt;#&gt;</a:t>
             </a:fld>
           </a:p>
@@ -114,7 +114,7 @@
       </p:grpSpPr>
       <p:sp>
         <p:nvSpPr>
-          <p:cNvPr id="25" name="PlaceHolder 1"/>
+          <p:cNvPr id="26" name="PlaceHolder 1"/>
           <p:cNvSpPr>
             <a:spLocks noGrp="1"/>
           </p:cNvSpPr>
@@ -151,7 +151,7 @@
       </p:sp>
       <p:sp>
         <p:nvSpPr>
-          <p:cNvPr id="26" name="PlaceHolder 2"/>
+          <p:cNvPr id="27" name="PlaceHolder 2"/>
           <p:cNvSpPr>
             <a:spLocks noGrp="1"/>
           </p:cNvSpPr>
@@ -188,7 +188,7 @@
       </p:sp>
       <p:sp>
         <p:nvSpPr>
-          <p:cNvPr id="27" name="PlaceHolder 3"/>
+          <p:cNvPr id="28" name="PlaceHolder 3"/>
           <p:cNvSpPr>
             <a:spLocks noGrp="1"/>
           </p:cNvSpPr>
@@ -257,7 +257,7 @@
         <p:txBody>
           <a:bodyPr/>
           <a:p>
-            <a:fld id="{42D5FF68-E32F-4916-844E-6771EAD2D4D2}" type="slidenum">
+            <a:fld id="{7E4163EC-2010-4C54-9B11-4398BF8A7703}" type="slidenum">
               <a:t>&lt;#&gt;</a:t>
             </a:fld>
           </a:p>
@@ -308,7 +308,7 @@
       </p:grpSpPr>
       <p:sp>
         <p:nvSpPr>
-          <p:cNvPr id="28" name="PlaceHolder 1"/>
+          <p:cNvPr id="29" name="PlaceHolder 1"/>
           <p:cNvSpPr>
             <a:spLocks noGrp="1"/>
           </p:cNvSpPr>
@@ -345,7 +345,7 @@
       </p:sp>
       <p:sp>
         <p:nvSpPr>
-          <p:cNvPr id="29" name="PlaceHolder 2"/>
+          <p:cNvPr id="30" name="PlaceHolder 2"/>
           <p:cNvSpPr>
             <a:spLocks noGrp="1"/>
           </p:cNvSpPr>
@@ -382,7 +382,7 @@
       </p:sp>
       <p:sp>
         <p:nvSpPr>
-          <p:cNvPr id="30" name="PlaceHolder 3"/>
+          <p:cNvPr id="31" name="PlaceHolder 3"/>
           <p:cNvSpPr>
             <a:spLocks noGrp="1"/>
           </p:cNvSpPr>
@@ -419,7 +419,7 @@
       </p:sp>
       <p:sp>
         <p:nvSpPr>
-          <p:cNvPr id="31" name="PlaceHolder 4"/>
+          <p:cNvPr id="32" name="PlaceHolder 4"/>
           <p:cNvSpPr>
             <a:spLocks noGrp="1"/>
           </p:cNvSpPr>
@@ -456,7 +456,7 @@
       </p:sp>
       <p:sp>
         <p:nvSpPr>
-          <p:cNvPr id="32" name="PlaceHolder 5"/>
+          <p:cNvPr id="33" name="PlaceHolder 5"/>
           <p:cNvSpPr>
             <a:spLocks noGrp="1"/>
           </p:cNvSpPr>
@@ -525,7 +525,7 @@
         <p:txBody>
           <a:bodyPr/>
           <a:p>
-            <a:fld id="{46982369-63FD-4882-BAA5-8FD5A9419F9F}" type="slidenum">
+            <a:fld id="{3E692D51-37DB-413C-8B45-56BCD9CD554D}" type="slidenum">
               <a:t>&lt;#&gt;</a:t>
             </a:fld>
           </a:p>
@@ -576,7 +576,7 @@
       </p:grpSpPr>
       <p:sp>
         <p:nvSpPr>
-          <p:cNvPr id="33" name="PlaceHolder 1"/>
+          <p:cNvPr id="34" name="PlaceHolder 1"/>
           <p:cNvSpPr>
             <a:spLocks noGrp="1"/>
           </p:cNvSpPr>
@@ -613,7 +613,7 @@
       </p:sp>
       <p:sp>
         <p:nvSpPr>
-          <p:cNvPr id="34" name="PlaceHolder 2"/>
+          <p:cNvPr id="35" name="PlaceHolder 2"/>
           <p:cNvSpPr>
             <a:spLocks noGrp="1"/>
           </p:cNvSpPr>
@@ -650,7 +650,7 @@
       </p:sp>
       <p:sp>
         <p:nvSpPr>
-          <p:cNvPr id="35" name="PlaceHolder 3"/>
+          <p:cNvPr id="36" name="PlaceHolder 3"/>
           <p:cNvSpPr>
             <a:spLocks noGrp="1"/>
           </p:cNvSpPr>
@@ -687,7 +687,7 @@
       </p:sp>
       <p:sp>
         <p:nvSpPr>
-          <p:cNvPr id="36" name="PlaceHolder 4"/>
+          <p:cNvPr id="37" name="PlaceHolder 4"/>
           <p:cNvSpPr>
             <a:spLocks noGrp="1"/>
           </p:cNvSpPr>
@@ -724,7 +724,7 @@
       </p:sp>
       <p:sp>
         <p:nvSpPr>
-          <p:cNvPr id="37" name="PlaceHolder 5"/>
+          <p:cNvPr id="38" name="PlaceHolder 5"/>
           <p:cNvSpPr>
             <a:spLocks noGrp="1"/>
           </p:cNvSpPr>
@@ -761,7 +761,7 @@
       </p:sp>
       <p:sp>
         <p:nvSpPr>
-          <p:cNvPr id="38" name="PlaceHolder 6"/>
+          <p:cNvPr id="39" name="PlaceHolder 6"/>
           <p:cNvSpPr>
             <a:spLocks noGrp="1"/>
           </p:cNvSpPr>
@@ -798,7 +798,7 @@
       </p:sp>
       <p:sp>
         <p:nvSpPr>
-          <p:cNvPr id="39" name="PlaceHolder 7"/>
+          <p:cNvPr id="40" name="PlaceHolder 7"/>
           <p:cNvSpPr>
             <a:spLocks noGrp="1"/>
           </p:cNvSpPr>
@@ -867,7 +867,7 @@
         <p:txBody>
           <a:bodyPr/>
           <a:p>
-            <a:fld id="{94727503-6892-4D15-8D20-4C96EC650734}" type="slidenum">
+            <a:fld id="{0954A456-F87A-4196-982E-6FDF303F3D50}" type="slidenum">
               <a:t>&lt;#&gt;</a:t>
             </a:fld>
           </a:p>
@@ -918,7 +918,7 @@
       </p:grpSpPr>
       <p:sp>
         <p:nvSpPr>
-          <p:cNvPr id="4" name="PlaceHolder 1"/>
+          <p:cNvPr id="5" name="PlaceHolder 1"/>
           <p:cNvSpPr>
             <a:spLocks noGrp="1"/>
           </p:cNvSpPr>
@@ -955,7 +955,7 @@
       </p:sp>
       <p:sp>
         <p:nvSpPr>
-          <p:cNvPr id="5" name="PlaceHolder 2"/>
+          <p:cNvPr id="6" name="PlaceHolder 2"/>
           <p:cNvSpPr>
             <a:spLocks noGrp="1"/>
           </p:cNvSpPr>
@@ -1024,7 +1024,7 @@
         <p:txBody>
           <a:bodyPr/>
           <a:p>
-            <a:fld id="{3584832A-D954-44C7-B08C-EFC9139E7D7E}" type="slidenum">
+            <a:fld id="{0D787589-513B-4837-84D8-824B7FDA9855}" type="slidenum">
               <a:t>&lt;#&gt;</a:t>
             </a:fld>
           </a:p>
@@ -1075,7 +1075,7 @@
       </p:grpSpPr>
       <p:sp>
         <p:nvSpPr>
-          <p:cNvPr id="6" name="PlaceHolder 1"/>
+          <p:cNvPr id="7" name="PlaceHolder 1"/>
           <p:cNvSpPr>
             <a:spLocks noGrp="1"/>
           </p:cNvSpPr>
@@ -1112,7 +1112,7 @@
       </p:sp>
       <p:sp>
         <p:nvSpPr>
-          <p:cNvPr id="7" name="PlaceHolder 2"/>
+          <p:cNvPr id="8" name="PlaceHolder 2"/>
           <p:cNvSpPr>
             <a:spLocks noGrp="1"/>
           </p:cNvSpPr>
@@ -1181,7 +1181,7 @@
         <p:txBody>
           <a:bodyPr/>
           <a:p>
-            <a:fld id="{B6F97394-3261-4276-B946-12A2ACCB3BC8}" type="slidenum">
+            <a:fld id="{C5EFD214-1BC1-46E1-8336-CB8D2A944953}" type="slidenum">
               <a:t>&lt;#&gt;</a:t>
             </a:fld>
           </a:p>
@@ -1232,7 +1232,7 @@
       </p:grpSpPr>
       <p:sp>
         <p:nvSpPr>
-          <p:cNvPr id="8" name="PlaceHolder 1"/>
+          <p:cNvPr id="9" name="PlaceHolder 1"/>
           <p:cNvSpPr>
             <a:spLocks noGrp="1"/>
           </p:cNvSpPr>
@@ -1269,7 +1269,7 @@
       </p:sp>
       <p:sp>
         <p:nvSpPr>
-          <p:cNvPr id="9" name="PlaceHolder 2"/>
+          <p:cNvPr id="10" name="PlaceHolder 2"/>
           <p:cNvSpPr>
             <a:spLocks noGrp="1"/>
           </p:cNvSpPr>
@@ -1306,7 +1306,7 @@
       </p:sp>
       <p:sp>
         <p:nvSpPr>
-          <p:cNvPr id="10" name="PlaceHolder 3"/>
+          <p:cNvPr id="11" name="PlaceHolder 3"/>
           <p:cNvSpPr>
             <a:spLocks noGrp="1"/>
           </p:cNvSpPr>
@@ -1375,7 +1375,7 @@
         <p:txBody>
           <a:bodyPr/>
           <a:p>
-            <a:fld id="{31A75A6B-2F35-426A-94F6-1FC1166BB097}" type="slidenum">
+            <a:fld id="{ECFB4FB6-A07B-4395-8647-C03CCFC9BBF4}" type="slidenum">
               <a:t>&lt;#&gt;</a:t>
             </a:fld>
           </a:p>
@@ -1426,7 +1426,7 @@
       </p:grpSpPr>
       <p:sp>
         <p:nvSpPr>
-          <p:cNvPr id="11" name="PlaceHolder 1"/>
+          <p:cNvPr id="12" name="PlaceHolder 1"/>
           <p:cNvSpPr>
             <a:spLocks noGrp="1"/>
           </p:cNvSpPr>
@@ -1495,7 +1495,7 @@
         <p:txBody>
           <a:bodyPr/>
           <a:p>
-            <a:fld id="{81B34CAA-9AC7-40F8-AB3C-8AAD94BDA27D}" type="slidenum">
+            <a:fld id="{ED354211-9B82-4619-85BE-D6A57CA8BA6A}" type="slidenum">
               <a:t>&lt;#&gt;</a:t>
             </a:fld>
           </a:p>
@@ -1546,7 +1546,7 @@
       </p:grpSpPr>
       <p:sp>
         <p:nvSpPr>
-          <p:cNvPr id="12" name="PlaceHolder 1"/>
+          <p:cNvPr id="13" name="PlaceHolder 1"/>
           <p:cNvSpPr>
             <a:spLocks noGrp="1"/>
           </p:cNvSpPr>
@@ -1615,7 +1615,7 @@
         <p:txBody>
           <a:bodyPr/>
           <a:p>
-            <a:fld id="{43B68972-CA99-48C9-9530-D65E96A02DA9}" type="slidenum">
+            <a:fld id="{974BB6D4-BFAD-454D-8C12-0CE7A37DB9A3}" type="slidenum">
               <a:t>&lt;#&gt;</a:t>
             </a:fld>
           </a:p>
@@ -1666,7 +1666,7 @@
       </p:grpSpPr>
       <p:sp>
         <p:nvSpPr>
-          <p:cNvPr id="13" name="PlaceHolder 1"/>
+          <p:cNvPr id="14" name="PlaceHolder 1"/>
           <p:cNvSpPr>
             <a:spLocks noGrp="1"/>
           </p:cNvSpPr>
@@ -1703,7 +1703,7 @@
       </p:sp>
       <p:sp>
         <p:nvSpPr>
-          <p:cNvPr id="14" name="PlaceHolder 2"/>
+          <p:cNvPr id="15" name="PlaceHolder 2"/>
           <p:cNvSpPr>
             <a:spLocks noGrp="1"/>
           </p:cNvSpPr>
@@ -1740,7 +1740,7 @@
       </p:sp>
       <p:sp>
         <p:nvSpPr>
-          <p:cNvPr id="15" name="PlaceHolder 3"/>
+          <p:cNvPr id="16" name="PlaceHolder 3"/>
           <p:cNvSpPr>
             <a:spLocks noGrp="1"/>
           </p:cNvSpPr>
@@ -1777,7 +1777,7 @@
       </p:sp>
       <p:sp>
         <p:nvSpPr>
-          <p:cNvPr id="16" name="PlaceHolder 4"/>
+          <p:cNvPr id="17" name="PlaceHolder 4"/>
           <p:cNvSpPr>
             <a:spLocks noGrp="1"/>
           </p:cNvSpPr>
@@ -1846,7 +1846,7 @@
         <p:txBody>
           <a:bodyPr/>
           <a:p>
-            <a:fld id="{B0A1B53C-D052-477C-8559-8B6FD4E108B2}" type="slidenum">
+            <a:fld id="{329DFED5-BCC1-446A-BA64-E02BCBDFE1B3}" type="slidenum">
               <a:t>&lt;#&gt;</a:t>
             </a:fld>
           </a:p>
@@ -1897,7 +1897,7 @@
       </p:grpSpPr>
       <p:sp>
         <p:nvSpPr>
-          <p:cNvPr id="17" name="PlaceHolder 1"/>
+          <p:cNvPr id="18" name="PlaceHolder 1"/>
           <p:cNvSpPr>
             <a:spLocks noGrp="1"/>
           </p:cNvSpPr>
@@ -1934,7 +1934,7 @@
       </p:sp>
       <p:sp>
         <p:nvSpPr>
-          <p:cNvPr id="18" name="PlaceHolder 2"/>
+          <p:cNvPr id="19" name="PlaceHolder 2"/>
           <p:cNvSpPr>
             <a:spLocks noGrp="1"/>
           </p:cNvSpPr>
@@ -1971,7 +1971,7 @@
       </p:sp>
       <p:sp>
         <p:nvSpPr>
-          <p:cNvPr id="19" name="PlaceHolder 3"/>
+          <p:cNvPr id="20" name="PlaceHolder 3"/>
           <p:cNvSpPr>
             <a:spLocks noGrp="1"/>
           </p:cNvSpPr>
@@ -2008,7 +2008,7 @@
       </p:sp>
       <p:sp>
         <p:nvSpPr>
-          <p:cNvPr id="20" name="PlaceHolder 4"/>
+          <p:cNvPr id="21" name="PlaceHolder 4"/>
           <p:cNvSpPr>
             <a:spLocks noGrp="1"/>
           </p:cNvSpPr>
@@ -2077,7 +2077,7 @@
         <p:txBody>
           <a:bodyPr/>
           <a:p>
-            <a:fld id="{04A85D8A-BC3E-4472-8E06-8C7EAE460A24}" type="slidenum">
+            <a:fld id="{822A66ED-1A48-4E14-BB36-F7159F47D117}" type="slidenum">
               <a:t>&lt;#&gt;</a:t>
             </a:fld>
           </a:p>
@@ -2128,7 +2128,7 @@
       </p:grpSpPr>
       <p:sp>
         <p:nvSpPr>
-          <p:cNvPr id="21" name="PlaceHolder 1"/>
+          <p:cNvPr id="22" name="PlaceHolder 1"/>
           <p:cNvSpPr>
             <a:spLocks noGrp="1"/>
           </p:cNvSpPr>
@@ -2165,7 +2165,7 @@
       </p:sp>
       <p:sp>
         <p:nvSpPr>
-          <p:cNvPr id="22" name="PlaceHolder 2"/>
+          <p:cNvPr id="23" name="PlaceHolder 2"/>
           <p:cNvSpPr>
             <a:spLocks noGrp="1"/>
           </p:cNvSpPr>
@@ -2202,7 +2202,7 @@
       </p:sp>
       <p:sp>
         <p:nvSpPr>
-          <p:cNvPr id="23" name="PlaceHolder 3"/>
+          <p:cNvPr id="24" name="PlaceHolder 3"/>
           <p:cNvSpPr>
             <a:spLocks noGrp="1"/>
           </p:cNvSpPr>
@@ -2239,7 +2239,7 @@
       </p:sp>
       <p:sp>
         <p:nvSpPr>
-          <p:cNvPr id="24" name="PlaceHolder 4"/>
+          <p:cNvPr id="25" name="PlaceHolder 4"/>
           <p:cNvSpPr>
             <a:spLocks noGrp="1"/>
           </p:cNvSpPr>
@@ -2308,7 +2308,7 @@
         <p:txBody>
           <a:bodyPr/>
           <a:p>
-            <a:fld id="{66A20DAB-CF18-412F-A47B-3720BBB89262}" type="slidenum">
+            <a:fld id="{2AB8BE71-08CF-41EC-8DF0-C0589BE92B0E}" type="slidenum">
               <a:t>&lt;#&gt;</a:t>
             </a:fld>
           </a:p>
@@ -2578,7 +2578,7 @@
               </a:lnSpc>
               <a:buNone/>
             </a:pPr>
-            <a:fld id="{EF2F450F-1671-416D-9058-4F5E1F7AA48C}" type="slidenum">
+            <a:fld id="{277B170E-571B-4AE5-A398-772EF5606A56}" type="slidenum">
               <a:rPr b="0" lang="en-US" sz="1200" spc="-1" strike="noStrike">
                 <a:solidFill>
                   <a:srgbClr val="8b8b8b"/>
@@ -2589,6 +2589,231 @@
             </a:fld>
             <a:endParaRPr b="0" lang="en-US" sz="1200" spc="-1" strike="noStrike">
               <a:latin typeface="Times New Roman"/>
+            </a:endParaRPr>
+          </a:p>
+        </p:txBody>
+      </p:sp>
+      <p:sp>
+        <p:nvSpPr>
+          <p:cNvPr id="4" name="PlaceHolder 5"/>
+          <p:cNvSpPr>
+            <a:spLocks noGrp="1"/>
+          </p:cNvSpPr>
+          <p:nvPr>
+            <p:ph type="body"/>
+          </p:nvPr>
+        </p:nvSpPr>
+        <p:spPr>
+          <a:xfrm>
+            <a:off x="457200" y="1604520"/>
+            <a:ext cx="8229240" cy="3977280"/>
+          </a:xfrm>
+          <a:prstGeom prst="rect">
+            <a:avLst/>
+          </a:prstGeom>
+          <a:noFill/>
+          <a:ln w="0">
+            <a:noFill/>
+          </a:ln>
+        </p:spPr>
+        <p:txBody>
+          <a:bodyPr lIns="0" rIns="0" tIns="0" bIns="0" anchor="t">
+            <a:normAutofit/>
+          </a:bodyPr>
+          <a:p>
+            <a:pPr marL="432000" indent="-324000">
+              <a:spcBef>
+                <a:spcPts val="1417"/>
+              </a:spcBef>
+              <a:buClr>
+                <a:srgbClr val="000000"/>
+              </a:buClr>
+              <a:buSzPct val="45000"/>
+              <a:buFont typeface="Wingdings" charset="2"/>
+              <a:buChar char=""/>
+            </a:pPr>
+            <a:r>
+              <a:rPr b="0" lang="en-US" sz="3200" spc="-1" strike="noStrike">
+                <a:solidFill>
+                  <a:srgbClr val="000000"/>
+                </a:solidFill>
+                <a:latin typeface="Calibri"/>
+              </a:rPr>
+              <a:t>Click to edit the outline text format</a:t>
+            </a:r>
+            <a:endParaRPr b="0" lang="en-US" sz="3200" spc="-1" strike="noStrike">
+              <a:solidFill>
+                <a:srgbClr val="000000"/>
+              </a:solidFill>
+              <a:latin typeface="Calibri"/>
+            </a:endParaRPr>
+          </a:p>
+          <a:p>
+            <a:pPr lvl="1" marL="864000" indent="-324000">
+              <a:spcBef>
+                <a:spcPts val="1134"/>
+              </a:spcBef>
+              <a:buClr>
+                <a:srgbClr val="000000"/>
+              </a:buClr>
+              <a:buSzPct val="75000"/>
+              <a:buFont typeface="Symbol" charset="2"/>
+              <a:buChar char=""/>
+            </a:pPr>
+            <a:r>
+              <a:rPr b="0" lang="en-US" sz="2400" spc="-1" strike="noStrike">
+                <a:solidFill>
+                  <a:srgbClr val="000000"/>
+                </a:solidFill>
+                <a:latin typeface="Calibri"/>
+              </a:rPr>
+              <a:t>Second Outline Level</a:t>
+            </a:r>
+            <a:endParaRPr b="0" lang="en-US" sz="2400" spc="-1" strike="noStrike">
+              <a:solidFill>
+                <a:srgbClr val="000000"/>
+              </a:solidFill>
+              <a:latin typeface="Calibri"/>
+            </a:endParaRPr>
+          </a:p>
+          <a:p>
+            <a:pPr lvl="2" marL="1296000" indent="-288000">
+              <a:spcBef>
+                <a:spcPts val="850"/>
+              </a:spcBef>
+              <a:buClr>
+                <a:srgbClr val="000000"/>
+              </a:buClr>
+              <a:buSzPct val="45000"/>
+              <a:buFont typeface="Wingdings" charset="2"/>
+              <a:buChar char=""/>
+            </a:pPr>
+            <a:r>
+              <a:rPr b="0" lang="en-US" sz="2000" spc="-1" strike="noStrike">
+                <a:solidFill>
+                  <a:srgbClr val="000000"/>
+                </a:solidFill>
+                <a:latin typeface="Calibri"/>
+              </a:rPr>
+              <a:t>Third Outline Level</a:t>
+            </a:r>
+            <a:endParaRPr b="0" lang="en-US" sz="2000" spc="-1" strike="noStrike">
+              <a:solidFill>
+                <a:srgbClr val="000000"/>
+              </a:solidFill>
+              <a:latin typeface="Calibri"/>
+            </a:endParaRPr>
+          </a:p>
+          <a:p>
+            <a:pPr lvl="3" marL="1728000" indent="-216000">
+              <a:spcBef>
+                <a:spcPts val="567"/>
+              </a:spcBef>
+              <a:buClr>
+                <a:srgbClr val="000000"/>
+              </a:buClr>
+              <a:buSzPct val="75000"/>
+              <a:buFont typeface="Symbol" charset="2"/>
+              <a:buChar char=""/>
+            </a:pPr>
+            <a:r>
+              <a:rPr b="0" lang="en-US" sz="2000" spc="-1" strike="noStrike">
+                <a:solidFill>
+                  <a:srgbClr val="000000"/>
+                </a:solidFill>
+                <a:latin typeface="Calibri"/>
+              </a:rPr>
+              <a:t>Fourth Outline Level</a:t>
+            </a:r>
+            <a:endParaRPr b="0" lang="en-US" sz="2000" spc="-1" strike="noStrike">
+              <a:solidFill>
+                <a:srgbClr val="000000"/>
+              </a:solidFill>
+              <a:latin typeface="Calibri"/>
+            </a:endParaRPr>
+          </a:p>
+          <a:p>
+            <a:pPr lvl="4" marL="2160000" indent="-216000">
+              <a:spcBef>
+                <a:spcPts val="283"/>
+              </a:spcBef>
+              <a:buClr>
+                <a:srgbClr val="000000"/>
+              </a:buClr>
+              <a:buSzPct val="45000"/>
+              <a:buFont typeface="Wingdings" charset="2"/>
+              <a:buChar char=""/>
+            </a:pPr>
+            <a:r>
+              <a:rPr b="0" lang="en-US" sz="2000" spc="-1" strike="noStrike">
+                <a:solidFill>
+                  <a:srgbClr val="000000"/>
+                </a:solidFill>
+                <a:latin typeface="Calibri"/>
+              </a:rPr>
+              <a:t>Fifth Outline Level</a:t>
+            </a:r>
+            <a:endParaRPr b="0" lang="en-US" sz="2000" spc="-1" strike="noStrike">
+              <a:solidFill>
+                <a:srgbClr val="000000"/>
+              </a:solidFill>
+              <a:latin typeface="Calibri"/>
+            </a:endParaRPr>
+          </a:p>
+          <a:p>
+            <a:pPr lvl="5" marL="2592000" indent="-216000">
+              <a:spcBef>
+                <a:spcPts val="283"/>
+              </a:spcBef>
+              <a:buClr>
+                <a:srgbClr val="000000"/>
+              </a:buClr>
+              <a:buSzPct val="45000"/>
+              <a:buFont typeface="Wingdings" charset="2"/>
+              <a:buChar char=""/>
+            </a:pPr>
+            <a:r>
+              <a:rPr b="0" lang="en-US" sz="2000" spc="-1" strike="noStrike">
+                <a:solidFill>
+                  <a:srgbClr val="000000"/>
+                </a:solidFill>
+                <a:latin typeface="Calibri"/>
+              </a:rPr>
+              <a:t>Sixth Outline Level</a:t>
+            </a:r>
+            <a:endParaRPr b="0" lang="en-US" sz="2000" spc="-1" strike="noStrike">
+              <a:solidFill>
+                <a:srgbClr val="000000"/>
+              </a:solidFill>
+              <a:latin typeface="Calibri"/>
+            </a:endParaRPr>
+          </a:p>
+          <a:p>
+            <a:pPr lvl="6" marL="3024000" indent="-216000">
+              <a:spcBef>
+                <a:spcPts val="283"/>
+              </a:spcBef>
+              <a:buClr>
+                <a:srgbClr val="000000"/>
+              </a:buClr>
+              <a:buSzPct val="45000"/>
+              <a:buFont typeface="Wingdings" charset="2"/>
+              <a:buChar char=""/>
+            </a:pPr>
+            <a:r>
+              <a:rPr b="0" lang="en-US" sz="2000" spc="-1" strike="noStrike">
+                <a:solidFill>
+                  <a:srgbClr val="000000"/>
+                </a:solidFill>
+                <a:latin typeface="Calibri"/>
+              </a:rPr>
+              <a:t>Seventh Outline Level</a:t>
+            </a:r>
+            <a:endParaRPr b="0" lang="en-US" sz="2000" spc="-1" strike="noStrike">
+              <a:solidFill>
+                <a:srgbClr val="000000"/>
+              </a:solidFill>
+              <a:latin typeface="Calibri"/>
             </a:endParaRPr>
           </a:p>
         </p:txBody>
@@ -2632,7 +2857,7 @@
       </p:grpSpPr>
       <p:sp>
         <p:nvSpPr>
-          <p:cNvPr id="40" name="PlaceHolder 1"/>
+          <p:cNvPr id="41" name="PlaceHolder 1"/>
           <p:cNvSpPr>
             <a:spLocks noGrp="1"/>
           </p:cNvSpPr>
@@ -2669,7 +2894,7 @@
       </p:sp>
       <p:sp>
         <p:nvSpPr>
-          <p:cNvPr id="41" name="PlaceHolder 2"/>
+          <p:cNvPr id="42" name="PlaceHolder 2"/>
           <p:cNvSpPr>
             <a:spLocks noGrp="1"/>
           </p:cNvSpPr>
@@ -2706,7 +2931,7 @@
       </p:sp>
       <p:sp>
         <p:nvSpPr>
-          <p:cNvPr id="42" name="TextBox 3"/>
+          <p:cNvPr id="43" name="TextBox 3"/>
           <p:cNvSpPr/>
           <p:nvPr/>
         </p:nvSpPr>
@@ -2768,7 +2993,7 @@
       </p:sp>
       <p:graphicFrame>
         <p:nvGraphicFramePr>
-          <p:cNvPr id="43" name="Table 4"/>
+          <p:cNvPr id="44" name="Table 4"/>
           <p:cNvGraphicFramePr/>
           <p:nvPr/>
         </p:nvGraphicFramePr>
@@ -3057,7 +3282,7 @@
                           </a:solidFill>
                           <a:latin typeface="Calibri"/>
                         </a:rPr>
-                        <a:t>,Morocc</a:t>
+                        <a:t>,Morocco(ANRT)</a:t>
                       </a:r>
                       <a:r>
                         <a:rPr b="0" lang="en-US" sz="800" spc="-1" strike="sngStrike">
@@ -3066,7 +3291,16 @@
                           </a:solidFill>
                           <a:latin typeface="Calibri"/>
                         </a:rPr>
-                        <a:t>o(ANRT),Philippines(NTC)</a:t>
+                        <a:t>,</a:t>
+                      </a:r>
+                      <a:r>
+                        <a:rPr b="0" lang="en-US" sz="800" spc="-1" strike="dblStrike">
+                          <a:solidFill>
+                            <a:srgbClr val="000000"/>
+                          </a:solidFill>
+                          <a:latin typeface="Calibri"/>
+                        </a:rPr>
+                        <a:t>Philippines(NTC)</a:t>
                       </a:r>
                       <a:endParaRPr b="0" lang="en-US" sz="800" spc="-1" strike="noStrike">
                         <a:latin typeface="Arial"/>
@@ -3106,25 +3340,7 @@
                           </a:solidFill>
                           <a:latin typeface="Calibri"/>
                         </a:rPr>
-                        <a:t>,</a:t>
-                      </a:r>
-                      <a:r>
-                        <a:rPr b="0" lang="en-US" sz="800" spc="-1" strike="sngStrike">
-                          <a:solidFill>
-                            <a:srgbClr val="000000"/>
-                          </a:solidFill>
-                          <a:latin typeface="Calibri"/>
-                        </a:rPr>
-                        <a:t>Thailand(Class B)</a:t>
-                      </a:r>
-                      <a:r>
-                        <a:rPr b="0" lang="en-US" sz="800" spc="-1" strike="noStrike">
-                          <a:solidFill>
-                            <a:srgbClr val="000000"/>
-                          </a:solidFill>
-                          <a:latin typeface="Calibri"/>
-                        </a:rPr>
-                        <a:t>,Argentina(ENACOM)</a:t>
+                        <a:t>,Thailand(Class B),Argentina(ENACOM)</a:t>
                       </a:r>
                       <a:endParaRPr b="0" lang="en-US" sz="800" spc="-1" strike="noStrike">
                         <a:latin typeface="Arial"/>
@@ -3184,7 +3400,25 @@
                           </a:solidFill>
                           <a:latin typeface="Calibri"/>
                         </a:rPr>
-                        <a:t>,Serbia(Kvatet),Moldova(INSM)</a:t>
+                        <a:t>,</a:t>
+                      </a:r>
+                      <a:r>
+                        <a:rPr b="0" lang="en-US" sz="800" spc="-1" strike="dblStrike">
+                          <a:solidFill>
+                            <a:srgbClr val="000000"/>
+                          </a:solidFill>
+                          <a:latin typeface="Calibri"/>
+                        </a:rPr>
+                        <a:t>Serbia(Kvatet)</a:t>
+                      </a:r>
+                      <a:r>
+                        <a:rPr b="0" lang="en-US" sz="800" spc="-1" strike="noStrike">
+                          <a:solidFill>
+                            <a:srgbClr val="000000"/>
+                          </a:solidFill>
+                          <a:latin typeface="Calibri"/>
+                        </a:rPr>
+                        <a:t>,Moldova(INSM)</a:t>
                       </a:r>
                       <a:endParaRPr b="0" lang="en-US" sz="800" spc="-1" strike="noStrike">
                         <a:latin typeface="Arial"/>
@@ -3255,7 +3489,7 @@
       </p:graphicFrame>
       <p:graphicFrame>
         <p:nvGraphicFramePr>
-          <p:cNvPr id="44" name="Table 5"/>
+          <p:cNvPr id="45" name="Table 5"/>
           <p:cNvGraphicFramePr/>
           <p:nvPr/>
         </p:nvGraphicFramePr>
@@ -3852,7 +4086,7 @@
       </p:graphicFrame>
       <p:graphicFrame>
         <p:nvGraphicFramePr>
-          <p:cNvPr id="45" name="Table 6"/>
+          <p:cNvPr id="46" name="Table 6"/>
           <p:cNvGraphicFramePr/>
           <p:nvPr/>
         </p:nvGraphicFramePr>

</xml_diff>

<commit_message>
the py file can new and update table
</commit_message>
<xml_diff>
--- a/pptx/result/report.pptx
+++ b/pptx/result/report.pptx
@@ -3188,11 +3188,6 @@
                         <a:defRPr sz="800"/>
                       </a:pPr>
                     </a:p>
-                    <a:p>
-                      <a:pPr algn="ctr">
-                        <a:defRPr sz="800"/>
-                      </a:pPr>
-                    </a:p>
                   </a:txBody>
                   <a:tcPr anchor="ctr">
                     <a:lnL w="12700" cap="flat" cmpd="sng" algn="ctr">
@@ -3240,11 +3235,6 @@
                   <a:txBody>
                     <a:bodyPr/>
                     <a:lstStyle/>
-                    <a:p>
-                      <a:pPr algn="ctr">
-                        <a:defRPr sz="800"/>
-                      </a:pPr>
-                    </a:p>
                     <a:p>
                       <a:pPr algn="ctr">
                         <a:defRPr sz="800"/>
@@ -3306,11 +3296,6 @@
                       <a:pPr algn="ctr">
                         <a:defRPr sz="800"/>
                       </a:pPr>
-                    </a:p>
-                    <a:p>
-                      <a:pPr algn="ctr">
-                        <a:defRPr sz="800"/>
-                      </a:pPr>
                       <a:r>
                         <a:t>System</a:t>
                       </a:r>
@@ -3366,11 +3351,6 @@
                       <a:pPr algn="ctr">
                         <a:defRPr sz="800"/>
                       </a:pPr>
-                    </a:p>
-                    <a:p>
-                      <a:pPr algn="ctr">
-                        <a:defRPr sz="800"/>
-                      </a:pPr>
                       <a:r>
                         <a:t>27</a:t>
                       </a:r>
@@ -3380,115 +3360,53 @@
                         <a:defRPr sz="800"/>
                       </a:pPr>
                       <a:r>
-                        <a:t>Mexico(IFETEL)</a:t>
-                        <a:rPr strike="dblStrike"/>
+                        <a:t>Mexico(IFETEL),Jordan(TRC (RTN))
+</a:t>
                       </a:r>
                       <a:r>
-                        <a:t>,Jordan(TRC (RTN))</a:t>
-                      </a:r>
-                    </a:p>
-                    <a:p>
-                      <a:pPr algn="ctr">
-                        <a:defRPr sz="800"/>
-                      </a:pPr>
-                      <a:r>
-                        <a:t>,Brazil(ANATEL),Ukraine(TEC+NSoC+RoHS)</a:t>
-                      </a:r>
-                    </a:p>
-                    <a:p>
-                      <a:pPr algn="ctr">
-                        <a:defRPr sz="800"/>
-                      </a:pPr>
-                      <a:r>
-                        <a:t>,China(NAL),Ecuador(ARCOTEL)</a:t>
-                      </a:r>
-                    </a:p>
-                    <a:p>
-                      <a:pPr algn="ctr">
-                        <a:defRPr sz="800"/>
-                      </a:pPr>
-                      <a:r>
-                        <a:t>,Saudi Arabia(CITC),Jordan(TRC (RTN))</a:t>
-                      </a:r>
-                    </a:p>
-                    <a:p>
-                      <a:pPr algn="ctr">
-                        <a:defRPr sz="800"/>
-                      </a:pPr>
-                      <a:r>
-                        <a:t>,Nigeria(NCC),Taiwan(NCC)</a:t>
-                      </a:r>
-                    </a:p>
-                    <a:p>
-                      <a:pPr algn="ctr">
-                        <a:defRPr sz="800"/>
-                      </a:pPr>
-                      <a:r>
-                        <a:t>,Morocco(ANRT)</a:t>
+                        <a:t>,Brazil(ANATEL),Ukraine(TEC+NSoC+RoHS)
+</a:t>
                       </a:r>
                       <a:r>
-                        <a:t>,</a:t>
+                        <a:t>,China(NAL),Ecuador(ARCOTEL)
+</a:t>
                       </a:r>
                       <a:r>
-                        <a:t>Philippines(NTC)</a:t>
-                      </a:r>
-                    </a:p>
-                    <a:p>
-                      <a:pPr algn="ctr">
-                        <a:defRPr sz="800"/>
-                      </a:pPr>
-                      <a:r>
-                        <a:t>,Azerbaijan(ARRVITN)</a:t>
-                      </a:r>
-                    </a:p>
-                    <a:p>
-                      <a:pPr algn="ctr">
-                        <a:defRPr sz="800"/>
-                      </a:pPr>
-                      <a:r>
-                        <a:t>,Thailand(Class B),Argentina(ENACOM)</a:t>
-                      </a:r>
-                    </a:p>
-                    <a:p>
-                      <a:pPr algn="ctr">
-                        <a:defRPr sz="800"/>
-                      </a:pPr>
-                      <a:r>
-                        <a:t>,Chile(SUBTEL),Uzbekistan(Uzbek)</a:t>
-                      </a:r>
-                    </a:p>
-                    <a:p>
-                      <a:pPr algn="ctr">
-                        <a:defRPr sz="800"/>
-                      </a:pPr>
-                      <a:r>
-                        <a:t>,Zambia(ZICTA),India(BIS)</a:t>
-                      </a:r>
-                    </a:p>
-                    <a:p>
-                      <a:pPr algn="ctr">
-                        <a:defRPr sz="800"/>
-                      </a:pPr>
-                      <a:r>
-                        <a:t>,Serbia(Kvatet),</a:t>
+                        <a:t>,Saudi Arabia(CITC),Jordan(TRC (RTN))
+</a:t>
                       </a:r>
                       <a:r>
-                        <a:t>Moldova(INSM)</a:t>
-                        <a:rPr strike="dblStrike"/>
+                        <a:t>,Nigeria(NCC),Taiwan(NCC)
+</a:t>
                       </a:r>
-                    </a:p>
-                    <a:p>
-                      <a:pPr algn="ctr">
-                        <a:defRPr sz="800"/>
-                      </a:pPr>
                       <a:r>
-                        <a:t>,South Africa(NRCS),Armenia/Belarus/Kazakhstan/Russian/Kyrgyzstan(CU)</a:t>
+                        <a:t>,Morocco(ANRT),Philippines(NTC)
+</a:t>
                       </a:r>
-                    </a:p>
-                    <a:p>
-                      <a:pPr algn="ctr">
-                        <a:defRPr sz="800"/>
-                      </a:pPr>
+                      <a:r>
+                        <a:t>,Azerbaijan(ARRVITN)
+</a:t>
+                      </a:r>
+                      <a:r>
+                        <a:t>,Thailand(Class B),Argentina(ENACOM)
+</a:t>
+                      </a:r>
+                      <a:r>
+                        <a:t>,Chile(SUBTEL),Uzbekistan(Uzbek)
+</a:t>
+                      </a:r>
+                      <a:r>
+                        <a:t>,Zambia(ZICTA),India(BIS)
+</a:t>
+                      </a:r>
+                      <a:r>
+                        <a:t>,Serbia(Kvatet),Moldova(INSM)
+</a:t>
+                      </a:r>
+                      <a:r>
+                        <a:t>,South Africa(NRCS),Armenia/Belarus/Kazakhstan/Russian/Kyrgyzstan(CU)
+</a:t>
+                      </a:r>
                     </a:p>
                   </a:txBody>
                   <a:tcPr anchor="ctr">
@@ -3570,11 +3488,6 @@
                         <a:defRPr sz="800"/>
                       </a:pPr>
                     </a:p>
-                    <a:p>
-                      <a:pPr algn="ctr">
-                        <a:defRPr sz="800"/>
-                      </a:pPr>
-                    </a:p>
                   </a:txBody>
                   <a:tcPr anchor="ctr">
                     <a:lnL w="12700" cap="flat" cmpd="sng" algn="ctr">
@@ -3626,11 +3539,6 @@
                       <a:pPr algn="ctr">
                         <a:defRPr sz="800"/>
                       </a:pPr>
-                    </a:p>
-                    <a:p>
-                      <a:pPr algn="ctr">
-                        <a:defRPr sz="800"/>
-                      </a:pPr>
                       <a:r>
                         <a:t>PPE</a:t>
                       </a:r>
@@ -3684,11 +3592,6 @@
                   <a:txBody>
                     <a:bodyPr/>
                     <a:lstStyle/>
-                    <a:p>
-                      <a:pPr algn="ctr">
-                        <a:defRPr sz="800"/>
-                      </a:pPr>
-                    </a:p>
                     <a:p>
                       <a:pPr algn="ctr">
                         <a:defRPr sz="800"/>
@@ -3756,11 +3659,6 @@
                       <a:pPr algn="ctr">
                         <a:defRPr sz="800"/>
                       </a:pPr>
-                    </a:p>
-                    <a:p>
-                      <a:pPr algn="ctr">
-                        <a:defRPr sz="800"/>
-                      </a:pPr>
                       <a:r>
                         <a:t>6</a:t>
                       </a:r>
@@ -3770,29 +3668,17 @@
                         <a:defRPr sz="800"/>
                       </a:pPr>
                       <a:r>
-                        <a:t>Jordan(TRC (RTN)),China(NAL)</a:t>
+                        <a:t>Jordan(TRC (RTN)),China(NAL)
+</a:t>
                       </a:r>
-                    </a:p>
-                    <a:p>
-                      <a:pPr algn="ctr">
-                        <a:defRPr sz="800"/>
-                      </a:pPr>
                       <a:r>
-                        <a:t>,Saudi Arabia(CITC),Taiwan(NCC)</a:t>
+                        <a:t>,Saudi Arabia(CITC),Taiwan(NCC)
+</a:t>
                       </a:r>
-                    </a:p>
-                    <a:p>
-                      <a:pPr algn="ctr">
-                        <a:defRPr sz="800"/>
-                      </a:pPr>
                       <a:r>
-                        <a:t>,Philippines(NTC),Thailand(Class B)</a:t>
+                        <a:t>,Philippines(NTC),Thailand(Class B)
+</a:t>
                       </a:r>
-                    </a:p>
-                    <a:p>
-                      <a:pPr algn="ctr">
-                        <a:defRPr sz="800"/>
-                      </a:pPr>
                     </a:p>
                   </a:txBody>
                   <a:tcPr anchor="ctr">
@@ -3847,11 +3733,6 @@
                       <a:pPr algn="ctr">
                         <a:defRPr sz="800"/>
                       </a:pPr>
-                    </a:p>
-                    <a:p>
-                      <a:pPr algn="ctr">
-                        <a:defRPr sz="800"/>
-                      </a:pPr>
                       <a:r>
                         <a:t>RFID</a:t>
                       </a:r>
@@ -3907,11 +3788,6 @@
                       <a:pPr algn="ctr">
                         <a:defRPr sz="800"/>
                       </a:pPr>
-                    </a:p>
-                    <a:p>
-                      <a:pPr algn="ctr">
-                        <a:defRPr sz="800"/>
-                      </a:pPr>
                       <a:r>
                         <a:t>17</a:t>
                       </a:r>
@@ -3921,77 +3797,41 @@
                         <a:defRPr sz="800"/>
                       </a:pPr>
                       <a:r>
-                        <a:t>Lebanon(TRA/MoT),India(DoT (China))</a:t>
+                        <a:t>Lebanon(TRA/MoT),India(DoT (China))
+</a:t>
                       </a:r>
-                    </a:p>
-                    <a:p>
-                      <a:pPr algn="ctr">
-                        <a:defRPr sz="800"/>
-                      </a:pPr>
                       <a:r>
-                        <a:t>,Guyana(PUC),Mexico(IFETEL)</a:t>
+                        <a:t>,Guyana(PUC),Mexico(IFETEL)
+</a:t>
                       </a:r>
-                    </a:p>
-                    <a:p>
-                      <a:pPr algn="ctr">
-                        <a:defRPr sz="800"/>
-                      </a:pPr>
                       <a:r>
-                        <a:t>,Saint Lucia(NTRC),Moldova(DoC)</a:t>
+                        <a:t>,Saint Lucia(NTRC),Moldova(DoC)
+</a:t>
                       </a:r>
-                    </a:p>
-                    <a:p>
-                      <a:pPr algn="ctr">
-                        <a:defRPr sz="800"/>
-                      </a:pPr>
                       <a:r>
-                        <a:t>,Nicaragua(TELCOR),Zimbabwe(POTRAZ)</a:t>
+                        <a:t>,Nicaragua(TELCOR),Zimbabwe(POTRAZ)
+</a:t>
                       </a:r>
-                    </a:p>
-                    <a:p>
-                      <a:pPr algn="ctr">
-                        <a:defRPr sz="800"/>
-                      </a:pPr>
                       <a:r>
-                        <a:t>,Cambodia(MPTC),Argentina(ENACOM)</a:t>
+                        <a:t>,Cambodia(MPTC),Argentina(ENACOM)
+</a:t>
                       </a:r>
-                    </a:p>
-                    <a:p>
-                      <a:pPr algn="ctr">
-                        <a:defRPr sz="800"/>
-                      </a:pPr>
                       <a:r>
-                        <a:t>,Dominican Republic(INDOTEL)</a:t>
+                        <a:t>,Dominican Republic(INDOTEL)
+</a:t>
                       </a:r>
-                    </a:p>
-                    <a:p>
-                      <a:pPr algn="ctr">
-                        <a:defRPr sz="800"/>
-                      </a:pPr>
                       <a:r>
-                        <a:t>,South Africa(ICASA)</a:t>
+                        <a:t>,South Africa(ICASA)
+</a:t>
                       </a:r>
-                    </a:p>
-                    <a:p>
-                      <a:pPr algn="ctr">
-                        <a:defRPr sz="800"/>
-                      </a:pPr>
                       <a:r>
-                        <a:t>,Haiti(CONATEL),Solomon Islands(TCSI)</a:t>
+                        <a:t>,Haiti(CONATEL),Solomon Islands(TCSI)
+</a:t>
                       </a:r>
-                    </a:p>
-                    <a:p>
-                      <a:pPr algn="ctr">
-                        <a:defRPr sz="800"/>
-                      </a:pPr>
                       <a:r>
-                        <a:t>,Bahamas(URCA),Paraguay(CONATEL)</a:t>
+                        <a:t>,Bahamas(URCA),Paraguay(CONATEL)
+</a:t>
                       </a:r>
-                    </a:p>
-                    <a:p>
-                      <a:pPr algn="ctr">
-                        <a:defRPr sz="800"/>
-                      </a:pPr>
                     </a:p>
                   </a:txBody>
                   <a:tcPr anchor="ctr">

</xml_diff>

<commit_message>
def find and set color for table
</commit_message>
<xml_diff>
--- a/pptx/result/report.pptx
+++ b/pptx/result/report.pptx
@@ -3188,6 +3188,11 @@
                         <a:defRPr sz="800"/>
                       </a:pPr>
                     </a:p>
+                    <a:p>
+                      <a:pPr algn="ctr">
+                        <a:defRPr sz="800"/>
+                      </a:pPr>
+                    </a:p>
                   </a:txBody>
                   <a:tcPr anchor="ctr">
                     <a:lnL w="12700" cap="flat" cmpd="sng" algn="ctr">
@@ -3239,7 +3244,17 @@
                       <a:pPr algn="ctr">
                         <a:defRPr sz="800"/>
                       </a:pPr>
+                    </a:p>
+                    <a:p>
+                      <a:pPr algn="ctr">
+                        <a:defRPr sz="800"/>
+                      </a:pPr>
                       <a:r>
+                        <a:rPr>
+                          <a:solidFill>
+                            <a:srgbClr val="ffffff"/>
+                          </a:solidFill>
+                        </a:rPr>
                         <a:t>PPE</a:t>
                       </a:r>
                     </a:p>
@@ -3296,6 +3311,11 @@
                       <a:pPr algn="ctr">
                         <a:defRPr sz="800"/>
                       </a:pPr>
+                    </a:p>
+                    <a:p>
+                      <a:pPr algn="ctr">
+                        <a:defRPr sz="800"/>
+                      </a:pPr>
                       <a:r>
                         <a:t>System</a:t>
                       </a:r>
@@ -3351,6 +3371,11 @@
                       <a:pPr algn="ctr">
                         <a:defRPr sz="800"/>
                       </a:pPr>
+                    </a:p>
+                    <a:p>
+                      <a:pPr algn="ctr">
+                        <a:defRPr sz="800"/>
+                      </a:pPr>
                       <a:r>
                         <a:t>27</a:t>
                       </a:r>
@@ -3360,53 +3385,131 @@
                         <a:defRPr sz="800"/>
                       </a:pPr>
                       <a:r>
-                        <a:t>Mexico(IFETEL),Jordan(TRC (RTN))
-</a:t>
+                        <a:t>Mexico(IFETEL)</a:t>
+                        <a:rPr strike="dblStrike"/>
                       </a:r>
                       <a:r>
-                        <a:t>,Brazil(ANATEL),Ukraine(TEC+NSoC+RoHS)
-</a:t>
+                        <a:t>,</a:t>
                       </a:r>
                       <a:r>
-                        <a:t>,China(NAL),Ecuador(ARCOTEL)
-</a:t>
+                        <a:rPr>
+                          <a:solidFill>
+                            <a:srgbClr val="ff0000"/>
+                          </a:solidFill>
+                        </a:rPr>
+                        <a:t>Jordan(TRC (RTN))</a:t>
+                      </a:r>
+                    </a:p>
+                    <a:p>
+                      <a:pPr algn="ctr">
+                        <a:defRPr sz="800"/>
+                      </a:pPr>
+                      <a:r>
+                        <a:t>,Brazil(ANATEL),Ukraine(TEC+NSoC+RoHS)</a:t>
+                      </a:r>
+                    </a:p>
+                    <a:p>
+                      <a:pPr algn="ctr">
+                        <a:defRPr sz="800"/>
+                      </a:pPr>
+                      <a:r>
+                        <a:t>,China(NAL),Ecuador(ARCOTEL)</a:t>
+                      </a:r>
+                    </a:p>
+                    <a:p>
+                      <a:pPr algn="ctr">
+                        <a:defRPr sz="800"/>
+                      </a:pPr>
+                      <a:r>
+                        <a:t>,Saudi Arabia(CITC),Jordan(TRC (RTN))</a:t>
+                      </a:r>
+                    </a:p>
+                    <a:p>
+                      <a:pPr algn="ctr">
+                        <a:defRPr sz="800"/>
+                      </a:pPr>
+                      <a:r>
+                        <a:t>,Nigeria(NCC),Taiwan(NCC)</a:t>
+                      </a:r>
+                    </a:p>
+                    <a:p>
+                      <a:pPr algn="ctr">
+                        <a:defRPr sz="800"/>
+                      </a:pPr>
+                      <a:r>
+                        <a:t>,Morocco(ANRT)</a:t>
                       </a:r>
                       <a:r>
-                        <a:t>,Saudi Arabia(CITC),Jordan(TRC (RTN))
-</a:t>
+                        <a:t>,</a:t>
                       </a:r>
                       <a:r>
-                        <a:t>,Nigeria(NCC),Taiwan(NCC)
-</a:t>
+                        <a:t>Philippines(NTC)</a:t>
+                      </a:r>
+                    </a:p>
+                    <a:p>
+                      <a:pPr algn="ctr">
+                        <a:defRPr sz="800"/>
+                      </a:pPr>
+                      <a:r>
+                        <a:t>,</a:t>
                       </a:r>
                       <a:r>
-                        <a:t>,Morocco(ANRT),Philippines(NTC)
-</a:t>
+                        <a:rPr>
+                          <a:solidFill>
+                            <a:srgbClr val="2a6099"/>
+                          </a:solidFill>
+                        </a:rPr>
+                        <a:t>Azerbaijan(ARRVITN)</a:t>
+                      </a:r>
+                    </a:p>
+                    <a:p>
+                      <a:pPr algn="ctr">
+                        <a:defRPr sz="800"/>
+                      </a:pPr>
+                      <a:r>
+                        <a:t>,Thailand(Class B),Argentina(ENACOM)</a:t>
+                      </a:r>
+                    </a:p>
+                    <a:p>
+                      <a:pPr algn="ctr">
+                        <a:defRPr sz="800"/>
+                      </a:pPr>
+                      <a:r>
+                        <a:t>,Chile(SUBTEL),Uzbekistan(Uzbek)</a:t>
+                      </a:r>
+                    </a:p>
+                    <a:p>
+                      <a:pPr algn="ctr">
+                        <a:defRPr sz="800"/>
+                      </a:pPr>
+                      <a:r>
+                        <a:t>,Zambia(ZICTA),India(BIS)</a:t>
+                      </a:r>
+                    </a:p>
+                    <a:p>
+                      <a:pPr algn="ctr">
+                        <a:defRPr sz="800"/>
+                      </a:pPr>
+                      <a:r>
+                        <a:t>,Serbia(Kvatet),</a:t>
                       </a:r>
                       <a:r>
-                        <a:t>,Azerbaijan(ARRVITN)
-</a:t>
+                        <a:t>Moldova(INSM)</a:t>
+                        <a:rPr strike="dblStrike"/>
                       </a:r>
+                    </a:p>
+                    <a:p>
+                      <a:pPr algn="ctr">
+                        <a:defRPr sz="800"/>
+                      </a:pPr>
                       <a:r>
-                        <a:t>,Thailand(Class B),Argentina(ENACOM)
-</a:t>
+                        <a:t>,South Africa(NRCS),Armenia/Belarus/Kazakhstan/Russian/Kyrgyzstan(CU)</a:t>
                       </a:r>
-                      <a:r>
-                        <a:t>,Chile(SUBTEL),Uzbekistan(Uzbek)
-</a:t>
-                      </a:r>
-                      <a:r>
-                        <a:t>,Zambia(ZICTA),India(BIS)
-</a:t>
-                      </a:r>
-                      <a:r>
-                        <a:t>,Serbia(Kvatet),Moldova(INSM)
-</a:t>
-                      </a:r>
-                      <a:r>
-                        <a:t>,South Africa(NRCS),Armenia/Belarus/Kazakhstan/Russian/Kyrgyzstan(CU)
-</a:t>
-                      </a:r>
+                    </a:p>
+                    <a:p>
+                      <a:pPr algn="ctr">
+                        <a:defRPr sz="800"/>
+                      </a:pPr>
                     </a:p>
                   </a:txBody>
                   <a:tcPr anchor="ctr">
@@ -3488,6 +3591,11 @@
                         <a:defRPr sz="800"/>
                       </a:pPr>
                     </a:p>
+                    <a:p>
+                      <a:pPr algn="ctr">
+                        <a:defRPr sz="800"/>
+                      </a:pPr>
+                    </a:p>
                   </a:txBody>
                   <a:tcPr anchor="ctr">
                     <a:lnL w="12700" cap="flat" cmpd="sng" algn="ctr">
@@ -3539,7 +3647,17 @@
                       <a:pPr algn="ctr">
                         <a:defRPr sz="800"/>
                       </a:pPr>
+                    </a:p>
+                    <a:p>
+                      <a:pPr algn="ctr">
+                        <a:defRPr sz="800"/>
+                      </a:pPr>
                       <a:r>
+                        <a:rPr>
+                          <a:solidFill>
+                            <a:srgbClr val="ffffff"/>
+                          </a:solidFill>
+                        </a:rPr>
                         <a:t>PPE</a:t>
                       </a:r>
                     </a:p>
@@ -3596,6 +3714,11 @@
                       <a:pPr algn="ctr">
                         <a:defRPr sz="800"/>
                       </a:pPr>
+                    </a:p>
+                    <a:p>
+                      <a:pPr algn="ctr">
+                        <a:defRPr sz="800"/>
+                      </a:pPr>
                       <a:r>
                         <a:t>T77W968</a:t>
                       </a:r>
@@ -3659,6 +3782,11 @@
                       <a:pPr algn="ctr">
                         <a:defRPr sz="800"/>
                       </a:pPr>
+                    </a:p>
+                    <a:p>
+                      <a:pPr algn="ctr">
+                        <a:defRPr sz="800"/>
+                      </a:pPr>
                       <a:r>
                         <a:t>6</a:t>
                       </a:r>
@@ -3668,17 +3796,29 @@
                         <a:defRPr sz="800"/>
                       </a:pPr>
                       <a:r>
-                        <a:t>Jordan(TRC (RTN)),China(NAL)
-</a:t>
+                        <a:t>Jordan(TRC (RTN)),China(NAL)</a:t>
                       </a:r>
+                    </a:p>
+                    <a:p>
+                      <a:pPr algn="ctr">
+                        <a:defRPr sz="800"/>
+                      </a:pPr>
                       <a:r>
-                        <a:t>,Saudi Arabia(CITC),Taiwan(NCC)
-</a:t>
+                        <a:t>,Saudi Arabia(CITC),Taiwan(NCC)</a:t>
                       </a:r>
+                    </a:p>
+                    <a:p>
+                      <a:pPr algn="ctr">
+                        <a:defRPr sz="800"/>
+                      </a:pPr>
                       <a:r>
-                        <a:t>,Philippines(NTC),Thailand(Class B)
-</a:t>
+                        <a:t>,Philippines(NTC),Thailand(Class B)</a:t>
                       </a:r>
+                    </a:p>
+                    <a:p>
+                      <a:pPr algn="ctr">
+                        <a:defRPr sz="800"/>
+                      </a:pPr>
                     </a:p>
                   </a:txBody>
                   <a:tcPr anchor="ctr">
@@ -3733,6 +3873,11 @@
                       <a:pPr algn="ctr">
                         <a:defRPr sz="800"/>
                       </a:pPr>
+                    </a:p>
+                    <a:p>
+                      <a:pPr algn="ctr">
+                        <a:defRPr sz="800"/>
+                      </a:pPr>
                       <a:r>
                         <a:t>RFID</a:t>
                       </a:r>
@@ -3788,6 +3933,11 @@
                       <a:pPr algn="ctr">
                         <a:defRPr sz="800"/>
                       </a:pPr>
+                    </a:p>
+                    <a:p>
+                      <a:pPr algn="ctr">
+                        <a:defRPr sz="800"/>
+                      </a:pPr>
                       <a:r>
                         <a:t>17</a:t>
                       </a:r>
@@ -3797,41 +3947,77 @@
                         <a:defRPr sz="800"/>
                       </a:pPr>
                       <a:r>
-                        <a:t>Lebanon(TRA/MoT),India(DoT (China))
-</a:t>
+                        <a:t>Lebanon(TRA/MoT),India(DoT (China))</a:t>
                       </a:r>
+                    </a:p>
+                    <a:p>
+                      <a:pPr algn="ctr">
+                        <a:defRPr sz="800"/>
+                      </a:pPr>
                       <a:r>
-                        <a:t>,Guyana(PUC),Mexico(IFETEL)
-</a:t>
+                        <a:t>,Guyana(PUC),Mexico(IFETEL)</a:t>
                       </a:r>
+                    </a:p>
+                    <a:p>
+                      <a:pPr algn="ctr">
+                        <a:defRPr sz="800"/>
+                      </a:pPr>
                       <a:r>
-                        <a:t>,Saint Lucia(NTRC),Moldova(DoC)
-</a:t>
+                        <a:t>,Saint Lucia(NTRC),Moldova(DoC)</a:t>
                       </a:r>
+                    </a:p>
+                    <a:p>
+                      <a:pPr algn="ctr">
+                        <a:defRPr sz="800"/>
+                      </a:pPr>
                       <a:r>
-                        <a:t>,Nicaragua(TELCOR),Zimbabwe(POTRAZ)
-</a:t>
+                        <a:t>,Nicaragua(TELCOR),Zimbabwe(POTRAZ)</a:t>
                       </a:r>
+                    </a:p>
+                    <a:p>
+                      <a:pPr algn="ctr">
+                        <a:defRPr sz="800"/>
+                      </a:pPr>
                       <a:r>
-                        <a:t>,Cambodia(MPTC),Argentina(ENACOM)
-</a:t>
+                        <a:t>,Cambodia(MPTC),Argentina(ENACOM)</a:t>
                       </a:r>
+                    </a:p>
+                    <a:p>
+                      <a:pPr algn="ctr">
+                        <a:defRPr sz="800"/>
+                      </a:pPr>
                       <a:r>
-                        <a:t>,Dominican Republic(INDOTEL)
-</a:t>
+                        <a:t>,Dominican Republic(INDOTEL)</a:t>
                       </a:r>
+                    </a:p>
+                    <a:p>
+                      <a:pPr algn="ctr">
+                        <a:defRPr sz="800"/>
+                      </a:pPr>
                       <a:r>
-                        <a:t>,South Africa(ICASA)
-</a:t>
+                        <a:t>,South Africa(ICASA)</a:t>
                       </a:r>
+                    </a:p>
+                    <a:p>
+                      <a:pPr algn="ctr">
+                        <a:defRPr sz="800"/>
+                      </a:pPr>
                       <a:r>
-                        <a:t>,Haiti(CONATEL),Solomon Islands(TCSI)
-</a:t>
+                        <a:t>,Haiti(CONATEL),Solomon Islands(TCSI)</a:t>
                       </a:r>
+                    </a:p>
+                    <a:p>
+                      <a:pPr algn="ctr">
+                        <a:defRPr sz="800"/>
+                      </a:pPr>
                       <a:r>
-                        <a:t>,Bahamas(URCA),Paraguay(CONATEL)
-</a:t>
+                        <a:t>,Bahamas(URCA),Paraguay(CONATEL)</a:t>
                       </a:r>
+                    </a:p>
+                    <a:p>
+                      <a:pPr algn="ctr">
+                        <a:defRPr sz="800"/>
+                      </a:pPr>
                     </a:p>
                   </a:txBody>
                   <a:tcPr anchor="ctr">

</xml_diff>